<commit_message>
Updates to include presentation
</commit_message>
<xml_diff>
--- a/manuscripts/ICTAC2023/ICTAC-2023-Presentation.pptx
+++ b/manuscripts/ICTAC2023/ICTAC-2023-Presentation.pptx
@@ -5,21 +5,22 @@
     <p:sldMasterId id="2147483648" r:id="rId1"/>
   </p:sldMasterIdLst>
   <p:notesMasterIdLst>
-    <p:notesMasterId r:id="rId14"/>
+    <p:notesMasterId r:id="rId15"/>
   </p:notesMasterIdLst>
   <p:sldIdLst>
     <p:sldId id="256" r:id="rId2"/>
     <p:sldId id="258" r:id="rId3"/>
     <p:sldId id="257" r:id="rId4"/>
-    <p:sldId id="260" r:id="rId5"/>
+    <p:sldId id="268" r:id="rId5"/>
     <p:sldId id="261" r:id="rId6"/>
     <p:sldId id="263" r:id="rId7"/>
-    <p:sldId id="265" r:id="rId8"/>
-    <p:sldId id="262" r:id="rId9"/>
-    <p:sldId id="264" r:id="rId10"/>
-    <p:sldId id="259" r:id="rId11"/>
-    <p:sldId id="266" r:id="rId12"/>
-    <p:sldId id="267" r:id="rId13"/>
+    <p:sldId id="269" r:id="rId8"/>
+    <p:sldId id="264" r:id="rId9"/>
+    <p:sldId id="262" r:id="rId10"/>
+    <p:sldId id="270" r:id="rId11"/>
+    <p:sldId id="259" r:id="rId12"/>
+    <p:sldId id="266" r:id="rId13"/>
+    <p:sldId id="267" r:id="rId14"/>
   </p:sldIdLst>
   <p:sldSz cx="12192000" cy="6858000"/>
   <p:notesSz cx="6858000" cy="9144000"/>
@@ -118,7 +119,3056 @@
       </a:defRPr>
     </a:lvl9pPr>
   </p:defaultTextStyle>
+  <p:extLst>
+    <p:ext uri="{EFAFB233-063F-42B5-8137-9DF3F51BA10A}">
+      <p15:sldGuideLst xmlns:p15="http://schemas.microsoft.com/office/powerpoint/2012/main"/>
+    </p:ext>
+  </p:extLst>
 </p:presentation>
+</file>
+
+<file path=ppt/diagrams/colors1.xml><?xml version="1.0" encoding="utf-8"?>
+<dgm:colorsDef xmlns:dgm="http://schemas.openxmlformats.org/drawingml/2006/diagram" xmlns:a="http://schemas.openxmlformats.org/drawingml/2006/main" uniqueId="urn:microsoft.com/office/officeart/2005/8/colors/colorful5">
+  <dgm:title val=""/>
+  <dgm:desc val=""/>
+  <dgm:catLst>
+    <dgm:cat type="colorful" pri="10500"/>
+  </dgm:catLst>
+  <dgm:styleLbl name="node0">
+    <dgm:fillClrLst meth="repeat">
+      <a:schemeClr val="accent4"/>
+    </dgm:fillClrLst>
+    <dgm:linClrLst meth="repeat">
+      <a:schemeClr val="lt1"/>
+    </dgm:linClrLst>
+    <dgm:effectClrLst/>
+    <dgm:txLinClrLst/>
+    <dgm:txFillClrLst/>
+    <dgm:txEffectClrLst/>
+  </dgm:styleLbl>
+  <dgm:styleLbl name="node1">
+    <dgm:fillClrLst>
+      <a:schemeClr val="accent5"/>
+      <a:schemeClr val="accent6"/>
+    </dgm:fillClrLst>
+    <dgm:linClrLst meth="repeat">
+      <a:schemeClr val="lt1"/>
+    </dgm:linClrLst>
+    <dgm:effectClrLst/>
+    <dgm:txLinClrLst/>
+    <dgm:txFillClrLst/>
+    <dgm:txEffectClrLst/>
+  </dgm:styleLbl>
+  <dgm:styleLbl name="alignNode1">
+    <dgm:fillClrLst>
+      <a:schemeClr val="accent5"/>
+      <a:schemeClr val="accent6"/>
+    </dgm:fillClrLst>
+    <dgm:linClrLst>
+      <a:schemeClr val="accent5"/>
+      <a:schemeClr val="accent6"/>
+    </dgm:linClrLst>
+    <dgm:effectClrLst/>
+    <dgm:txLinClrLst/>
+    <dgm:txFillClrLst/>
+    <dgm:txEffectClrLst/>
+  </dgm:styleLbl>
+  <dgm:styleLbl name="lnNode1">
+    <dgm:fillClrLst>
+      <a:schemeClr val="accent5"/>
+      <a:schemeClr val="accent6"/>
+    </dgm:fillClrLst>
+    <dgm:linClrLst meth="repeat">
+      <a:schemeClr val="lt1"/>
+    </dgm:linClrLst>
+    <dgm:effectClrLst/>
+    <dgm:txLinClrLst/>
+    <dgm:txFillClrLst/>
+    <dgm:txEffectClrLst/>
+  </dgm:styleLbl>
+  <dgm:styleLbl name="vennNode1">
+    <dgm:fillClrLst>
+      <a:schemeClr val="accent5">
+        <a:alpha val="50000"/>
+      </a:schemeClr>
+      <a:schemeClr val="accent6">
+        <a:alpha val="50000"/>
+      </a:schemeClr>
+    </dgm:fillClrLst>
+    <dgm:linClrLst meth="repeat">
+      <a:schemeClr val="lt1"/>
+    </dgm:linClrLst>
+    <dgm:effectClrLst/>
+    <dgm:txLinClrLst/>
+    <dgm:txFillClrLst/>
+    <dgm:txEffectClrLst/>
+  </dgm:styleLbl>
+  <dgm:styleLbl name="node2">
+    <dgm:fillClrLst>
+      <a:schemeClr val="accent6"/>
+    </dgm:fillClrLst>
+    <dgm:linClrLst meth="repeat">
+      <a:schemeClr val="lt1"/>
+    </dgm:linClrLst>
+    <dgm:effectClrLst/>
+    <dgm:txLinClrLst/>
+    <dgm:txFillClrLst/>
+    <dgm:txEffectClrLst/>
+  </dgm:styleLbl>
+  <dgm:styleLbl name="node3">
+    <dgm:fillClrLst>
+      <a:schemeClr val="accent1"/>
+    </dgm:fillClrLst>
+    <dgm:linClrLst meth="repeat">
+      <a:schemeClr val="lt1"/>
+    </dgm:linClrLst>
+    <dgm:effectClrLst/>
+    <dgm:txLinClrLst/>
+    <dgm:txFillClrLst/>
+    <dgm:txEffectClrLst/>
+  </dgm:styleLbl>
+  <dgm:styleLbl name="node4">
+    <dgm:fillClrLst>
+      <a:schemeClr val="accent2"/>
+    </dgm:fillClrLst>
+    <dgm:linClrLst meth="repeat">
+      <a:schemeClr val="lt1"/>
+    </dgm:linClrLst>
+    <dgm:effectClrLst/>
+    <dgm:txLinClrLst/>
+    <dgm:txFillClrLst/>
+    <dgm:txEffectClrLst/>
+  </dgm:styleLbl>
+  <dgm:styleLbl name="fgImgPlace1">
+    <dgm:fillClrLst>
+      <a:schemeClr val="accent5">
+        <a:tint val="50000"/>
+      </a:schemeClr>
+      <a:schemeClr val="accent6">
+        <a:tint val="50000"/>
+      </a:schemeClr>
+    </dgm:fillClrLst>
+    <dgm:linClrLst meth="repeat">
+      <a:schemeClr val="lt1"/>
+    </dgm:linClrLst>
+    <dgm:effectClrLst/>
+    <dgm:txLinClrLst/>
+    <dgm:txFillClrLst meth="repeat">
+      <a:schemeClr val="lt1"/>
+    </dgm:txFillClrLst>
+    <dgm:txEffectClrLst/>
+  </dgm:styleLbl>
+  <dgm:styleLbl name="alignImgPlace1">
+    <dgm:fillClrLst>
+      <a:schemeClr val="accent5">
+        <a:tint val="50000"/>
+      </a:schemeClr>
+      <a:schemeClr val="accent6">
+        <a:tint val="20000"/>
+      </a:schemeClr>
+    </dgm:fillClrLst>
+    <dgm:linClrLst meth="repeat">
+      <a:schemeClr val="lt1"/>
+    </dgm:linClrLst>
+    <dgm:effectClrLst/>
+    <dgm:txLinClrLst/>
+    <dgm:txFillClrLst meth="repeat">
+      <a:schemeClr val="lt1"/>
+    </dgm:txFillClrLst>
+    <dgm:txEffectClrLst/>
+  </dgm:styleLbl>
+  <dgm:styleLbl name="bgImgPlace1">
+    <dgm:fillClrLst>
+      <a:schemeClr val="accent5">
+        <a:tint val="50000"/>
+      </a:schemeClr>
+      <a:schemeClr val="accent6">
+        <a:tint val="20000"/>
+      </a:schemeClr>
+    </dgm:fillClrLst>
+    <dgm:linClrLst meth="repeat">
+      <a:schemeClr val="lt1"/>
+    </dgm:linClrLst>
+    <dgm:effectClrLst/>
+    <dgm:txLinClrLst/>
+    <dgm:txFillClrLst meth="repeat">
+      <a:schemeClr val="lt1"/>
+    </dgm:txFillClrLst>
+    <dgm:txEffectClrLst/>
+  </dgm:styleLbl>
+  <dgm:styleLbl name="sibTrans2D1">
+    <dgm:fillClrLst>
+      <a:schemeClr val="accent5"/>
+      <a:schemeClr val="accent6"/>
+    </dgm:fillClrLst>
+    <dgm:linClrLst meth="repeat">
+      <a:schemeClr val="lt1"/>
+    </dgm:linClrLst>
+    <dgm:effectClrLst/>
+    <dgm:txLinClrLst/>
+    <dgm:txFillClrLst/>
+    <dgm:txEffectClrLst/>
+  </dgm:styleLbl>
+  <dgm:styleLbl name="fgSibTrans2D1">
+    <dgm:fillClrLst>
+      <a:schemeClr val="accent5"/>
+      <a:schemeClr val="accent6"/>
+    </dgm:fillClrLst>
+    <dgm:linClrLst meth="repeat">
+      <a:schemeClr val="lt1"/>
+    </dgm:linClrLst>
+    <dgm:effectClrLst/>
+    <dgm:txLinClrLst/>
+    <dgm:txFillClrLst meth="repeat">
+      <a:schemeClr val="lt1"/>
+    </dgm:txFillClrLst>
+    <dgm:txEffectClrLst/>
+  </dgm:styleLbl>
+  <dgm:styleLbl name="bgSibTrans2D1">
+    <dgm:fillClrLst>
+      <a:schemeClr val="accent5"/>
+      <a:schemeClr val="accent6"/>
+    </dgm:fillClrLst>
+    <dgm:linClrLst meth="repeat">
+      <a:schemeClr val="lt1"/>
+    </dgm:linClrLst>
+    <dgm:effectClrLst/>
+    <dgm:txLinClrLst/>
+    <dgm:txFillClrLst meth="repeat">
+      <a:schemeClr val="lt1"/>
+    </dgm:txFillClrLst>
+    <dgm:txEffectClrLst/>
+  </dgm:styleLbl>
+  <dgm:styleLbl name="sibTrans1D1">
+    <dgm:fillClrLst/>
+    <dgm:linClrLst>
+      <a:schemeClr val="accent5"/>
+      <a:schemeClr val="accent6"/>
+    </dgm:linClrLst>
+    <dgm:effectClrLst/>
+    <dgm:txLinClrLst/>
+    <dgm:txFillClrLst meth="repeat">
+      <a:schemeClr val="tx1"/>
+    </dgm:txFillClrLst>
+    <dgm:txEffectClrLst/>
+  </dgm:styleLbl>
+  <dgm:styleLbl name="callout">
+    <dgm:fillClrLst meth="repeat">
+      <a:schemeClr val="accent5"/>
+    </dgm:fillClrLst>
+    <dgm:linClrLst meth="repeat">
+      <a:schemeClr val="accent5">
+        <a:tint val="50000"/>
+      </a:schemeClr>
+    </dgm:linClrLst>
+    <dgm:effectClrLst/>
+    <dgm:txLinClrLst/>
+    <dgm:txFillClrLst meth="repeat">
+      <a:schemeClr val="tx1"/>
+    </dgm:txFillClrLst>
+    <dgm:txEffectClrLst/>
+  </dgm:styleLbl>
+  <dgm:styleLbl name="asst0">
+    <dgm:fillClrLst meth="repeat">
+      <a:schemeClr val="accent5"/>
+    </dgm:fillClrLst>
+    <dgm:linClrLst meth="repeat">
+      <a:schemeClr val="lt1">
+        <a:shade val="80000"/>
+      </a:schemeClr>
+    </dgm:linClrLst>
+    <dgm:effectClrLst/>
+    <dgm:txLinClrLst/>
+    <dgm:txFillClrLst/>
+    <dgm:txEffectClrLst/>
+  </dgm:styleLbl>
+  <dgm:styleLbl name="asst1">
+    <dgm:fillClrLst meth="repeat">
+      <a:schemeClr val="accent6"/>
+    </dgm:fillClrLst>
+    <dgm:linClrLst meth="repeat">
+      <a:schemeClr val="lt1">
+        <a:shade val="80000"/>
+      </a:schemeClr>
+    </dgm:linClrLst>
+    <dgm:effectClrLst/>
+    <dgm:txLinClrLst/>
+    <dgm:txFillClrLst/>
+    <dgm:txEffectClrLst/>
+  </dgm:styleLbl>
+  <dgm:styleLbl name="asst2">
+    <dgm:fillClrLst>
+      <a:schemeClr val="accent1"/>
+    </dgm:fillClrLst>
+    <dgm:linClrLst meth="repeat">
+      <a:schemeClr val="lt1"/>
+    </dgm:linClrLst>
+    <dgm:effectClrLst/>
+    <dgm:txLinClrLst/>
+    <dgm:txFillClrLst/>
+    <dgm:txEffectClrLst/>
+  </dgm:styleLbl>
+  <dgm:styleLbl name="asst3">
+    <dgm:fillClrLst>
+      <a:schemeClr val="accent2"/>
+    </dgm:fillClrLst>
+    <dgm:linClrLst meth="repeat">
+      <a:schemeClr val="lt1"/>
+    </dgm:linClrLst>
+    <dgm:effectClrLst/>
+    <dgm:txLinClrLst/>
+    <dgm:txFillClrLst/>
+    <dgm:txEffectClrLst/>
+  </dgm:styleLbl>
+  <dgm:styleLbl name="asst4">
+    <dgm:fillClrLst>
+      <a:schemeClr val="accent3"/>
+    </dgm:fillClrLst>
+    <dgm:linClrLst meth="repeat">
+      <a:schemeClr val="lt1"/>
+    </dgm:linClrLst>
+    <dgm:effectClrLst/>
+    <dgm:txLinClrLst/>
+    <dgm:txFillClrLst/>
+    <dgm:txEffectClrLst/>
+  </dgm:styleLbl>
+  <dgm:styleLbl name="parChTrans2D1">
+    <dgm:fillClrLst meth="repeat">
+      <a:schemeClr val="accent5"/>
+    </dgm:fillClrLst>
+    <dgm:linClrLst meth="repeat">
+      <a:schemeClr val="lt1"/>
+    </dgm:linClrLst>
+    <dgm:effectClrLst/>
+    <dgm:txLinClrLst/>
+    <dgm:txFillClrLst meth="repeat">
+      <a:schemeClr val="lt1"/>
+    </dgm:txFillClrLst>
+    <dgm:txEffectClrLst/>
+  </dgm:styleLbl>
+  <dgm:styleLbl name="parChTrans2D2">
+    <dgm:fillClrLst meth="repeat">
+      <a:schemeClr val="accent6"/>
+    </dgm:fillClrLst>
+    <dgm:linClrLst meth="repeat">
+      <a:schemeClr val="lt1"/>
+    </dgm:linClrLst>
+    <dgm:effectClrLst/>
+    <dgm:txLinClrLst/>
+    <dgm:txFillClrLst/>
+    <dgm:txEffectClrLst/>
+  </dgm:styleLbl>
+  <dgm:styleLbl name="parChTrans2D3">
+    <dgm:fillClrLst meth="repeat">
+      <a:schemeClr val="accent6"/>
+    </dgm:fillClrLst>
+    <dgm:linClrLst meth="repeat">
+      <a:schemeClr val="lt1"/>
+    </dgm:linClrLst>
+    <dgm:effectClrLst/>
+    <dgm:txLinClrLst/>
+    <dgm:txFillClrLst/>
+    <dgm:txEffectClrLst/>
+  </dgm:styleLbl>
+  <dgm:styleLbl name="parChTrans2D4">
+    <dgm:fillClrLst meth="repeat">
+      <a:schemeClr val="accent1"/>
+    </dgm:fillClrLst>
+    <dgm:linClrLst meth="repeat">
+      <a:schemeClr val="lt1"/>
+    </dgm:linClrLst>
+    <dgm:effectClrLst/>
+    <dgm:txLinClrLst/>
+    <dgm:txFillClrLst meth="repeat">
+      <a:schemeClr val="lt1"/>
+    </dgm:txFillClrLst>
+    <dgm:txEffectClrLst/>
+  </dgm:styleLbl>
+  <dgm:styleLbl name="parChTrans1D1">
+    <dgm:fillClrLst meth="repeat">
+      <a:schemeClr val="accent5"/>
+    </dgm:fillClrLst>
+    <dgm:linClrLst meth="repeat">
+      <a:schemeClr val="accent5"/>
+    </dgm:linClrLst>
+    <dgm:effectClrLst/>
+    <dgm:txLinClrLst/>
+    <dgm:txFillClrLst meth="repeat">
+      <a:schemeClr val="tx1"/>
+    </dgm:txFillClrLst>
+    <dgm:txEffectClrLst/>
+  </dgm:styleLbl>
+  <dgm:styleLbl name="parChTrans1D2">
+    <dgm:fillClrLst meth="repeat">
+      <a:schemeClr val="accent6">
+        <a:tint val="90000"/>
+      </a:schemeClr>
+    </dgm:fillClrLst>
+    <dgm:linClrLst meth="repeat">
+      <a:schemeClr val="accent6"/>
+    </dgm:linClrLst>
+    <dgm:effectClrLst/>
+    <dgm:txLinClrLst/>
+    <dgm:txFillClrLst meth="repeat">
+      <a:schemeClr val="tx1"/>
+    </dgm:txFillClrLst>
+    <dgm:txEffectClrLst/>
+  </dgm:styleLbl>
+  <dgm:styleLbl name="parChTrans1D3">
+    <dgm:fillClrLst meth="repeat">
+      <a:schemeClr val="accent6">
+        <a:tint val="70000"/>
+      </a:schemeClr>
+    </dgm:fillClrLst>
+    <dgm:linClrLst meth="repeat">
+      <a:schemeClr val="accent1"/>
+    </dgm:linClrLst>
+    <dgm:effectClrLst/>
+    <dgm:txLinClrLst/>
+    <dgm:txFillClrLst meth="repeat">
+      <a:schemeClr val="tx1"/>
+    </dgm:txFillClrLst>
+    <dgm:txEffectClrLst/>
+  </dgm:styleLbl>
+  <dgm:styleLbl name="parChTrans1D4">
+    <dgm:fillClrLst meth="repeat">
+      <a:schemeClr val="accent6">
+        <a:tint val="50000"/>
+      </a:schemeClr>
+    </dgm:fillClrLst>
+    <dgm:linClrLst meth="repeat">
+      <a:schemeClr val="accent2"/>
+    </dgm:linClrLst>
+    <dgm:effectClrLst/>
+    <dgm:txLinClrLst/>
+    <dgm:txFillClrLst meth="repeat">
+      <a:schemeClr val="tx1"/>
+    </dgm:txFillClrLst>
+    <dgm:txEffectClrLst/>
+  </dgm:styleLbl>
+  <dgm:styleLbl name="fgAcc1">
+    <dgm:fillClrLst meth="repeat">
+      <a:schemeClr val="lt1">
+        <a:alpha val="90000"/>
+      </a:schemeClr>
+    </dgm:fillClrLst>
+    <dgm:linClrLst>
+      <a:schemeClr val="accent5"/>
+      <a:schemeClr val="accent6"/>
+    </dgm:linClrLst>
+    <dgm:effectClrLst/>
+    <dgm:txLinClrLst/>
+    <dgm:txFillClrLst meth="repeat">
+      <a:schemeClr val="dk1"/>
+    </dgm:txFillClrLst>
+    <dgm:txEffectClrLst/>
+  </dgm:styleLbl>
+  <dgm:styleLbl name="conFgAcc1">
+    <dgm:fillClrLst meth="repeat">
+      <a:schemeClr val="lt1">
+        <a:alpha val="90000"/>
+      </a:schemeClr>
+    </dgm:fillClrLst>
+    <dgm:linClrLst>
+      <a:schemeClr val="accent5"/>
+      <a:schemeClr val="accent6"/>
+    </dgm:linClrLst>
+    <dgm:effectClrLst/>
+    <dgm:txLinClrLst/>
+    <dgm:txFillClrLst meth="repeat">
+      <a:schemeClr val="dk1"/>
+    </dgm:txFillClrLst>
+    <dgm:txEffectClrLst/>
+  </dgm:styleLbl>
+  <dgm:styleLbl name="alignAcc1">
+    <dgm:fillClrLst meth="repeat">
+      <a:schemeClr val="lt1">
+        <a:alpha val="90000"/>
+      </a:schemeClr>
+    </dgm:fillClrLst>
+    <dgm:linClrLst>
+      <a:schemeClr val="accent5"/>
+      <a:schemeClr val="accent6"/>
+    </dgm:linClrLst>
+    <dgm:effectClrLst/>
+    <dgm:txLinClrLst/>
+    <dgm:txFillClrLst meth="repeat">
+      <a:schemeClr val="dk1"/>
+    </dgm:txFillClrLst>
+    <dgm:txEffectClrLst/>
+  </dgm:styleLbl>
+  <dgm:styleLbl name="trAlignAcc1">
+    <dgm:fillClrLst meth="repeat">
+      <a:schemeClr val="lt1">
+        <a:alpha val="40000"/>
+      </a:schemeClr>
+    </dgm:fillClrLst>
+    <dgm:linClrLst meth="repeat">
+      <a:schemeClr val="accent5"/>
+    </dgm:linClrLst>
+    <dgm:effectClrLst/>
+    <dgm:txLinClrLst/>
+    <dgm:txFillClrLst meth="repeat">
+      <a:schemeClr val="dk1"/>
+    </dgm:txFillClrLst>
+    <dgm:txEffectClrLst/>
+  </dgm:styleLbl>
+  <dgm:styleLbl name="bgAcc1">
+    <dgm:fillClrLst meth="repeat">
+      <a:schemeClr val="lt1">
+        <a:alpha val="90000"/>
+      </a:schemeClr>
+    </dgm:fillClrLst>
+    <dgm:linClrLst>
+      <a:schemeClr val="accent5"/>
+      <a:schemeClr val="accent6"/>
+    </dgm:linClrLst>
+    <dgm:effectClrLst/>
+    <dgm:txLinClrLst/>
+    <dgm:txFillClrLst meth="repeat">
+      <a:schemeClr val="dk1"/>
+    </dgm:txFillClrLst>
+    <dgm:txEffectClrLst/>
+  </dgm:styleLbl>
+  <dgm:styleLbl name="solidFgAcc1">
+    <dgm:fillClrLst meth="repeat">
+      <a:schemeClr val="lt1"/>
+    </dgm:fillClrLst>
+    <dgm:linClrLst>
+      <a:schemeClr val="accent5"/>
+      <a:schemeClr val="accent6"/>
+    </dgm:linClrLst>
+    <dgm:effectClrLst/>
+    <dgm:txLinClrLst/>
+    <dgm:txFillClrLst meth="repeat">
+      <a:schemeClr val="dk1"/>
+    </dgm:txFillClrLst>
+    <dgm:txEffectClrLst/>
+  </dgm:styleLbl>
+  <dgm:styleLbl name="solidAlignAcc1">
+    <dgm:fillClrLst meth="repeat">
+      <a:schemeClr val="lt1"/>
+    </dgm:fillClrLst>
+    <dgm:linClrLst>
+      <a:schemeClr val="accent5"/>
+      <a:schemeClr val="accent6"/>
+    </dgm:linClrLst>
+    <dgm:effectClrLst/>
+    <dgm:txLinClrLst/>
+    <dgm:txFillClrLst meth="repeat">
+      <a:schemeClr val="dk1"/>
+    </dgm:txFillClrLst>
+    <dgm:txEffectClrLst/>
+  </dgm:styleLbl>
+  <dgm:styleLbl name="solidBgAcc1">
+    <dgm:fillClrLst meth="repeat">
+      <a:schemeClr val="lt1"/>
+    </dgm:fillClrLst>
+    <dgm:linClrLst>
+      <a:schemeClr val="accent5"/>
+      <a:schemeClr val="accent6"/>
+    </dgm:linClrLst>
+    <dgm:effectClrLst/>
+    <dgm:txLinClrLst/>
+    <dgm:txFillClrLst meth="repeat">
+      <a:schemeClr val="dk1"/>
+    </dgm:txFillClrLst>
+    <dgm:txEffectClrLst/>
+  </dgm:styleLbl>
+  <dgm:styleLbl name="fgAccFollowNode1">
+    <dgm:fillClrLst>
+      <a:schemeClr val="accent5">
+        <a:tint val="40000"/>
+        <a:alpha val="90000"/>
+      </a:schemeClr>
+      <a:schemeClr val="accent6">
+        <a:tint val="40000"/>
+        <a:alpha val="90000"/>
+      </a:schemeClr>
+    </dgm:fillClrLst>
+    <dgm:linClrLst>
+      <a:schemeClr val="accent5">
+        <a:tint val="40000"/>
+        <a:alpha val="90000"/>
+      </a:schemeClr>
+      <a:schemeClr val="accent5">
+        <a:tint val="40000"/>
+        <a:alpha val="90000"/>
+      </a:schemeClr>
+    </dgm:linClrLst>
+    <dgm:effectClrLst/>
+    <dgm:txLinClrLst/>
+    <dgm:txFillClrLst meth="repeat">
+      <a:schemeClr val="dk1"/>
+    </dgm:txFillClrLst>
+    <dgm:txEffectClrLst/>
+  </dgm:styleLbl>
+  <dgm:styleLbl name="alignAccFollowNode1">
+    <dgm:fillClrLst>
+      <a:schemeClr val="accent5">
+        <a:tint val="40000"/>
+        <a:alpha val="90000"/>
+      </a:schemeClr>
+      <a:schemeClr val="accent6">
+        <a:tint val="40000"/>
+        <a:alpha val="90000"/>
+      </a:schemeClr>
+    </dgm:fillClrLst>
+    <dgm:linClrLst>
+      <a:schemeClr val="accent5">
+        <a:tint val="40000"/>
+        <a:alpha val="90000"/>
+      </a:schemeClr>
+      <a:schemeClr val="accent6">
+        <a:tint val="40000"/>
+        <a:alpha val="90000"/>
+      </a:schemeClr>
+    </dgm:linClrLst>
+    <dgm:effectClrLst/>
+    <dgm:txLinClrLst/>
+    <dgm:txFillClrLst meth="repeat">
+      <a:schemeClr val="dk1"/>
+    </dgm:txFillClrLst>
+    <dgm:txEffectClrLst/>
+  </dgm:styleLbl>
+  <dgm:styleLbl name="bgAccFollowNode1">
+    <dgm:fillClrLst>
+      <a:schemeClr val="accent5">
+        <a:tint val="40000"/>
+        <a:alpha val="90000"/>
+      </a:schemeClr>
+      <a:schemeClr val="accent6">
+        <a:tint val="40000"/>
+        <a:alpha val="90000"/>
+      </a:schemeClr>
+    </dgm:fillClrLst>
+    <dgm:linClrLst>
+      <a:schemeClr val="accent5">
+        <a:tint val="40000"/>
+        <a:alpha val="90000"/>
+      </a:schemeClr>
+      <a:schemeClr val="accent6">
+        <a:tint val="40000"/>
+        <a:alpha val="90000"/>
+      </a:schemeClr>
+    </dgm:linClrLst>
+    <dgm:effectClrLst/>
+    <dgm:txLinClrLst/>
+    <dgm:txFillClrLst meth="repeat">
+      <a:schemeClr val="dk1"/>
+    </dgm:txFillClrLst>
+    <dgm:txEffectClrLst/>
+  </dgm:styleLbl>
+  <dgm:styleLbl name="fgAcc0">
+    <dgm:fillClrLst meth="repeat">
+      <a:schemeClr val="lt1">
+        <a:alpha val="90000"/>
+      </a:schemeClr>
+    </dgm:fillClrLst>
+    <dgm:linClrLst>
+      <a:schemeClr val="accent4"/>
+    </dgm:linClrLst>
+    <dgm:effectClrLst/>
+    <dgm:txLinClrLst/>
+    <dgm:txFillClrLst meth="repeat">
+      <a:schemeClr val="dk1"/>
+    </dgm:txFillClrLst>
+    <dgm:txEffectClrLst/>
+  </dgm:styleLbl>
+  <dgm:styleLbl name="fgAcc2">
+    <dgm:fillClrLst meth="repeat">
+      <a:schemeClr val="lt1">
+        <a:alpha val="90000"/>
+      </a:schemeClr>
+    </dgm:fillClrLst>
+    <dgm:linClrLst>
+      <a:schemeClr val="accent6"/>
+    </dgm:linClrLst>
+    <dgm:effectClrLst/>
+    <dgm:txLinClrLst/>
+    <dgm:txFillClrLst meth="repeat">
+      <a:schemeClr val="dk1"/>
+    </dgm:txFillClrLst>
+    <dgm:txEffectClrLst/>
+  </dgm:styleLbl>
+  <dgm:styleLbl name="fgAcc3">
+    <dgm:fillClrLst meth="repeat">
+      <a:schemeClr val="lt1">
+        <a:alpha val="90000"/>
+      </a:schemeClr>
+    </dgm:fillClrLst>
+    <dgm:linClrLst>
+      <a:schemeClr val="accent1"/>
+    </dgm:linClrLst>
+    <dgm:effectClrLst/>
+    <dgm:txLinClrLst/>
+    <dgm:txFillClrLst meth="repeat">
+      <a:schemeClr val="dk1"/>
+    </dgm:txFillClrLst>
+    <dgm:txEffectClrLst/>
+  </dgm:styleLbl>
+  <dgm:styleLbl name="fgAcc4">
+    <dgm:fillClrLst meth="repeat">
+      <a:schemeClr val="lt1">
+        <a:alpha val="90000"/>
+      </a:schemeClr>
+    </dgm:fillClrLst>
+    <dgm:linClrLst>
+      <a:schemeClr val="accent2"/>
+    </dgm:linClrLst>
+    <dgm:effectClrLst/>
+    <dgm:txLinClrLst/>
+    <dgm:txFillClrLst meth="repeat">
+      <a:schemeClr val="dk1"/>
+    </dgm:txFillClrLst>
+    <dgm:txEffectClrLst/>
+  </dgm:styleLbl>
+  <dgm:styleLbl name="bgShp">
+    <dgm:fillClrLst meth="repeat">
+      <a:schemeClr val="accent5">
+        <a:tint val="40000"/>
+      </a:schemeClr>
+    </dgm:fillClrLst>
+    <dgm:linClrLst meth="repeat">
+      <a:schemeClr val="dk1"/>
+    </dgm:linClrLst>
+    <dgm:effectClrLst/>
+    <dgm:txLinClrLst/>
+    <dgm:txFillClrLst meth="repeat">
+      <a:schemeClr val="dk1"/>
+    </dgm:txFillClrLst>
+    <dgm:txEffectClrLst/>
+  </dgm:styleLbl>
+  <dgm:styleLbl name="dkBgShp">
+    <dgm:fillClrLst meth="repeat">
+      <a:schemeClr val="accent5">
+        <a:shade val="90000"/>
+      </a:schemeClr>
+    </dgm:fillClrLst>
+    <dgm:linClrLst meth="repeat">
+      <a:schemeClr val="dk1"/>
+    </dgm:linClrLst>
+    <dgm:effectClrLst/>
+    <dgm:txLinClrLst/>
+    <dgm:txFillClrLst meth="repeat">
+      <a:schemeClr val="lt1"/>
+    </dgm:txFillClrLst>
+    <dgm:txEffectClrLst/>
+  </dgm:styleLbl>
+  <dgm:styleLbl name="trBgShp">
+    <dgm:fillClrLst meth="repeat">
+      <a:schemeClr val="accent5">
+        <a:tint val="50000"/>
+        <a:alpha val="40000"/>
+      </a:schemeClr>
+    </dgm:fillClrLst>
+    <dgm:linClrLst meth="repeat">
+      <a:schemeClr val="accent5"/>
+    </dgm:linClrLst>
+    <dgm:effectClrLst/>
+    <dgm:txLinClrLst/>
+    <dgm:txFillClrLst meth="repeat">
+      <a:schemeClr val="lt1"/>
+    </dgm:txFillClrLst>
+    <dgm:txEffectClrLst/>
+  </dgm:styleLbl>
+  <dgm:styleLbl name="fgShp">
+    <dgm:fillClrLst meth="repeat">
+      <a:schemeClr val="accent5">
+        <a:tint val="40000"/>
+      </a:schemeClr>
+    </dgm:fillClrLst>
+    <dgm:linClrLst meth="repeat">
+      <a:schemeClr val="lt1"/>
+    </dgm:linClrLst>
+    <dgm:effectClrLst/>
+    <dgm:txLinClrLst/>
+    <dgm:txFillClrLst meth="repeat">
+      <a:schemeClr val="dk1"/>
+    </dgm:txFillClrLst>
+    <dgm:txEffectClrLst/>
+  </dgm:styleLbl>
+  <dgm:styleLbl name="revTx">
+    <dgm:fillClrLst meth="repeat">
+      <a:schemeClr val="lt1">
+        <a:alpha val="0"/>
+      </a:schemeClr>
+    </dgm:fillClrLst>
+    <dgm:linClrLst meth="repeat">
+      <a:schemeClr val="dk1">
+        <a:alpha val="0"/>
+      </a:schemeClr>
+    </dgm:linClrLst>
+    <dgm:effectClrLst/>
+    <dgm:txLinClrLst/>
+    <dgm:txFillClrLst meth="repeat">
+      <a:schemeClr val="tx1"/>
+    </dgm:txFillClrLst>
+    <dgm:txEffectClrLst/>
+  </dgm:styleLbl>
+</dgm:colorsDef>
+</file>
+
+<file path=ppt/diagrams/data1.xml><?xml version="1.0" encoding="utf-8"?>
+<dgm:dataModel xmlns:dgm="http://schemas.openxmlformats.org/drawingml/2006/diagram" xmlns:a="http://schemas.openxmlformats.org/drawingml/2006/main">
+  <dgm:ptLst>
+    <dgm:pt modelId="{57A295F8-549D-DD46-AC4E-81605EB084AB}" type="doc">
+      <dgm:prSet loTypeId="urn:microsoft.com/office/officeart/2005/8/layout/venn2" loCatId="hierarchy" qsTypeId="urn:microsoft.com/office/officeart/2005/8/quickstyle/simple1" qsCatId="simple" csTypeId="urn:microsoft.com/office/officeart/2005/8/colors/colorful5" csCatId="colorful" phldr="1"/>
+      <dgm:spPr/>
+      <dgm:t>
+        <a:bodyPr/>
+        <a:lstStyle/>
+        <a:p>
+          <a:endParaRPr lang="en-US"/>
+        </a:p>
+      </dgm:t>
+    </dgm:pt>
+    <dgm:pt modelId="{91DE59EE-023C-D742-A6CC-BB1348BB0A85}">
+      <dgm:prSet phldrT="[Text]" custT="1"/>
+      <dgm:spPr>
+        <a:solidFill>
+          <a:srgbClr val="0070C0"/>
+        </a:solidFill>
+        <a:ln w="25400">
+          <a:solidFill>
+            <a:schemeClr val="tx1"/>
+          </a:solidFill>
+        </a:ln>
+      </dgm:spPr>
+      <dgm:t>
+        <a:bodyPr/>
+        <a:lstStyle/>
+        <a:p>
+          <a:r>
+            <a:rPr lang="en-US" sz="2000" dirty="0">
+              <a:solidFill>
+                <a:schemeClr val="tx1"/>
+              </a:solidFill>
+            </a:rPr>
+            <a:t>Triggered </a:t>
+          </a:r>
+          <a:r>
+            <a:rPr lang="en-US" sz="2000" dirty="0" err="1">
+              <a:solidFill>
+                <a:schemeClr val="tx1"/>
+              </a:solidFill>
+            </a:rPr>
+            <a:t>Statecharts</a:t>
+          </a:r>
+          <a:r>
+            <a:rPr lang="en-US" sz="2000" dirty="0">
+              <a:solidFill>
+                <a:schemeClr val="tx1"/>
+              </a:solidFill>
+            </a:rPr>
+            <a:t> </a:t>
+          </a:r>
+        </a:p>
+      </dgm:t>
+    </dgm:pt>
+    <dgm:pt modelId="{3CB4A6B5-524D-E543-9A29-5F2ACF4420F0}" type="parTrans" cxnId="{9BF7F4AA-FF47-F24D-9612-3FBCD803C100}">
+      <dgm:prSet/>
+      <dgm:spPr/>
+      <dgm:t>
+        <a:bodyPr/>
+        <a:lstStyle/>
+        <a:p>
+          <a:endParaRPr lang="en-US" sz="3200">
+            <a:solidFill>
+              <a:schemeClr val="tx1"/>
+            </a:solidFill>
+          </a:endParaRPr>
+        </a:p>
+      </dgm:t>
+    </dgm:pt>
+    <dgm:pt modelId="{0883A0D5-8EEE-8443-8C6C-317BB6F3E60A}" type="sibTrans" cxnId="{9BF7F4AA-FF47-F24D-9612-3FBCD803C100}">
+      <dgm:prSet/>
+      <dgm:spPr/>
+      <dgm:t>
+        <a:bodyPr/>
+        <a:lstStyle/>
+        <a:p>
+          <a:endParaRPr lang="en-US" sz="3200">
+            <a:solidFill>
+              <a:schemeClr val="tx1"/>
+            </a:solidFill>
+          </a:endParaRPr>
+        </a:p>
+      </dgm:t>
+    </dgm:pt>
+    <dgm:pt modelId="{6B0ED2C5-9DF4-184C-919C-66F9622CA7CC}">
+      <dgm:prSet phldrT="[Text]" custT="1"/>
+      <dgm:spPr>
+        <a:solidFill>
+          <a:srgbClr val="13CFC5"/>
+        </a:solidFill>
+        <a:ln w="25400">
+          <a:solidFill>
+            <a:schemeClr val="tx1"/>
+          </a:solidFill>
+        </a:ln>
+      </dgm:spPr>
+      <dgm:t>
+        <a:bodyPr/>
+        <a:lstStyle/>
+        <a:p>
+          <a:r>
+            <a:rPr lang="en-US" sz="2000" dirty="0">
+              <a:solidFill>
+                <a:schemeClr val="tx1"/>
+              </a:solidFill>
+            </a:rPr>
+            <a:t>Run-to-Completion Schedule </a:t>
+          </a:r>
+        </a:p>
+      </dgm:t>
+    </dgm:pt>
+    <dgm:pt modelId="{A82A0F2F-E859-8242-A8AA-57E7AF9B47C5}" type="parTrans" cxnId="{84C2BB77-9B82-8B43-9E89-C0F48816D5EF}">
+      <dgm:prSet/>
+      <dgm:spPr/>
+      <dgm:t>
+        <a:bodyPr/>
+        <a:lstStyle/>
+        <a:p>
+          <a:endParaRPr lang="en-US" sz="3200">
+            <a:solidFill>
+              <a:schemeClr val="tx1"/>
+            </a:solidFill>
+          </a:endParaRPr>
+        </a:p>
+      </dgm:t>
+    </dgm:pt>
+    <dgm:pt modelId="{81F39CA1-D376-444F-9DD1-D84665AD6892}" type="sibTrans" cxnId="{84C2BB77-9B82-8B43-9E89-C0F48816D5EF}">
+      <dgm:prSet/>
+      <dgm:spPr/>
+      <dgm:t>
+        <a:bodyPr/>
+        <a:lstStyle/>
+        <a:p>
+          <a:endParaRPr lang="en-US" sz="3200">
+            <a:solidFill>
+              <a:schemeClr val="tx1"/>
+            </a:solidFill>
+          </a:endParaRPr>
+        </a:p>
+      </dgm:t>
+    </dgm:pt>
+    <dgm:pt modelId="{DFAA4923-C1D4-C245-AD6B-A6BDB671A634}">
+      <dgm:prSet phldrT="[Text]" custT="1"/>
+      <dgm:spPr>
+        <a:solidFill>
+          <a:srgbClr val="92D050"/>
+        </a:solidFill>
+        <a:ln w="25400">
+          <a:solidFill>
+            <a:schemeClr val="tx1"/>
+          </a:solidFill>
+        </a:ln>
+      </dgm:spPr>
+      <dgm:t>
+        <a:bodyPr/>
+        <a:lstStyle/>
+        <a:p>
+          <a:r>
+            <a:rPr lang="en-US" sz="2000" dirty="0">
+              <a:solidFill>
+                <a:schemeClr val="tx1"/>
+              </a:solidFill>
+            </a:rPr>
+            <a:t>Untriggered </a:t>
+          </a:r>
+          <a:r>
+            <a:rPr lang="en-US" sz="2000" dirty="0" err="1">
+              <a:solidFill>
+                <a:schemeClr val="tx1"/>
+              </a:solidFill>
+            </a:rPr>
+            <a:t>Statecharts</a:t>
+          </a:r>
+          <a:r>
+            <a:rPr lang="en-US" sz="2000" dirty="0">
+              <a:solidFill>
+                <a:schemeClr val="tx1"/>
+              </a:solidFill>
+            </a:rPr>
+            <a:t> </a:t>
+          </a:r>
+        </a:p>
+      </dgm:t>
+    </dgm:pt>
+    <dgm:pt modelId="{AB937FC1-48D2-B24F-A578-2D7B10C40749}" type="parTrans" cxnId="{87C6D9CE-3264-5E45-B3BB-5FED7462BCE4}">
+      <dgm:prSet/>
+      <dgm:spPr/>
+      <dgm:t>
+        <a:bodyPr/>
+        <a:lstStyle/>
+        <a:p>
+          <a:endParaRPr lang="en-US" sz="3200">
+            <a:solidFill>
+              <a:schemeClr val="tx1"/>
+            </a:solidFill>
+          </a:endParaRPr>
+        </a:p>
+      </dgm:t>
+    </dgm:pt>
+    <dgm:pt modelId="{1CDFF836-1255-2F41-AC54-EBF392610ECE}" type="sibTrans" cxnId="{87C6D9CE-3264-5E45-B3BB-5FED7462BCE4}">
+      <dgm:prSet/>
+      <dgm:spPr/>
+      <dgm:t>
+        <a:bodyPr/>
+        <a:lstStyle/>
+        <a:p>
+          <a:endParaRPr lang="en-US" sz="3200">
+            <a:solidFill>
+              <a:schemeClr val="tx1"/>
+            </a:solidFill>
+          </a:endParaRPr>
+        </a:p>
+      </dgm:t>
+    </dgm:pt>
+    <dgm:pt modelId="{D433C0A0-DDC9-ED45-86F7-F9A4882DC59F}" type="pres">
+      <dgm:prSet presAssocID="{57A295F8-549D-DD46-AC4E-81605EB084AB}" presName="Name0" presStyleCnt="0">
+        <dgm:presLayoutVars>
+          <dgm:chMax val="7"/>
+          <dgm:resizeHandles val="exact"/>
+        </dgm:presLayoutVars>
+      </dgm:prSet>
+      <dgm:spPr/>
+    </dgm:pt>
+    <dgm:pt modelId="{0E92C5ED-EEDC-1649-8F24-01F606204B4A}" type="pres">
+      <dgm:prSet presAssocID="{57A295F8-549D-DD46-AC4E-81605EB084AB}" presName="comp1" presStyleCnt="0"/>
+      <dgm:spPr/>
+    </dgm:pt>
+    <dgm:pt modelId="{E06EA60B-CA3D-FE4F-AAE0-F9609C53D53B}" type="pres">
+      <dgm:prSet presAssocID="{57A295F8-549D-DD46-AC4E-81605EB084AB}" presName="circle1" presStyleLbl="node1" presStyleIdx="0" presStyleCnt="3"/>
+      <dgm:spPr/>
+    </dgm:pt>
+    <dgm:pt modelId="{6F090C8F-5643-EC44-B61B-7CE26E795661}" type="pres">
+      <dgm:prSet presAssocID="{57A295F8-549D-DD46-AC4E-81605EB084AB}" presName="c1text" presStyleLbl="node1" presStyleIdx="0" presStyleCnt="3">
+        <dgm:presLayoutVars>
+          <dgm:bulletEnabled val="1"/>
+        </dgm:presLayoutVars>
+      </dgm:prSet>
+      <dgm:spPr/>
+    </dgm:pt>
+    <dgm:pt modelId="{F1E5A39D-E022-D74A-865F-9D84081AE836}" type="pres">
+      <dgm:prSet presAssocID="{57A295F8-549D-DD46-AC4E-81605EB084AB}" presName="comp2" presStyleCnt="0"/>
+      <dgm:spPr/>
+    </dgm:pt>
+    <dgm:pt modelId="{F61E44BD-2308-4546-A4CF-70FA4CB2E637}" type="pres">
+      <dgm:prSet presAssocID="{57A295F8-549D-DD46-AC4E-81605EB084AB}" presName="circle2" presStyleLbl="node1" presStyleIdx="1" presStyleCnt="3"/>
+      <dgm:spPr/>
+    </dgm:pt>
+    <dgm:pt modelId="{EC95B82B-81BA-8942-BAB1-3E7DDC6ED80E}" type="pres">
+      <dgm:prSet presAssocID="{57A295F8-549D-DD46-AC4E-81605EB084AB}" presName="c2text" presStyleLbl="node1" presStyleIdx="1" presStyleCnt="3">
+        <dgm:presLayoutVars>
+          <dgm:bulletEnabled val="1"/>
+        </dgm:presLayoutVars>
+      </dgm:prSet>
+      <dgm:spPr/>
+    </dgm:pt>
+    <dgm:pt modelId="{A4EABCBC-C234-6747-A964-8302751106B8}" type="pres">
+      <dgm:prSet presAssocID="{57A295F8-549D-DD46-AC4E-81605EB084AB}" presName="comp3" presStyleCnt="0"/>
+      <dgm:spPr/>
+    </dgm:pt>
+    <dgm:pt modelId="{41794503-7CF2-FC43-810A-63D909211019}" type="pres">
+      <dgm:prSet presAssocID="{57A295F8-549D-DD46-AC4E-81605EB084AB}" presName="circle3" presStyleLbl="node1" presStyleIdx="2" presStyleCnt="3"/>
+      <dgm:spPr/>
+    </dgm:pt>
+    <dgm:pt modelId="{0D0ABFFA-B21A-8C45-BF64-6B4D66262382}" type="pres">
+      <dgm:prSet presAssocID="{57A295F8-549D-DD46-AC4E-81605EB084AB}" presName="c3text" presStyleLbl="node1" presStyleIdx="2" presStyleCnt="3">
+        <dgm:presLayoutVars>
+          <dgm:bulletEnabled val="1"/>
+        </dgm:presLayoutVars>
+      </dgm:prSet>
+      <dgm:spPr/>
+    </dgm:pt>
+  </dgm:ptLst>
+  <dgm:cxnLst>
+    <dgm:cxn modelId="{48326F13-FFF1-A241-8E25-ACB02A92E74B}" type="presOf" srcId="{DFAA4923-C1D4-C245-AD6B-A6BDB671A634}" destId="{41794503-7CF2-FC43-810A-63D909211019}" srcOrd="0" destOrd="0" presId="urn:microsoft.com/office/officeart/2005/8/layout/venn2"/>
+    <dgm:cxn modelId="{59AD3B22-41F2-4D42-B117-1DDA392DD87E}" type="presOf" srcId="{6B0ED2C5-9DF4-184C-919C-66F9622CA7CC}" destId="{F61E44BD-2308-4546-A4CF-70FA4CB2E637}" srcOrd="0" destOrd="0" presId="urn:microsoft.com/office/officeart/2005/8/layout/venn2"/>
+    <dgm:cxn modelId="{84C2BB77-9B82-8B43-9E89-C0F48816D5EF}" srcId="{57A295F8-549D-DD46-AC4E-81605EB084AB}" destId="{6B0ED2C5-9DF4-184C-919C-66F9622CA7CC}" srcOrd="1" destOrd="0" parTransId="{A82A0F2F-E859-8242-A8AA-57E7AF9B47C5}" sibTransId="{81F39CA1-D376-444F-9DD1-D84665AD6892}"/>
+    <dgm:cxn modelId="{6C48957E-5F54-1D4E-B3D1-AC0298B691BA}" type="presOf" srcId="{91DE59EE-023C-D742-A6CC-BB1348BB0A85}" destId="{E06EA60B-CA3D-FE4F-AAE0-F9609C53D53B}" srcOrd="0" destOrd="0" presId="urn:microsoft.com/office/officeart/2005/8/layout/venn2"/>
+    <dgm:cxn modelId="{F53B498D-75F1-214B-81D7-ADCB720F31AE}" type="presOf" srcId="{91DE59EE-023C-D742-A6CC-BB1348BB0A85}" destId="{6F090C8F-5643-EC44-B61B-7CE26E795661}" srcOrd="1" destOrd="0" presId="urn:microsoft.com/office/officeart/2005/8/layout/venn2"/>
+    <dgm:cxn modelId="{A2C0F08F-AE77-934B-93E0-BD0A97C60F10}" type="presOf" srcId="{DFAA4923-C1D4-C245-AD6B-A6BDB671A634}" destId="{0D0ABFFA-B21A-8C45-BF64-6B4D66262382}" srcOrd="1" destOrd="0" presId="urn:microsoft.com/office/officeart/2005/8/layout/venn2"/>
+    <dgm:cxn modelId="{4B1B3CA9-DDC8-384F-BEDF-DC7ED8FC6EE6}" type="presOf" srcId="{6B0ED2C5-9DF4-184C-919C-66F9622CA7CC}" destId="{EC95B82B-81BA-8942-BAB1-3E7DDC6ED80E}" srcOrd="1" destOrd="0" presId="urn:microsoft.com/office/officeart/2005/8/layout/venn2"/>
+    <dgm:cxn modelId="{9BF7F4AA-FF47-F24D-9612-3FBCD803C100}" srcId="{57A295F8-549D-DD46-AC4E-81605EB084AB}" destId="{91DE59EE-023C-D742-A6CC-BB1348BB0A85}" srcOrd="0" destOrd="0" parTransId="{3CB4A6B5-524D-E543-9A29-5F2ACF4420F0}" sibTransId="{0883A0D5-8EEE-8443-8C6C-317BB6F3E60A}"/>
+    <dgm:cxn modelId="{87C6D9CE-3264-5E45-B3BB-5FED7462BCE4}" srcId="{57A295F8-549D-DD46-AC4E-81605EB084AB}" destId="{DFAA4923-C1D4-C245-AD6B-A6BDB671A634}" srcOrd="2" destOrd="0" parTransId="{AB937FC1-48D2-B24F-A578-2D7B10C40749}" sibTransId="{1CDFF836-1255-2F41-AC54-EBF392610ECE}"/>
+    <dgm:cxn modelId="{270B03D4-B696-4645-9011-78030BEE8A07}" type="presOf" srcId="{57A295F8-549D-DD46-AC4E-81605EB084AB}" destId="{D433C0A0-DDC9-ED45-86F7-F9A4882DC59F}" srcOrd="0" destOrd="0" presId="urn:microsoft.com/office/officeart/2005/8/layout/venn2"/>
+    <dgm:cxn modelId="{4336002F-3C6D-D54E-A1DF-93FCB7FA6F9E}" type="presParOf" srcId="{D433C0A0-DDC9-ED45-86F7-F9A4882DC59F}" destId="{0E92C5ED-EEDC-1649-8F24-01F606204B4A}" srcOrd="0" destOrd="0" presId="urn:microsoft.com/office/officeart/2005/8/layout/venn2"/>
+    <dgm:cxn modelId="{3E2FC0A6-78D7-C44D-92D6-768594AB5FA2}" type="presParOf" srcId="{0E92C5ED-EEDC-1649-8F24-01F606204B4A}" destId="{E06EA60B-CA3D-FE4F-AAE0-F9609C53D53B}" srcOrd="0" destOrd="0" presId="urn:microsoft.com/office/officeart/2005/8/layout/venn2"/>
+    <dgm:cxn modelId="{AC5FF415-92F4-5E44-9332-A603A0F21D72}" type="presParOf" srcId="{0E92C5ED-EEDC-1649-8F24-01F606204B4A}" destId="{6F090C8F-5643-EC44-B61B-7CE26E795661}" srcOrd="1" destOrd="0" presId="urn:microsoft.com/office/officeart/2005/8/layout/venn2"/>
+    <dgm:cxn modelId="{B14926AA-1CB1-D940-9157-627304C48465}" type="presParOf" srcId="{D433C0A0-DDC9-ED45-86F7-F9A4882DC59F}" destId="{F1E5A39D-E022-D74A-865F-9D84081AE836}" srcOrd="1" destOrd="0" presId="urn:microsoft.com/office/officeart/2005/8/layout/venn2"/>
+    <dgm:cxn modelId="{E1E32675-C2B4-5847-B56F-23855D2BAF7D}" type="presParOf" srcId="{F1E5A39D-E022-D74A-865F-9D84081AE836}" destId="{F61E44BD-2308-4546-A4CF-70FA4CB2E637}" srcOrd="0" destOrd="0" presId="urn:microsoft.com/office/officeart/2005/8/layout/venn2"/>
+    <dgm:cxn modelId="{340BFBFE-E739-DB4D-85AD-A9B008DC4F20}" type="presParOf" srcId="{F1E5A39D-E022-D74A-865F-9D84081AE836}" destId="{EC95B82B-81BA-8942-BAB1-3E7DDC6ED80E}" srcOrd="1" destOrd="0" presId="urn:microsoft.com/office/officeart/2005/8/layout/venn2"/>
+    <dgm:cxn modelId="{2AE9A2A8-BF53-E340-8809-CB32C7AD1B83}" type="presParOf" srcId="{D433C0A0-DDC9-ED45-86F7-F9A4882DC59F}" destId="{A4EABCBC-C234-6747-A964-8302751106B8}" srcOrd="2" destOrd="0" presId="urn:microsoft.com/office/officeart/2005/8/layout/venn2"/>
+    <dgm:cxn modelId="{644AA0C8-6915-0442-BD59-8D3D5ED1D1F8}" type="presParOf" srcId="{A4EABCBC-C234-6747-A964-8302751106B8}" destId="{41794503-7CF2-FC43-810A-63D909211019}" srcOrd="0" destOrd="0" presId="urn:microsoft.com/office/officeart/2005/8/layout/venn2"/>
+    <dgm:cxn modelId="{0A992E82-3D8C-874B-BD59-580C665F6589}" type="presParOf" srcId="{A4EABCBC-C234-6747-A964-8302751106B8}" destId="{0D0ABFFA-B21A-8C45-BF64-6B4D66262382}" srcOrd="1" destOrd="0" presId="urn:microsoft.com/office/officeart/2005/8/layout/venn2"/>
+  </dgm:cxnLst>
+  <dgm:bg/>
+  <dgm:whole/>
+  <dgm:extLst>
+    <a:ext uri="http://schemas.microsoft.com/office/drawing/2008/diagram">
+      <dsp:dataModelExt xmlns:dsp="http://schemas.microsoft.com/office/drawing/2008/diagram" relId="rId7" minVer="http://schemas.openxmlformats.org/drawingml/2006/diagram"/>
+    </a:ext>
+  </dgm:extLst>
+</dgm:dataModel>
+</file>
+
+<file path=ppt/diagrams/drawing1.xml><?xml version="1.0" encoding="utf-8"?>
+<dsp:drawing xmlns:dgm="http://schemas.openxmlformats.org/drawingml/2006/diagram" xmlns:dsp="http://schemas.microsoft.com/office/drawing/2008/diagram" xmlns:a="http://schemas.openxmlformats.org/drawingml/2006/main">
+  <dsp:spTree>
+    <dsp:nvGrpSpPr>
+      <dsp:cNvPr id="0" name=""/>
+      <dsp:cNvGrpSpPr/>
+    </dsp:nvGrpSpPr>
+    <dsp:grpSpPr/>
+    <dsp:sp modelId="{E06EA60B-CA3D-FE4F-AAE0-F9609C53D53B}">
+      <dsp:nvSpPr>
+        <dsp:cNvPr id="0" name=""/>
+        <dsp:cNvSpPr/>
+      </dsp:nvSpPr>
+      <dsp:spPr>
+        <a:xfrm>
+          <a:off x="415130" y="0"/>
+          <a:ext cx="4351338" cy="4351338"/>
+        </a:xfrm>
+        <a:prstGeom prst="ellipse">
+          <a:avLst/>
+        </a:prstGeom>
+        <a:solidFill>
+          <a:srgbClr val="0070C0"/>
+        </a:solidFill>
+        <a:ln w="25400" cap="flat" cmpd="sng" algn="ctr">
+          <a:solidFill>
+            <a:schemeClr val="tx1"/>
+          </a:solidFill>
+          <a:prstDash val="solid"/>
+          <a:miter lim="800000"/>
+        </a:ln>
+        <a:effectLst/>
+      </dsp:spPr>
+      <dsp:style>
+        <a:lnRef idx="2">
+          <a:scrgbClr r="0" g="0" b="0"/>
+        </a:lnRef>
+        <a:fillRef idx="1">
+          <a:scrgbClr r="0" g="0" b="0"/>
+        </a:fillRef>
+        <a:effectRef idx="0">
+          <a:scrgbClr r="0" g="0" b="0"/>
+        </a:effectRef>
+        <a:fontRef idx="minor">
+          <a:schemeClr val="lt1"/>
+        </a:fontRef>
+      </dsp:style>
+      <dsp:txBody>
+        <a:bodyPr spcFirstLastPara="0" vert="horz" wrap="square" lIns="142240" tIns="142240" rIns="142240" bIns="142240" numCol="1" spcCol="1270" anchor="ctr" anchorCtr="0">
+          <a:noAutofit/>
+        </a:bodyPr>
+        <a:lstStyle/>
+        <a:p>
+          <a:pPr marL="0" lvl="0" indent="0" algn="ctr" defTabSz="889000">
+            <a:lnSpc>
+              <a:spcPct val="90000"/>
+            </a:lnSpc>
+            <a:spcBef>
+              <a:spcPct val="0"/>
+            </a:spcBef>
+            <a:spcAft>
+              <a:spcPct val="35000"/>
+            </a:spcAft>
+            <a:buNone/>
+          </a:pPr>
+          <a:r>
+            <a:rPr lang="en-US" sz="2000" kern="1200" dirty="0">
+              <a:solidFill>
+                <a:schemeClr val="tx1"/>
+              </a:solidFill>
+            </a:rPr>
+            <a:t>Triggered </a:t>
+          </a:r>
+          <a:r>
+            <a:rPr lang="en-US" sz="2000" kern="1200" dirty="0" err="1">
+              <a:solidFill>
+                <a:schemeClr val="tx1"/>
+              </a:solidFill>
+            </a:rPr>
+            <a:t>Statecharts</a:t>
+          </a:r>
+          <a:r>
+            <a:rPr lang="en-US" sz="2000" kern="1200" dirty="0">
+              <a:solidFill>
+                <a:schemeClr val="tx1"/>
+              </a:solidFill>
+            </a:rPr>
+            <a:t> </a:t>
+          </a:r>
+        </a:p>
+      </dsp:txBody>
+      <dsp:txXfrm>
+        <a:off x="1830403" y="217566"/>
+        <a:ext cx="1520792" cy="652700"/>
+      </dsp:txXfrm>
+    </dsp:sp>
+    <dsp:sp modelId="{F61E44BD-2308-4546-A4CF-70FA4CB2E637}">
+      <dsp:nvSpPr>
+        <dsp:cNvPr id="0" name=""/>
+        <dsp:cNvSpPr/>
+      </dsp:nvSpPr>
+      <dsp:spPr>
+        <a:xfrm>
+          <a:off x="959048" y="1087834"/>
+          <a:ext cx="3263503" cy="3263503"/>
+        </a:xfrm>
+        <a:prstGeom prst="ellipse">
+          <a:avLst/>
+        </a:prstGeom>
+        <a:solidFill>
+          <a:srgbClr val="13CFC5"/>
+        </a:solidFill>
+        <a:ln w="25400" cap="flat" cmpd="sng" algn="ctr">
+          <a:solidFill>
+            <a:schemeClr val="tx1"/>
+          </a:solidFill>
+          <a:prstDash val="solid"/>
+          <a:miter lim="800000"/>
+        </a:ln>
+        <a:effectLst/>
+      </dsp:spPr>
+      <dsp:style>
+        <a:lnRef idx="2">
+          <a:scrgbClr r="0" g="0" b="0"/>
+        </a:lnRef>
+        <a:fillRef idx="1">
+          <a:scrgbClr r="0" g="0" b="0"/>
+        </a:fillRef>
+        <a:effectRef idx="0">
+          <a:scrgbClr r="0" g="0" b="0"/>
+        </a:effectRef>
+        <a:fontRef idx="minor">
+          <a:schemeClr val="lt1"/>
+        </a:fontRef>
+      </dsp:style>
+      <dsp:txBody>
+        <a:bodyPr spcFirstLastPara="0" vert="horz" wrap="square" lIns="142240" tIns="142240" rIns="142240" bIns="142240" numCol="1" spcCol="1270" anchor="ctr" anchorCtr="0">
+          <a:noAutofit/>
+        </a:bodyPr>
+        <a:lstStyle/>
+        <a:p>
+          <a:pPr marL="0" lvl="0" indent="0" algn="ctr" defTabSz="889000">
+            <a:lnSpc>
+              <a:spcPct val="90000"/>
+            </a:lnSpc>
+            <a:spcBef>
+              <a:spcPct val="0"/>
+            </a:spcBef>
+            <a:spcAft>
+              <a:spcPct val="35000"/>
+            </a:spcAft>
+            <a:buNone/>
+          </a:pPr>
+          <a:r>
+            <a:rPr lang="en-US" sz="2000" kern="1200" dirty="0">
+              <a:solidFill>
+                <a:schemeClr val="tx1"/>
+              </a:solidFill>
+            </a:rPr>
+            <a:t>Run-to-Completion Schedule </a:t>
+          </a:r>
+        </a:p>
+      </dsp:txBody>
+      <dsp:txXfrm>
+        <a:off x="1830403" y="1291803"/>
+        <a:ext cx="1520792" cy="611906"/>
+      </dsp:txXfrm>
+    </dsp:sp>
+    <dsp:sp modelId="{41794503-7CF2-FC43-810A-63D909211019}">
+      <dsp:nvSpPr>
+        <dsp:cNvPr id="0" name=""/>
+        <dsp:cNvSpPr/>
+      </dsp:nvSpPr>
+      <dsp:spPr>
+        <a:xfrm>
+          <a:off x="1502965" y="2175669"/>
+          <a:ext cx="2175669" cy="2175669"/>
+        </a:xfrm>
+        <a:prstGeom prst="ellipse">
+          <a:avLst/>
+        </a:prstGeom>
+        <a:solidFill>
+          <a:srgbClr val="92D050"/>
+        </a:solidFill>
+        <a:ln w="25400" cap="flat" cmpd="sng" algn="ctr">
+          <a:solidFill>
+            <a:schemeClr val="tx1"/>
+          </a:solidFill>
+          <a:prstDash val="solid"/>
+          <a:miter lim="800000"/>
+        </a:ln>
+        <a:effectLst/>
+      </dsp:spPr>
+      <dsp:style>
+        <a:lnRef idx="2">
+          <a:scrgbClr r="0" g="0" b="0"/>
+        </a:lnRef>
+        <a:fillRef idx="1">
+          <a:scrgbClr r="0" g="0" b="0"/>
+        </a:fillRef>
+        <a:effectRef idx="0">
+          <a:scrgbClr r="0" g="0" b="0"/>
+        </a:effectRef>
+        <a:fontRef idx="minor">
+          <a:schemeClr val="lt1"/>
+        </a:fontRef>
+      </dsp:style>
+      <dsp:txBody>
+        <a:bodyPr spcFirstLastPara="0" vert="horz" wrap="square" lIns="142240" tIns="142240" rIns="142240" bIns="142240" numCol="1" spcCol="1270" anchor="ctr" anchorCtr="0">
+          <a:noAutofit/>
+        </a:bodyPr>
+        <a:lstStyle/>
+        <a:p>
+          <a:pPr marL="0" lvl="0" indent="0" algn="ctr" defTabSz="889000">
+            <a:lnSpc>
+              <a:spcPct val="90000"/>
+            </a:lnSpc>
+            <a:spcBef>
+              <a:spcPct val="0"/>
+            </a:spcBef>
+            <a:spcAft>
+              <a:spcPct val="35000"/>
+            </a:spcAft>
+            <a:buNone/>
+          </a:pPr>
+          <a:r>
+            <a:rPr lang="en-US" sz="2000" kern="1200" dirty="0">
+              <a:solidFill>
+                <a:schemeClr val="tx1"/>
+              </a:solidFill>
+            </a:rPr>
+            <a:t>Untriggered </a:t>
+          </a:r>
+          <a:r>
+            <a:rPr lang="en-US" sz="2000" kern="1200" dirty="0" err="1">
+              <a:solidFill>
+                <a:schemeClr val="tx1"/>
+              </a:solidFill>
+            </a:rPr>
+            <a:t>Statecharts</a:t>
+          </a:r>
+          <a:r>
+            <a:rPr lang="en-US" sz="2000" kern="1200" dirty="0">
+              <a:solidFill>
+                <a:schemeClr val="tx1"/>
+              </a:solidFill>
+            </a:rPr>
+            <a:t> </a:t>
+          </a:r>
+        </a:p>
+      </dsp:txBody>
+      <dsp:txXfrm>
+        <a:off x="1821584" y="2719586"/>
+        <a:ext cx="1538430" cy="1087834"/>
+      </dsp:txXfrm>
+    </dsp:sp>
+  </dsp:spTree>
+</dsp:drawing>
+</file>
+
+<file path=ppt/diagrams/layout1.xml><?xml version="1.0" encoding="utf-8"?>
+<dgm:layoutDef xmlns:dgm="http://schemas.openxmlformats.org/drawingml/2006/diagram" xmlns:a="http://schemas.openxmlformats.org/drawingml/2006/main" uniqueId="urn:microsoft.com/office/officeart/2005/8/layout/venn2">
+  <dgm:title val=""/>
+  <dgm:desc val=""/>
+  <dgm:catLst>
+    <dgm:cat type="relationship" pri="30000"/>
+  </dgm:catLst>
+  <dgm:sampData>
+    <dgm:dataModel>
+      <dgm:ptLst>
+        <dgm:pt modelId="0" type="doc"/>
+        <dgm:pt modelId="1">
+          <dgm:prSet phldr="1"/>
+        </dgm:pt>
+        <dgm:pt modelId="2">
+          <dgm:prSet phldr="1"/>
+        </dgm:pt>
+        <dgm:pt modelId="3">
+          <dgm:prSet phldr="1"/>
+        </dgm:pt>
+        <dgm:pt modelId="4">
+          <dgm:prSet phldr="1"/>
+        </dgm:pt>
+      </dgm:ptLst>
+      <dgm:cxnLst>
+        <dgm:cxn modelId="5" srcId="0" destId="1" srcOrd="0" destOrd="0"/>
+        <dgm:cxn modelId="6" srcId="0" destId="2" srcOrd="1" destOrd="0"/>
+        <dgm:cxn modelId="7" srcId="0" destId="3" srcOrd="2" destOrd="0"/>
+        <dgm:cxn modelId="8" srcId="0" destId="4" srcOrd="3" destOrd="0"/>
+      </dgm:cxnLst>
+      <dgm:bg/>
+      <dgm:whole/>
+    </dgm:dataModel>
+  </dgm:sampData>
+  <dgm:styleData>
+    <dgm:dataModel>
+      <dgm:ptLst>
+        <dgm:pt modelId="0" type="doc"/>
+        <dgm:pt modelId="1"/>
+        <dgm:pt modelId="2"/>
+      </dgm:ptLst>
+      <dgm:cxnLst>
+        <dgm:cxn modelId="3" srcId="0" destId="1" srcOrd="0" destOrd="0"/>
+        <dgm:cxn modelId="4" srcId="0" destId="2" srcOrd="1" destOrd="0"/>
+      </dgm:cxnLst>
+      <dgm:bg/>
+      <dgm:whole/>
+    </dgm:dataModel>
+  </dgm:styleData>
+  <dgm:clrData>
+    <dgm:dataModel>
+      <dgm:ptLst>
+        <dgm:pt modelId="0" type="doc"/>
+        <dgm:pt modelId="1"/>
+        <dgm:pt modelId="2"/>
+        <dgm:pt modelId="3"/>
+        <dgm:pt modelId="4"/>
+      </dgm:ptLst>
+      <dgm:cxnLst>
+        <dgm:cxn modelId="5" srcId="0" destId="1" srcOrd="0" destOrd="0"/>
+        <dgm:cxn modelId="6" srcId="0" destId="2" srcOrd="1" destOrd="0"/>
+        <dgm:cxn modelId="7" srcId="0" destId="3" srcOrd="2" destOrd="0"/>
+        <dgm:cxn modelId="8" srcId="0" destId="4" srcOrd="3" destOrd="0"/>
+      </dgm:cxnLst>
+      <dgm:bg/>
+      <dgm:whole/>
+    </dgm:dataModel>
+  </dgm:clrData>
+  <dgm:layoutNode name="Name0">
+    <dgm:varLst>
+      <dgm:chMax val="7"/>
+      <dgm:resizeHandles val="exact"/>
+    </dgm:varLst>
+    <dgm:alg type="composite">
+      <dgm:param type="ar" val="1"/>
+    </dgm:alg>
+    <dgm:shape xmlns:r="http://schemas.openxmlformats.org/officeDocument/2006/relationships" r:blip="">
+      <dgm:adjLst/>
+    </dgm:shape>
+    <dgm:presOf/>
+    <dgm:choose name="Name1">
+      <dgm:if name="Name2" axis="ch" ptType="node" func="cnt" op="lte" val="3">
+        <dgm:constrLst>
+          <dgm:constr type="w" for="ch" forName="comp1" refType="w"/>
+          <dgm:constr type="h" for="ch" forName="comp1" refType="w" refFor="ch" refForName="comp1"/>
+          <dgm:constr type="w" for="ch" forName="comp2" refType="w" fact="0.75"/>
+          <dgm:constr type="h" for="ch" forName="comp2" refType="w" refFor="ch" refForName="comp2"/>
+          <dgm:constr type="ctrX" for="ch" forName="comp2" refType="ctrX" refFor="ch" refForName="comp1"/>
+          <dgm:constr type="b" for="ch" forName="comp2" refType="b" refFor="ch" refForName="comp1"/>
+          <dgm:constr type="w" for="ch" forName="comp3" refType="w" fact="0.5"/>
+          <dgm:constr type="h" for="ch" forName="comp3" refType="w" refFor="ch" refForName="comp3"/>
+          <dgm:constr type="ctrX" for="ch" forName="comp3" refType="ctrX" refFor="ch" refForName="comp1"/>
+          <dgm:constr type="b" for="ch" forName="comp3" refType="b" refFor="ch" refForName="comp1"/>
+          <dgm:constr type="primFontSz" for="des" ptType="node" op="equ" val="65"/>
+        </dgm:constrLst>
+      </dgm:if>
+      <dgm:if name="Name3" axis="ch" ptType="node" func="cnt" op="equ" val="4">
+        <dgm:constrLst>
+          <dgm:constr type="w" for="ch" forName="comp1" refType="w"/>
+          <dgm:constr type="h" for="ch" forName="comp1" refType="w" refFor="ch" refForName="comp1"/>
+          <dgm:constr type="w" for="ch" forName="comp2" refType="w" fact="0.8"/>
+          <dgm:constr type="h" for="ch" forName="comp2" refType="w" refFor="ch" refForName="comp2"/>
+          <dgm:constr type="ctrX" for="ch" forName="comp2" refType="ctrX" refFor="ch" refForName="comp1"/>
+          <dgm:constr type="b" for="ch" forName="comp2" refType="b" refFor="ch" refForName="comp1"/>
+          <dgm:constr type="w" for="ch" forName="comp3" refType="w" fact="0.6"/>
+          <dgm:constr type="h" for="ch" forName="comp3" refType="w" refFor="ch" refForName="comp3"/>
+          <dgm:constr type="ctrX" for="ch" forName="comp3" refType="ctrX" refFor="ch" refForName="comp1"/>
+          <dgm:constr type="b" for="ch" forName="comp3" refType="b" refFor="ch" refForName="comp1"/>
+          <dgm:constr type="w" for="ch" forName="comp4" refType="w" fact="0.4"/>
+          <dgm:constr type="h" for="ch" forName="comp4" refType="w" refFor="ch" refForName="comp4"/>
+          <dgm:constr type="ctrX" for="ch" forName="comp4" refType="ctrX" refFor="ch" refForName="comp1"/>
+          <dgm:constr type="b" for="ch" forName="comp4" refType="b" refFor="ch" refForName="comp1"/>
+          <dgm:constr type="primFontSz" for="des" ptType="node" op="equ" val="65"/>
+        </dgm:constrLst>
+      </dgm:if>
+      <dgm:else name="Name4">
+        <dgm:constrLst>
+          <dgm:constr type="w" for="ch" forName="comp1" refType="w"/>
+          <dgm:constr type="h" for="ch" forName="comp1" refType="w" refFor="ch" refForName="comp1"/>
+          <dgm:constr type="w" for="ch" forName="comp2" refType="w" fact="0.85"/>
+          <dgm:constr type="h" for="ch" forName="comp2" refType="w" refFor="ch" refForName="comp2"/>
+          <dgm:constr type="ctrX" for="ch" forName="comp2" refType="ctrX" refFor="ch" refForName="comp1"/>
+          <dgm:constr type="b" for="ch" forName="comp2" refType="b" refFor="ch" refForName="comp1"/>
+          <dgm:constr type="w" for="ch" forName="comp3" refType="w" fact="0.7"/>
+          <dgm:constr type="h" for="ch" forName="comp3" refType="w" refFor="ch" refForName="comp3"/>
+          <dgm:constr type="ctrX" for="ch" forName="comp3" refType="ctrX" refFor="ch" refForName="comp1"/>
+          <dgm:constr type="b" for="ch" forName="comp3" refType="b" refFor="ch" refForName="comp1"/>
+          <dgm:constr type="w" for="ch" forName="comp4" refType="w" fact="0.55"/>
+          <dgm:constr type="h" for="ch" forName="comp4" refType="w" refFor="ch" refForName="comp4"/>
+          <dgm:constr type="ctrX" for="ch" forName="comp4" refType="ctrX" refFor="ch" refForName="comp1"/>
+          <dgm:constr type="b" for="ch" forName="comp4" refType="b" refFor="ch" refForName="comp1"/>
+          <dgm:constr type="w" for="ch" forName="comp5" refType="w" fact="0.4"/>
+          <dgm:constr type="h" for="ch" forName="comp5" refType="w" refFor="ch" refForName="comp5"/>
+          <dgm:constr type="ctrX" for="ch" forName="comp5" refType="ctrX" refFor="ch" refForName="comp1"/>
+          <dgm:constr type="b" for="ch" forName="comp5" refType="b" refFor="ch" refForName="comp1"/>
+          <dgm:constr type="w" for="ch" forName="comp6" refType="w" fact="0.25"/>
+          <dgm:constr type="h" for="ch" forName="comp6" refType="w" refFor="ch" refForName="comp6"/>
+          <dgm:constr type="ctrX" for="ch" forName="comp6" refType="ctrX" refFor="ch" refForName="comp1"/>
+          <dgm:constr type="b" for="ch" forName="comp6" refType="b" refFor="ch" refForName="comp1"/>
+          <dgm:constr type="w" for="ch" forName="comp7" refType="w" fact="0.15"/>
+          <dgm:constr type="h" for="ch" forName="comp7" refType="w" refFor="ch" refForName="comp7"/>
+          <dgm:constr type="ctrX" for="ch" forName="comp7" refType="ctrX" refFor="ch" refForName="comp1"/>
+          <dgm:constr type="b" for="ch" forName="comp7" refType="b" refFor="ch" refForName="comp1"/>
+          <dgm:constr type="primFontSz" for="des" ptType="node" op="equ" val="65"/>
+        </dgm:constrLst>
+      </dgm:else>
+    </dgm:choose>
+    <dgm:ruleLst/>
+    <dgm:choose name="Name5">
+      <dgm:if name="Name6" axis="ch" ptType="node" func="cnt" op="gte" val="1">
+        <dgm:layoutNode name="comp1">
+          <dgm:alg type="composite"/>
+          <dgm:shape xmlns:r="http://schemas.openxmlformats.org/officeDocument/2006/relationships" r:blip="">
+            <dgm:adjLst/>
+          </dgm:shape>
+          <dgm:presOf/>
+          <dgm:choose name="Name7">
+            <dgm:if name="Name8" axis="ch" ptType="node" func="cnt" op="equ" val="1">
+              <dgm:constrLst>
+                <dgm:constr type="w" for="ch" forName="circle1" refType="w"/>
+                <dgm:constr type="h" for="ch" forName="circle1" refType="h"/>
+                <dgm:constr type="ctrX" for="ch" forName="circle1" refType="w" fact="0.5"/>
+                <dgm:constr type="ctrY" for="ch" forName="circle1" refType="h" fact="0.5"/>
+                <dgm:constr type="ctrX" for="ch" forName="c1text" refType="w" fact="0.5"/>
+                <dgm:constr type="ctrY" for="ch" forName="c1text" refType="h" fact="0.5"/>
+                <dgm:constr type="w" for="ch" forName="c1text" refType="w" refFor="ch" refForName="circle1" fact="0.70711"/>
+                <dgm:constr type="h" for="ch" forName="c1text" refType="h" refFor="ch" refForName="circle1" fact="0.5"/>
+              </dgm:constrLst>
+            </dgm:if>
+            <dgm:if name="Name9" axis="ch" ptType="node" func="cnt" op="equ" val="2">
+              <dgm:constrLst>
+                <dgm:constr type="w" for="ch" forName="circle1" refType="w"/>
+                <dgm:constr type="h" for="ch" forName="circle1" refType="h"/>
+                <dgm:constr type="ctrX" for="ch" forName="circle1" refType="w" fact="0.5"/>
+                <dgm:constr type="ctrY" for="ch" forName="circle1" refType="h" fact="0.5"/>
+                <dgm:constr type="ctrX" for="ch" forName="c1text" refType="w" fact="0.5"/>
+                <dgm:constr type="ctrY" for="ch" forName="c1text" refType="h" fact="0.16"/>
+                <dgm:constr type="w" for="ch" forName="c1text" refType="w" refFor="ch" refForName="circle1" fact="0.525"/>
+                <dgm:constr type="h" for="ch" forName="c1text" refType="h" refFor="ch" refForName="circle1" fact="0.17"/>
+              </dgm:constrLst>
+            </dgm:if>
+            <dgm:if name="Name10" axis="ch" ptType="node" func="cnt" op="equ" val="3">
+              <dgm:constrLst>
+                <dgm:constr type="w" for="ch" forName="circle1" refType="w"/>
+                <dgm:constr type="h" for="ch" forName="circle1" refType="h"/>
+                <dgm:constr type="ctrX" for="ch" forName="circle1" refType="w" fact="0.5"/>
+                <dgm:constr type="ctrY" for="ch" forName="circle1" refType="h" fact="0.5"/>
+                <dgm:constr type="ctrX" for="ch" forName="c1text" refType="w" fact="0.5"/>
+                <dgm:constr type="ctrY" for="ch" forName="c1text" refType="h" fact="0.125"/>
+                <dgm:constr type="w" for="ch" forName="c1text" refType="w" refFor="ch" refForName="circle1" fact="0.3495"/>
+                <dgm:constr type="h" for="ch" forName="c1text" refType="h" refFor="ch" refForName="circle1" fact="0.15"/>
+              </dgm:constrLst>
+            </dgm:if>
+            <dgm:if name="Name11" axis="ch" ptType="node" func="cnt" op="equ" val="4">
+              <dgm:constrLst>
+                <dgm:constr type="w" for="ch" forName="circle1" refType="w"/>
+                <dgm:constr type="h" for="ch" forName="circle1" refType="h"/>
+                <dgm:constr type="ctrX" for="ch" forName="circle1" refType="w" fact="0.5"/>
+                <dgm:constr type="ctrY" for="ch" forName="circle1" refType="h" fact="0.5"/>
+                <dgm:constr type="ctrX" for="ch" forName="c1text" refType="w" fact="0.5"/>
+                <dgm:constr type="ctrY" for="ch" forName="c1text" refType="h" fact="0.125"/>
+                <dgm:constr type="w" for="ch" forName="c1text" refType="w" refFor="ch" refForName="circle1" fact="0.2796"/>
+                <dgm:constr type="h" for="ch" forName="c1text" refType="h" refFor="ch" refForName="circle1" fact="0.15"/>
+              </dgm:constrLst>
+            </dgm:if>
+            <dgm:if name="Name12" axis="ch" ptType="node" func="cnt" op="gte" val="5">
+              <dgm:constrLst>
+                <dgm:constr type="w" for="ch" forName="circle1" refType="w"/>
+                <dgm:constr type="h" for="ch" forName="circle1" refType="h"/>
+                <dgm:constr type="ctrX" for="ch" forName="circle1" refType="w" fact="0.5"/>
+                <dgm:constr type="ctrY" for="ch" forName="circle1" refType="h" fact="0.5"/>
+                <dgm:constr type="ctrX" for="ch" forName="c1text" refType="w" fact="0.5"/>
+                <dgm:constr type="ctrY" for="ch" forName="c1text" refType="h" fact="0.1"/>
+                <dgm:constr type="w" for="ch" forName="c1text" refType="w" refFor="ch" refForName="circle1" fact="0.375"/>
+                <dgm:constr type="h" for="ch" forName="c1text" refType="h" refFor="ch" refForName="circle1" fact="0.1"/>
+              </dgm:constrLst>
+            </dgm:if>
+            <dgm:else name="Name13"/>
+          </dgm:choose>
+          <dgm:ruleLst/>
+          <dgm:layoutNode name="circle1" styleLbl="node1">
+            <dgm:alg type="sp"/>
+            <dgm:shape xmlns:r="http://schemas.openxmlformats.org/officeDocument/2006/relationships" type="ellipse" r:blip="">
+              <dgm:adjLst/>
+            </dgm:shape>
+            <dgm:presOf axis="ch desOrSelf" ptType="node node" st="1 1" cnt="1 0"/>
+            <dgm:constrLst>
+              <dgm:constr type="h" refType="w"/>
+            </dgm:constrLst>
+            <dgm:ruleLst/>
+          </dgm:layoutNode>
+          <dgm:layoutNode name="c1text">
+            <dgm:varLst>
+              <dgm:bulletEnabled val="1"/>
+            </dgm:varLst>
+            <dgm:alg type="tx"/>
+            <dgm:shape xmlns:r="http://schemas.openxmlformats.org/officeDocument/2006/relationships" type="rect" r:blip="" hideGeom="1">
+              <dgm:adjLst/>
+            </dgm:shape>
+            <dgm:presOf axis="ch desOrSelf" ptType="node node" st="1 1" cnt="1 0"/>
+            <dgm:constrLst/>
+            <dgm:ruleLst>
+              <dgm:rule type="primFontSz" val="5" fact="NaN" max="NaN"/>
+            </dgm:ruleLst>
+          </dgm:layoutNode>
+        </dgm:layoutNode>
+      </dgm:if>
+      <dgm:else name="Name14"/>
+    </dgm:choose>
+    <dgm:choose name="Name15">
+      <dgm:if name="Name16" axis="ch" ptType="node" func="cnt" op="gte" val="2">
+        <dgm:layoutNode name="comp2">
+          <dgm:alg type="composite"/>
+          <dgm:shape xmlns:r="http://schemas.openxmlformats.org/officeDocument/2006/relationships" r:blip="">
+            <dgm:adjLst/>
+          </dgm:shape>
+          <dgm:presOf/>
+          <dgm:choose name="Name17">
+            <dgm:if name="Name18" axis="ch" ptType="node" func="cnt" op="equ" val="2">
+              <dgm:constrLst>
+                <dgm:constr type="w" for="ch" forName="circle2" refType="w"/>
+                <dgm:constr type="h" for="ch" forName="circle2" refType="h"/>
+                <dgm:constr type="ctrX" for="ch" forName="circle2" refType="w" fact="0.5"/>
+                <dgm:constr type="ctrY" for="ch" forName="circle2" refType="h" fact="0.5"/>
+                <dgm:constr type="ctrX" for="ch" forName="c2text" refType="w" fact="0.5"/>
+                <dgm:constr type="ctrY" for="ch" forName="c2text" refType="h" fact="0.5"/>
+                <dgm:constr type="w" for="ch" forName="c2text" refType="w" refFor="ch" refForName="circle2" fact="0.70711"/>
+                <dgm:constr type="h" for="ch" forName="c2text" refType="h" refFor="ch" refForName="circle2" fact="0.5"/>
+              </dgm:constrLst>
+            </dgm:if>
+            <dgm:if name="Name19" axis="ch" ptType="node" func="cnt" op="equ" val="3">
+              <dgm:constrLst>
+                <dgm:constr type="w" for="ch" forName="circle2" refType="w"/>
+                <dgm:constr type="h" for="ch" forName="circle2" refType="h"/>
+                <dgm:constr type="ctrX" for="ch" forName="circle2" refType="w" fact="0.5"/>
+                <dgm:constr type="ctrY" for="ch" forName="circle2" refType="h" fact="0.5"/>
+                <dgm:constr type="ctrX" for="ch" forName="c2text" refType="w" fact="0.5"/>
+                <dgm:constr type="ctrY" for="ch" forName="c2text" refType="h" fact="0.15625"/>
+                <dgm:constr type="w" for="ch" forName="c2text" refType="w" refFor="ch" refForName="circle2" fact="0.466"/>
+                <dgm:constr type="h" for="ch" forName="c2text" refType="h" refFor="ch" refForName="circle2" fact="0.1875"/>
+              </dgm:constrLst>
+            </dgm:if>
+            <dgm:if name="Name20" axis="ch" ptType="node" func="cnt" op="equ" val="4">
+              <dgm:constrLst>
+                <dgm:constr type="w" for="ch" forName="circle2" refType="w"/>
+                <dgm:constr type="h" for="ch" forName="circle2" refType="h"/>
+                <dgm:constr type="ctrX" for="ch" forName="circle2" refType="w" fact="0.5"/>
+                <dgm:constr type="ctrY" for="ch" forName="circle2" refType="h" fact="0.5"/>
+                <dgm:constr type="ctrX" for="ch" forName="c2text" refType="w" fact="0.5"/>
+                <dgm:constr type="ctrY" for="ch" forName="c2text" refType="h" fact="0.15"/>
+                <dgm:constr type="w" for="ch" forName="c2text" refType="w" refFor="ch" refForName="circle2" fact="0.3495"/>
+                <dgm:constr type="h" for="ch" forName="c2text" refType="h" refFor="ch" refForName="circle2" fact="0.18"/>
+              </dgm:constrLst>
+            </dgm:if>
+            <dgm:if name="Name21" axis="ch" ptType="node" func="cnt" op="gte" val="5">
+              <dgm:constrLst>
+                <dgm:constr type="w" for="ch" forName="circle2" refType="w"/>
+                <dgm:constr type="h" for="ch" forName="circle2" refType="h"/>
+                <dgm:constr type="ctrX" for="ch" forName="circle2" refType="w" fact="0.5"/>
+                <dgm:constr type="ctrY" for="ch" forName="circle2" refType="h" fact="0.5"/>
+                <dgm:constr type="ctrX" for="ch" forName="c2text" refType="w" fact="0.5"/>
+                <dgm:constr type="ctrY" for="ch" forName="c2text" refType="h" fact="0.115"/>
+                <dgm:constr type="w" for="ch" forName="c2text" refType="w" refFor="ch" refForName="circle2" fact="0.43125"/>
+                <dgm:constr type="h" for="ch" forName="c2text" refType="h" refFor="ch" refForName="circle2" fact="0.115"/>
+              </dgm:constrLst>
+            </dgm:if>
+            <dgm:else name="Name22"/>
+          </dgm:choose>
+          <dgm:ruleLst/>
+          <dgm:layoutNode name="circle2" styleLbl="node1">
+            <dgm:alg type="sp"/>
+            <dgm:shape xmlns:r="http://schemas.openxmlformats.org/officeDocument/2006/relationships" type="ellipse" r:blip="">
+              <dgm:adjLst/>
+            </dgm:shape>
+            <dgm:presOf axis="ch desOrSelf" ptType="node node" st="2 1" cnt="1 0"/>
+            <dgm:constrLst>
+              <dgm:constr type="h" refType="w"/>
+            </dgm:constrLst>
+            <dgm:ruleLst/>
+          </dgm:layoutNode>
+          <dgm:layoutNode name="c2text">
+            <dgm:varLst>
+              <dgm:bulletEnabled val="1"/>
+            </dgm:varLst>
+            <dgm:alg type="tx"/>
+            <dgm:shape xmlns:r="http://schemas.openxmlformats.org/officeDocument/2006/relationships" type="rect" r:blip="" hideGeom="1">
+              <dgm:adjLst/>
+            </dgm:shape>
+            <dgm:presOf axis="ch desOrSelf" ptType="node node" st="2 1" cnt="1 0"/>
+            <dgm:constrLst/>
+            <dgm:ruleLst>
+              <dgm:rule type="primFontSz" val="5" fact="NaN" max="NaN"/>
+            </dgm:ruleLst>
+          </dgm:layoutNode>
+        </dgm:layoutNode>
+      </dgm:if>
+      <dgm:else name="Name23"/>
+    </dgm:choose>
+    <dgm:choose name="Name24">
+      <dgm:if name="Name25" axis="ch" ptType="node" func="cnt" op="gte" val="3">
+        <dgm:layoutNode name="comp3">
+          <dgm:alg type="composite"/>
+          <dgm:shape xmlns:r="http://schemas.openxmlformats.org/officeDocument/2006/relationships" r:blip="">
+            <dgm:adjLst/>
+          </dgm:shape>
+          <dgm:presOf/>
+          <dgm:choose name="Name26">
+            <dgm:if name="Name27" axis="ch" ptType="node" func="cnt" op="equ" val="3">
+              <dgm:constrLst>
+                <dgm:constr type="w" for="ch" forName="circle3" refType="w"/>
+                <dgm:constr type="h" for="ch" forName="circle3" refType="h"/>
+                <dgm:constr type="ctrX" for="ch" forName="circle3" refType="w" fact="0.5"/>
+                <dgm:constr type="ctrY" for="ch" forName="circle3" refType="h" fact="0.5"/>
+                <dgm:constr type="ctrX" for="ch" forName="c3text" refType="w" fact="0.5"/>
+                <dgm:constr type="ctrY" for="ch" forName="c3text" refType="h" fact="0.5"/>
+                <dgm:constr type="w" for="ch" forName="c3text" refType="w" refFor="ch" refForName="circle3" fact="0.70711"/>
+                <dgm:constr type="h" for="ch" forName="c3text" refType="h" refFor="ch" refForName="circle3" fact="0.5"/>
+              </dgm:constrLst>
+            </dgm:if>
+            <dgm:if name="Name28" axis="ch" ptType="node" func="cnt" op="equ" val="4">
+              <dgm:constrLst>
+                <dgm:constr type="w" for="ch" forName="circle3" refType="w"/>
+                <dgm:constr type="h" for="ch" forName="circle3" refType="h"/>
+                <dgm:constr type="ctrX" for="ch" forName="circle3" refType="w" fact="0.5"/>
+                <dgm:constr type="ctrY" for="ch" forName="circle3" refType="h" fact="0.5"/>
+                <dgm:constr type="ctrX" for="ch" forName="c3text" refType="w" fact="0.5"/>
+                <dgm:constr type="ctrY" for="ch" forName="c3text" refType="h" fact="0.1875"/>
+                <dgm:constr type="w" for="ch" forName="c3text" refType="w" refFor="ch" refForName="circle3" fact="0.466"/>
+                <dgm:constr type="h" for="ch" forName="c3text" refType="h" refFor="ch" refForName="circle3" fact="0.225"/>
+              </dgm:constrLst>
+            </dgm:if>
+            <dgm:if name="Name29" axis="ch" ptType="node" func="cnt" op="gte" val="5">
+              <dgm:constrLst>
+                <dgm:constr type="w" for="ch" forName="circle3" refType="w"/>
+                <dgm:constr type="h" for="ch" forName="circle3" refType="h"/>
+                <dgm:constr type="ctrX" for="ch" forName="circle3" refType="w" fact="0.5"/>
+                <dgm:constr type="ctrY" for="ch" forName="circle3" refType="h" fact="0.5"/>
+                <dgm:constr type="ctrX" for="ch" forName="c3text" refType="w" fact="0.5"/>
+                <dgm:constr type="ctrY" for="ch" forName="c3text" refType="h" fact="0.138"/>
+                <dgm:constr type="w" for="ch" forName="c3text" refType="w" refFor="ch" refForName="circle3" fact="0.5175"/>
+                <dgm:constr type="h" for="ch" forName="c3text" refType="h" refFor="ch" refForName="circle3" fact="0.138"/>
+              </dgm:constrLst>
+            </dgm:if>
+            <dgm:else name="Name30"/>
+          </dgm:choose>
+          <dgm:ruleLst/>
+          <dgm:layoutNode name="circle3" styleLbl="node1">
+            <dgm:alg type="sp"/>
+            <dgm:shape xmlns:r="http://schemas.openxmlformats.org/officeDocument/2006/relationships" type="ellipse" r:blip="">
+              <dgm:adjLst/>
+            </dgm:shape>
+            <dgm:presOf axis="ch desOrSelf" ptType="node node" st="3 1" cnt="1 0"/>
+            <dgm:constrLst>
+              <dgm:constr type="h" refType="w"/>
+            </dgm:constrLst>
+            <dgm:ruleLst/>
+          </dgm:layoutNode>
+          <dgm:layoutNode name="c3text">
+            <dgm:varLst>
+              <dgm:bulletEnabled val="1"/>
+            </dgm:varLst>
+            <dgm:alg type="tx"/>
+            <dgm:shape xmlns:r="http://schemas.openxmlformats.org/officeDocument/2006/relationships" type="rect" r:blip="" hideGeom="1">
+              <dgm:adjLst/>
+            </dgm:shape>
+            <dgm:presOf axis="ch desOrSelf" ptType="node node" st="3 1" cnt="1 0"/>
+            <dgm:constrLst/>
+            <dgm:ruleLst>
+              <dgm:rule type="primFontSz" val="5" fact="NaN" max="NaN"/>
+            </dgm:ruleLst>
+          </dgm:layoutNode>
+        </dgm:layoutNode>
+      </dgm:if>
+      <dgm:else name="Name31"/>
+    </dgm:choose>
+    <dgm:choose name="Name32">
+      <dgm:if name="Name33" axis="ch" ptType="node" func="cnt" op="gte" val="4">
+        <dgm:layoutNode name="comp4">
+          <dgm:alg type="composite"/>
+          <dgm:shape xmlns:r="http://schemas.openxmlformats.org/officeDocument/2006/relationships" r:blip="">
+            <dgm:adjLst/>
+          </dgm:shape>
+          <dgm:presOf/>
+          <dgm:choose name="Name34">
+            <dgm:if name="Name35" axis="ch" ptType="node" func="cnt" op="equ" val="4">
+              <dgm:constrLst>
+                <dgm:constr type="w" for="ch" forName="circle4" refType="w"/>
+                <dgm:constr type="h" for="ch" forName="circle4" refType="h"/>
+                <dgm:constr type="ctrX" for="ch" forName="circle4" refType="w" fact="0.5"/>
+                <dgm:constr type="ctrY" for="ch" forName="circle4" refType="h" fact="0.5"/>
+                <dgm:constr type="ctrX" for="ch" forName="c4text" refType="w" fact="0.5"/>
+                <dgm:constr type="ctrY" for="ch" forName="c4text" refType="h" fact="0.5"/>
+                <dgm:constr type="w" for="ch" forName="c4text" refType="w" refFor="ch" refForName="circle4" fact="0.70711"/>
+                <dgm:constr type="h" for="ch" forName="c4text" refType="h" refFor="ch" refForName="circle4" fact="0.5"/>
+              </dgm:constrLst>
+            </dgm:if>
+            <dgm:if name="Name36" axis="ch" ptType="node" func="cnt" op="gte" val="5">
+              <dgm:constrLst>
+                <dgm:constr type="w" for="ch" forName="circle4" refType="w"/>
+                <dgm:constr type="h" for="ch" forName="circle4" refType="h"/>
+                <dgm:constr type="ctrX" for="ch" forName="circle4" refType="w" fact="0.5"/>
+                <dgm:constr type="ctrY" for="ch" forName="circle4" refType="h" fact="0.5"/>
+                <dgm:constr type="ctrX" for="ch" forName="c4text" refType="w" fact="0.5"/>
+                <dgm:constr type="ctrY" for="ch" forName="c4text" refType="h" fact="0.18"/>
+                <dgm:constr type="w" for="ch" forName="c4text" refType="w" refFor="ch" refForName="circle4" fact="0.54"/>
+                <dgm:constr type="h" for="ch" forName="c4text" refType="h" refFor="ch" refForName="circle4" fact="0.18"/>
+              </dgm:constrLst>
+            </dgm:if>
+            <dgm:else name="Name37"/>
+          </dgm:choose>
+          <dgm:ruleLst/>
+          <dgm:layoutNode name="circle4" styleLbl="node1">
+            <dgm:alg type="sp"/>
+            <dgm:shape xmlns:r="http://schemas.openxmlformats.org/officeDocument/2006/relationships" type="ellipse" r:blip="">
+              <dgm:adjLst/>
+            </dgm:shape>
+            <dgm:presOf axis="ch desOrSelf" ptType="node node" st="4 1" cnt="1 0"/>
+            <dgm:constrLst>
+              <dgm:constr type="h" refType="w"/>
+            </dgm:constrLst>
+            <dgm:ruleLst/>
+          </dgm:layoutNode>
+          <dgm:layoutNode name="c4text">
+            <dgm:varLst>
+              <dgm:bulletEnabled val="1"/>
+            </dgm:varLst>
+            <dgm:alg type="tx"/>
+            <dgm:shape xmlns:r="http://schemas.openxmlformats.org/officeDocument/2006/relationships" type="rect" r:blip="" hideGeom="1">
+              <dgm:adjLst/>
+            </dgm:shape>
+            <dgm:presOf axis="ch desOrSelf" ptType="node node" st="4 1" cnt="1 0"/>
+            <dgm:constrLst/>
+            <dgm:ruleLst>
+              <dgm:rule type="primFontSz" val="5" fact="NaN" max="NaN"/>
+            </dgm:ruleLst>
+          </dgm:layoutNode>
+        </dgm:layoutNode>
+      </dgm:if>
+      <dgm:else name="Name38"/>
+    </dgm:choose>
+    <dgm:choose name="Name39">
+      <dgm:if name="Name40" axis="ch" ptType="node" func="cnt" op="gte" val="5">
+        <dgm:layoutNode name="comp5">
+          <dgm:alg type="composite"/>
+          <dgm:shape xmlns:r="http://schemas.openxmlformats.org/officeDocument/2006/relationships" r:blip="">
+            <dgm:adjLst/>
+          </dgm:shape>
+          <dgm:presOf/>
+          <dgm:choose name="Name41">
+            <dgm:if name="Name42" axis="ch" ptType="node" func="cnt" op="equ" val="5">
+              <dgm:constrLst>
+                <dgm:constr type="w" for="ch" forName="circle5" refType="w"/>
+                <dgm:constr type="h" for="ch" forName="circle5" refType="h"/>
+                <dgm:constr type="ctrX" for="ch" forName="circle5" refType="w" fact="0.5"/>
+                <dgm:constr type="ctrY" for="ch" forName="circle5" refType="h" fact="0.5"/>
+                <dgm:constr type="ctrX" for="ch" forName="c5text" refType="w" fact="0.5"/>
+                <dgm:constr type="ctrY" for="ch" forName="c5text" refType="h" fact="0.5"/>
+                <dgm:constr type="w" for="ch" forName="c5text" refType="w" refFor="ch" refForName="circle5" fact="0.70711"/>
+                <dgm:constr type="h" for="ch" forName="c5text" refType="h" refFor="ch" refForName="circle5" fact="0.5"/>
+              </dgm:constrLst>
+            </dgm:if>
+            <dgm:if name="Name43" axis="ch" ptType="node" func="cnt" op="gte" val="6">
+              <dgm:constrLst>
+                <dgm:constr type="w" for="ch" forName="circle5" refType="w"/>
+                <dgm:constr type="h" for="ch" forName="circle5" refType="h"/>
+                <dgm:constr type="ctrX" for="ch" forName="circle5" refType="w" fact="0.5"/>
+                <dgm:constr type="ctrY" for="ch" forName="circle5" refType="h" fact="0.5"/>
+                <dgm:constr type="ctrX" for="ch" forName="c5text" refType="w" fact="0.5"/>
+                <dgm:constr type="ctrY" for="ch" forName="c5text" refType="h" fact="0.25"/>
+                <dgm:constr type="w" for="ch" forName="c5text" refType="w" refFor="ch" refForName="circle5" fact="0.65"/>
+                <dgm:constr type="h" for="ch" forName="c5text" refType="h" refFor="ch" refForName="circle5" fact="0.25"/>
+              </dgm:constrLst>
+            </dgm:if>
+            <dgm:else name="Name44"/>
+          </dgm:choose>
+          <dgm:ruleLst/>
+          <dgm:layoutNode name="circle5" styleLbl="node1">
+            <dgm:alg type="sp"/>
+            <dgm:shape xmlns:r="http://schemas.openxmlformats.org/officeDocument/2006/relationships" type="ellipse" r:blip="">
+              <dgm:adjLst/>
+            </dgm:shape>
+            <dgm:presOf axis="ch desOrSelf" ptType="node node" st="5 1" cnt="1 0"/>
+            <dgm:constrLst>
+              <dgm:constr type="h" refType="w"/>
+            </dgm:constrLst>
+            <dgm:ruleLst/>
+          </dgm:layoutNode>
+          <dgm:layoutNode name="c5text">
+            <dgm:varLst>
+              <dgm:bulletEnabled val="1"/>
+            </dgm:varLst>
+            <dgm:alg type="tx"/>
+            <dgm:shape xmlns:r="http://schemas.openxmlformats.org/officeDocument/2006/relationships" type="rect" r:blip="" hideGeom="1">
+              <dgm:adjLst/>
+            </dgm:shape>
+            <dgm:presOf axis="ch desOrSelf" ptType="node node" st="5 1" cnt="1 0"/>
+            <dgm:constrLst/>
+            <dgm:ruleLst>
+              <dgm:rule type="primFontSz" val="5" fact="NaN" max="NaN"/>
+            </dgm:ruleLst>
+          </dgm:layoutNode>
+        </dgm:layoutNode>
+      </dgm:if>
+      <dgm:else name="Name45"/>
+    </dgm:choose>
+    <dgm:choose name="Name46">
+      <dgm:if name="Name47" axis="ch" ptType="node" func="cnt" op="gte" val="6">
+        <dgm:layoutNode name="comp6">
+          <dgm:alg type="composite"/>
+          <dgm:shape xmlns:r="http://schemas.openxmlformats.org/officeDocument/2006/relationships" r:blip="">
+            <dgm:adjLst/>
+          </dgm:shape>
+          <dgm:presOf/>
+          <dgm:choose name="Name48">
+            <dgm:if name="Name49" axis="ch" ptType="node" func="cnt" op="equ" val="6">
+              <dgm:constrLst>
+                <dgm:constr type="w" for="ch" forName="circle6" refType="w"/>
+                <dgm:constr type="h" for="ch" forName="circle6" refType="h"/>
+                <dgm:constr type="ctrX" for="ch" forName="circle6" refType="w" fact="0.5"/>
+                <dgm:constr type="ctrY" for="ch" forName="circle6" refType="h" fact="0.5"/>
+                <dgm:constr type="ctrX" for="ch" forName="c6text" refType="w" fact="0.5"/>
+                <dgm:constr type="ctrY" for="ch" forName="c6text" refType="h" fact="0.5"/>
+                <dgm:constr type="w" for="ch" forName="c6text" refType="w" refFor="ch" refForName="circle6" fact="0.70711"/>
+                <dgm:constr type="h" for="ch" forName="c6text" refType="h" refFor="ch" refForName="circle6" fact="0.5"/>
+              </dgm:constrLst>
+            </dgm:if>
+            <dgm:if name="Name50" axis="ch" ptType="node" func="cnt" op="gte" val="7">
+              <dgm:constrLst>
+                <dgm:constr type="w" for="ch" forName="circle6" refType="w"/>
+                <dgm:constr type="h" for="ch" forName="circle6" refType="h"/>
+                <dgm:constr type="ctrX" for="ch" forName="circle6" refType="w" fact="0.5"/>
+                <dgm:constr type="ctrY" for="ch" forName="circle6" refType="h" fact="0.5"/>
+                <dgm:constr type="ctrX" for="ch" forName="c6text" refType="w" fact="0.5"/>
+                <dgm:constr type="ctrY" for="ch" forName="c6text" refType="h" fact="0.27"/>
+                <dgm:constr type="w" for="ch" forName="c6text" refType="w" refFor="ch" refForName="circle6" fact="0.68"/>
+                <dgm:constr type="h" for="ch" forName="c6text" refType="h" refFor="ch" refForName="circle6" fact="0.241"/>
+              </dgm:constrLst>
+            </dgm:if>
+            <dgm:else name="Name51"/>
+          </dgm:choose>
+          <dgm:ruleLst/>
+          <dgm:layoutNode name="circle6" styleLbl="node1">
+            <dgm:alg type="sp"/>
+            <dgm:shape xmlns:r="http://schemas.openxmlformats.org/officeDocument/2006/relationships" type="ellipse" r:blip="">
+              <dgm:adjLst/>
+            </dgm:shape>
+            <dgm:presOf axis="ch desOrSelf" ptType="node node" st="6 1" cnt="1 0"/>
+            <dgm:constrLst>
+              <dgm:constr type="h" refType="w"/>
+            </dgm:constrLst>
+            <dgm:ruleLst/>
+          </dgm:layoutNode>
+          <dgm:layoutNode name="c6text">
+            <dgm:varLst>
+              <dgm:bulletEnabled val="1"/>
+            </dgm:varLst>
+            <dgm:alg type="tx"/>
+            <dgm:shape xmlns:r="http://schemas.openxmlformats.org/officeDocument/2006/relationships" type="rect" r:blip="" hideGeom="1">
+              <dgm:adjLst/>
+            </dgm:shape>
+            <dgm:presOf axis="ch desOrSelf" ptType="node node" st="6 1" cnt="1 0"/>
+            <dgm:constrLst/>
+            <dgm:ruleLst>
+              <dgm:rule type="primFontSz" val="5" fact="NaN" max="NaN"/>
+            </dgm:ruleLst>
+          </dgm:layoutNode>
+        </dgm:layoutNode>
+      </dgm:if>
+      <dgm:else name="Name52"/>
+    </dgm:choose>
+    <dgm:choose name="Name53">
+      <dgm:if name="Name54" axis="ch" ptType="node" func="cnt" op="gte" val="7">
+        <dgm:layoutNode name="comp7">
+          <dgm:alg type="composite"/>
+          <dgm:shape xmlns:r="http://schemas.openxmlformats.org/officeDocument/2006/relationships" r:blip="">
+            <dgm:adjLst/>
+          </dgm:shape>
+          <dgm:presOf/>
+          <dgm:constrLst>
+            <dgm:constr type="w" for="ch" forName="circle7" refType="w"/>
+            <dgm:constr type="h" for="ch" forName="circle7" refType="h"/>
+            <dgm:constr type="ctrX" for="ch" forName="circle7" refType="w" fact="0.5"/>
+            <dgm:constr type="ctrY" for="ch" forName="circle7" refType="h" fact="0.5"/>
+            <dgm:constr type="ctrX" for="ch" forName="c7text" refType="w" fact="0.5"/>
+            <dgm:constr type="ctrY" for="ch" forName="c7text" refType="h" fact="0.5"/>
+            <dgm:constr type="w" for="ch" forName="c7text" refType="w" refFor="ch" refForName="circle7" fact="0.70711"/>
+            <dgm:constr type="h" for="ch" forName="c7text" refType="h" refFor="ch" refForName="circle7" fact="0.5"/>
+          </dgm:constrLst>
+          <dgm:ruleLst/>
+          <dgm:layoutNode name="circle7" styleLbl="node1">
+            <dgm:alg type="sp"/>
+            <dgm:shape xmlns:r="http://schemas.openxmlformats.org/officeDocument/2006/relationships" type="ellipse" r:blip="">
+              <dgm:adjLst/>
+            </dgm:shape>
+            <dgm:presOf axis="ch desOrSelf" ptType="node node" st="7 1" cnt="1 0"/>
+            <dgm:constrLst>
+              <dgm:constr type="h" refType="w"/>
+            </dgm:constrLst>
+            <dgm:ruleLst/>
+          </dgm:layoutNode>
+          <dgm:layoutNode name="c7text">
+            <dgm:varLst>
+              <dgm:bulletEnabled val="1"/>
+            </dgm:varLst>
+            <dgm:alg type="tx"/>
+            <dgm:shape xmlns:r="http://schemas.openxmlformats.org/officeDocument/2006/relationships" type="rect" r:blip="" hideGeom="1">
+              <dgm:adjLst/>
+            </dgm:shape>
+            <dgm:presOf axis="ch desOrSelf" ptType="node node" st="7 1" cnt="1 0"/>
+            <dgm:constrLst/>
+            <dgm:ruleLst>
+              <dgm:rule type="primFontSz" val="5" fact="NaN" max="NaN"/>
+            </dgm:ruleLst>
+          </dgm:layoutNode>
+        </dgm:layoutNode>
+      </dgm:if>
+      <dgm:else name="Name55"/>
+    </dgm:choose>
+  </dgm:layoutNode>
+</dgm:layoutDef>
+</file>
+
+<file path=ppt/diagrams/quickStyle1.xml><?xml version="1.0" encoding="utf-8"?>
+<dgm:styleDef xmlns:dgm="http://schemas.openxmlformats.org/drawingml/2006/diagram" xmlns:a="http://schemas.openxmlformats.org/drawingml/2006/main" uniqueId="urn:microsoft.com/office/officeart/2005/8/quickstyle/simple1">
+  <dgm:title val=""/>
+  <dgm:desc val=""/>
+  <dgm:catLst>
+    <dgm:cat type="simple" pri="10100"/>
+  </dgm:catLst>
+  <dgm:scene3d>
+    <a:camera prst="orthographicFront"/>
+    <a:lightRig rig="threePt" dir="t"/>
+  </dgm:scene3d>
+  <dgm:styleLbl name="node0">
+    <dgm:scene3d>
+      <a:camera prst="orthographicFront"/>
+      <a:lightRig rig="threePt" dir="t"/>
+    </dgm:scene3d>
+    <dgm:sp3d/>
+    <dgm:txPr/>
+    <dgm:style>
+      <a:lnRef idx="2">
+        <a:scrgbClr r="0" g="0" b="0"/>
+      </a:lnRef>
+      <a:fillRef idx="1">
+        <a:scrgbClr r="0" g="0" b="0"/>
+      </a:fillRef>
+      <a:effectRef idx="0">
+        <a:scrgbClr r="0" g="0" b="0"/>
+      </a:effectRef>
+      <a:fontRef idx="minor">
+        <a:schemeClr val="lt1"/>
+      </a:fontRef>
+    </dgm:style>
+  </dgm:styleLbl>
+  <dgm:styleLbl name="lnNode1">
+    <dgm:scene3d>
+      <a:camera prst="orthographicFront"/>
+      <a:lightRig rig="threePt" dir="t"/>
+    </dgm:scene3d>
+    <dgm:sp3d/>
+    <dgm:txPr/>
+    <dgm:style>
+      <a:lnRef idx="2">
+        <a:scrgbClr r="0" g="0" b="0"/>
+      </a:lnRef>
+      <a:fillRef idx="1">
+        <a:scrgbClr r="0" g="0" b="0"/>
+      </a:fillRef>
+      <a:effectRef idx="0">
+        <a:scrgbClr r="0" g="0" b="0"/>
+      </a:effectRef>
+      <a:fontRef idx="minor">
+        <a:schemeClr val="lt1"/>
+      </a:fontRef>
+    </dgm:style>
+  </dgm:styleLbl>
+  <dgm:styleLbl name="vennNode1">
+    <dgm:scene3d>
+      <a:camera prst="orthographicFront"/>
+      <a:lightRig rig="threePt" dir="t"/>
+    </dgm:scene3d>
+    <dgm:sp3d/>
+    <dgm:txPr/>
+    <dgm:style>
+      <a:lnRef idx="2">
+        <a:scrgbClr r="0" g="0" b="0"/>
+      </a:lnRef>
+      <a:fillRef idx="1">
+        <a:scrgbClr r="0" g="0" b="0"/>
+      </a:fillRef>
+      <a:effectRef idx="0">
+        <a:scrgbClr r="0" g="0" b="0"/>
+      </a:effectRef>
+      <a:fontRef idx="minor">
+        <a:schemeClr val="tx1"/>
+      </a:fontRef>
+    </dgm:style>
+  </dgm:styleLbl>
+  <dgm:styleLbl name="alignNode1">
+    <dgm:scene3d>
+      <a:camera prst="orthographicFront"/>
+      <a:lightRig rig="threePt" dir="t"/>
+    </dgm:scene3d>
+    <dgm:sp3d/>
+    <dgm:txPr/>
+    <dgm:style>
+      <a:lnRef idx="2">
+        <a:scrgbClr r="0" g="0" b="0"/>
+      </a:lnRef>
+      <a:fillRef idx="1">
+        <a:scrgbClr r="0" g="0" b="0"/>
+      </a:fillRef>
+      <a:effectRef idx="0">
+        <a:scrgbClr r="0" g="0" b="0"/>
+      </a:effectRef>
+      <a:fontRef idx="minor">
+        <a:schemeClr val="lt1"/>
+      </a:fontRef>
+    </dgm:style>
+  </dgm:styleLbl>
+  <dgm:styleLbl name="node1">
+    <dgm:scene3d>
+      <a:camera prst="orthographicFront"/>
+      <a:lightRig rig="threePt" dir="t"/>
+    </dgm:scene3d>
+    <dgm:sp3d/>
+    <dgm:txPr/>
+    <dgm:style>
+      <a:lnRef idx="2">
+        <a:scrgbClr r="0" g="0" b="0"/>
+      </a:lnRef>
+      <a:fillRef idx="1">
+        <a:scrgbClr r="0" g="0" b="0"/>
+      </a:fillRef>
+      <a:effectRef idx="0">
+        <a:scrgbClr r="0" g="0" b="0"/>
+      </a:effectRef>
+      <a:fontRef idx="minor">
+        <a:schemeClr val="lt1"/>
+      </a:fontRef>
+    </dgm:style>
+  </dgm:styleLbl>
+  <dgm:styleLbl name="node2">
+    <dgm:scene3d>
+      <a:camera prst="orthographicFront"/>
+      <a:lightRig rig="threePt" dir="t"/>
+    </dgm:scene3d>
+    <dgm:sp3d/>
+    <dgm:txPr/>
+    <dgm:style>
+      <a:lnRef idx="2">
+        <a:scrgbClr r="0" g="0" b="0"/>
+      </a:lnRef>
+      <a:fillRef idx="1">
+        <a:scrgbClr r="0" g="0" b="0"/>
+      </a:fillRef>
+      <a:effectRef idx="0">
+        <a:scrgbClr r="0" g="0" b="0"/>
+      </a:effectRef>
+      <a:fontRef idx="minor">
+        <a:schemeClr val="lt1"/>
+      </a:fontRef>
+    </dgm:style>
+  </dgm:styleLbl>
+  <dgm:styleLbl name="node3">
+    <dgm:scene3d>
+      <a:camera prst="orthographicFront"/>
+      <a:lightRig rig="threePt" dir="t"/>
+    </dgm:scene3d>
+    <dgm:sp3d/>
+    <dgm:txPr/>
+    <dgm:style>
+      <a:lnRef idx="2">
+        <a:scrgbClr r="0" g="0" b="0"/>
+      </a:lnRef>
+      <a:fillRef idx="1">
+        <a:scrgbClr r="0" g="0" b="0"/>
+      </a:fillRef>
+      <a:effectRef idx="0">
+        <a:scrgbClr r="0" g="0" b="0"/>
+      </a:effectRef>
+      <a:fontRef idx="minor">
+        <a:schemeClr val="lt1"/>
+      </a:fontRef>
+    </dgm:style>
+  </dgm:styleLbl>
+  <dgm:styleLbl name="node4">
+    <dgm:scene3d>
+      <a:camera prst="orthographicFront"/>
+      <a:lightRig rig="threePt" dir="t"/>
+    </dgm:scene3d>
+    <dgm:sp3d/>
+    <dgm:txPr/>
+    <dgm:style>
+      <a:lnRef idx="2">
+        <a:scrgbClr r="0" g="0" b="0"/>
+      </a:lnRef>
+      <a:fillRef idx="1">
+        <a:scrgbClr r="0" g="0" b="0"/>
+      </a:fillRef>
+      <a:effectRef idx="0">
+        <a:scrgbClr r="0" g="0" b="0"/>
+      </a:effectRef>
+      <a:fontRef idx="minor">
+        <a:schemeClr val="lt1"/>
+      </a:fontRef>
+    </dgm:style>
+  </dgm:styleLbl>
+  <dgm:styleLbl name="fgImgPlace1">
+    <dgm:scene3d>
+      <a:camera prst="orthographicFront"/>
+      <a:lightRig rig="threePt" dir="t"/>
+    </dgm:scene3d>
+    <dgm:sp3d/>
+    <dgm:txPr/>
+    <dgm:style>
+      <a:lnRef idx="2">
+        <a:scrgbClr r="0" g="0" b="0"/>
+      </a:lnRef>
+      <a:fillRef idx="1">
+        <a:scrgbClr r="0" g="0" b="0"/>
+      </a:fillRef>
+      <a:effectRef idx="0">
+        <a:scrgbClr r="0" g="0" b="0"/>
+      </a:effectRef>
+      <a:fontRef idx="minor"/>
+    </dgm:style>
+  </dgm:styleLbl>
+  <dgm:styleLbl name="alignImgPlace1">
+    <dgm:scene3d>
+      <a:camera prst="orthographicFront"/>
+      <a:lightRig rig="threePt" dir="t"/>
+    </dgm:scene3d>
+    <dgm:sp3d/>
+    <dgm:txPr/>
+    <dgm:style>
+      <a:lnRef idx="2">
+        <a:scrgbClr r="0" g="0" b="0"/>
+      </a:lnRef>
+      <a:fillRef idx="1">
+        <a:scrgbClr r="0" g="0" b="0"/>
+      </a:fillRef>
+      <a:effectRef idx="0">
+        <a:scrgbClr r="0" g="0" b="0"/>
+      </a:effectRef>
+      <a:fontRef idx="minor"/>
+    </dgm:style>
+  </dgm:styleLbl>
+  <dgm:styleLbl name="bgImgPlace1">
+    <dgm:scene3d>
+      <a:camera prst="orthographicFront"/>
+      <a:lightRig rig="threePt" dir="t"/>
+    </dgm:scene3d>
+    <dgm:sp3d/>
+    <dgm:txPr/>
+    <dgm:style>
+      <a:lnRef idx="2">
+        <a:scrgbClr r="0" g="0" b="0"/>
+      </a:lnRef>
+      <a:fillRef idx="1">
+        <a:scrgbClr r="0" g="0" b="0"/>
+      </a:fillRef>
+      <a:effectRef idx="0">
+        <a:scrgbClr r="0" g="0" b="0"/>
+      </a:effectRef>
+      <a:fontRef idx="minor"/>
+    </dgm:style>
+  </dgm:styleLbl>
+  <dgm:styleLbl name="sibTrans2D1">
+    <dgm:scene3d>
+      <a:camera prst="orthographicFront"/>
+      <a:lightRig rig="threePt" dir="t"/>
+    </dgm:scene3d>
+    <dgm:sp3d/>
+    <dgm:txPr/>
+    <dgm:style>
+      <a:lnRef idx="0">
+        <a:scrgbClr r="0" g="0" b="0"/>
+      </a:lnRef>
+      <a:fillRef idx="1">
+        <a:scrgbClr r="0" g="0" b="0"/>
+      </a:fillRef>
+      <a:effectRef idx="0">
+        <a:scrgbClr r="0" g="0" b="0"/>
+      </a:effectRef>
+      <a:fontRef idx="minor">
+        <a:schemeClr val="lt1"/>
+      </a:fontRef>
+    </dgm:style>
+  </dgm:styleLbl>
+  <dgm:styleLbl name="fgSibTrans2D1">
+    <dgm:scene3d>
+      <a:camera prst="orthographicFront"/>
+      <a:lightRig rig="threePt" dir="t"/>
+    </dgm:scene3d>
+    <dgm:sp3d/>
+    <dgm:txPr/>
+    <dgm:style>
+      <a:lnRef idx="0">
+        <a:scrgbClr r="0" g="0" b="0"/>
+      </a:lnRef>
+      <a:fillRef idx="1">
+        <a:scrgbClr r="0" g="0" b="0"/>
+      </a:fillRef>
+      <a:effectRef idx="0">
+        <a:scrgbClr r="0" g="0" b="0"/>
+      </a:effectRef>
+      <a:fontRef idx="minor">
+        <a:schemeClr val="lt1"/>
+      </a:fontRef>
+    </dgm:style>
+  </dgm:styleLbl>
+  <dgm:styleLbl name="bgSibTrans2D1">
+    <dgm:scene3d>
+      <a:camera prst="orthographicFront"/>
+      <a:lightRig rig="threePt" dir="t"/>
+    </dgm:scene3d>
+    <dgm:sp3d/>
+    <dgm:txPr/>
+    <dgm:style>
+      <a:lnRef idx="0">
+        <a:scrgbClr r="0" g="0" b="0"/>
+      </a:lnRef>
+      <a:fillRef idx="1">
+        <a:scrgbClr r="0" g="0" b="0"/>
+      </a:fillRef>
+      <a:effectRef idx="0">
+        <a:scrgbClr r="0" g="0" b="0"/>
+      </a:effectRef>
+      <a:fontRef idx="minor">
+        <a:schemeClr val="lt1"/>
+      </a:fontRef>
+    </dgm:style>
+  </dgm:styleLbl>
+  <dgm:styleLbl name="sibTrans1D1">
+    <dgm:scene3d>
+      <a:camera prst="orthographicFront"/>
+      <a:lightRig rig="threePt" dir="t"/>
+    </dgm:scene3d>
+    <dgm:sp3d/>
+    <dgm:txPr/>
+    <dgm:style>
+      <a:lnRef idx="1">
+        <a:scrgbClr r="0" g="0" b="0"/>
+      </a:lnRef>
+      <a:fillRef idx="0">
+        <a:scrgbClr r="0" g="0" b="0"/>
+      </a:fillRef>
+      <a:effectRef idx="0">
+        <a:scrgbClr r="0" g="0" b="0"/>
+      </a:effectRef>
+      <a:fontRef idx="minor"/>
+    </dgm:style>
+  </dgm:styleLbl>
+  <dgm:styleLbl name="callout">
+    <dgm:scene3d>
+      <a:camera prst="orthographicFront"/>
+      <a:lightRig rig="threePt" dir="t"/>
+    </dgm:scene3d>
+    <dgm:sp3d/>
+    <dgm:txPr/>
+    <dgm:style>
+      <a:lnRef idx="2">
+        <a:scrgbClr r="0" g="0" b="0"/>
+      </a:lnRef>
+      <a:fillRef idx="1">
+        <a:scrgbClr r="0" g="0" b="0"/>
+      </a:fillRef>
+      <a:effectRef idx="0">
+        <a:scrgbClr r="0" g="0" b="0"/>
+      </a:effectRef>
+      <a:fontRef idx="minor"/>
+    </dgm:style>
+  </dgm:styleLbl>
+  <dgm:styleLbl name="asst0">
+    <dgm:scene3d>
+      <a:camera prst="orthographicFront"/>
+      <a:lightRig rig="threePt" dir="t"/>
+    </dgm:scene3d>
+    <dgm:sp3d/>
+    <dgm:txPr/>
+    <dgm:style>
+      <a:lnRef idx="2">
+        <a:scrgbClr r="0" g="0" b="0"/>
+      </a:lnRef>
+      <a:fillRef idx="1">
+        <a:scrgbClr r="0" g="0" b="0"/>
+      </a:fillRef>
+      <a:effectRef idx="0">
+        <a:scrgbClr r="0" g="0" b="0"/>
+      </a:effectRef>
+      <a:fontRef idx="minor">
+        <a:schemeClr val="lt1"/>
+      </a:fontRef>
+    </dgm:style>
+  </dgm:styleLbl>
+  <dgm:styleLbl name="asst1">
+    <dgm:scene3d>
+      <a:camera prst="orthographicFront"/>
+      <a:lightRig rig="threePt" dir="t"/>
+    </dgm:scene3d>
+    <dgm:sp3d/>
+    <dgm:txPr/>
+    <dgm:style>
+      <a:lnRef idx="2">
+        <a:scrgbClr r="0" g="0" b="0"/>
+      </a:lnRef>
+      <a:fillRef idx="1">
+        <a:scrgbClr r="0" g="0" b="0"/>
+      </a:fillRef>
+      <a:effectRef idx="0">
+        <a:scrgbClr r="0" g="0" b="0"/>
+      </a:effectRef>
+      <a:fontRef idx="minor">
+        <a:schemeClr val="lt1"/>
+      </a:fontRef>
+    </dgm:style>
+  </dgm:styleLbl>
+  <dgm:styleLbl name="asst2">
+    <dgm:scene3d>
+      <a:camera prst="orthographicFront"/>
+      <a:lightRig rig="threePt" dir="t"/>
+    </dgm:scene3d>
+    <dgm:sp3d/>
+    <dgm:txPr/>
+    <dgm:style>
+      <a:lnRef idx="2">
+        <a:scrgbClr r="0" g="0" b="0"/>
+      </a:lnRef>
+      <a:fillRef idx="1">
+        <a:scrgbClr r="0" g="0" b="0"/>
+      </a:fillRef>
+      <a:effectRef idx="0">
+        <a:scrgbClr r="0" g="0" b="0"/>
+      </a:effectRef>
+      <a:fontRef idx="minor">
+        <a:schemeClr val="lt1"/>
+      </a:fontRef>
+    </dgm:style>
+  </dgm:styleLbl>
+  <dgm:styleLbl name="asst3">
+    <dgm:scene3d>
+      <a:camera prst="orthographicFront"/>
+      <a:lightRig rig="threePt" dir="t"/>
+    </dgm:scene3d>
+    <dgm:sp3d/>
+    <dgm:txPr/>
+    <dgm:style>
+      <a:lnRef idx="2">
+        <a:scrgbClr r="0" g="0" b="0"/>
+      </a:lnRef>
+      <a:fillRef idx="1">
+        <a:scrgbClr r="0" g="0" b="0"/>
+      </a:fillRef>
+      <a:effectRef idx="0">
+        <a:scrgbClr r="0" g="0" b="0"/>
+      </a:effectRef>
+      <a:fontRef idx="minor">
+        <a:schemeClr val="lt1"/>
+      </a:fontRef>
+    </dgm:style>
+  </dgm:styleLbl>
+  <dgm:styleLbl name="asst4">
+    <dgm:scene3d>
+      <a:camera prst="orthographicFront"/>
+      <a:lightRig rig="threePt" dir="t"/>
+    </dgm:scene3d>
+    <dgm:sp3d/>
+    <dgm:txPr/>
+    <dgm:style>
+      <a:lnRef idx="2">
+        <a:scrgbClr r="0" g="0" b="0"/>
+      </a:lnRef>
+      <a:fillRef idx="1">
+        <a:scrgbClr r="0" g="0" b="0"/>
+      </a:fillRef>
+      <a:effectRef idx="0">
+        <a:scrgbClr r="0" g="0" b="0"/>
+      </a:effectRef>
+      <a:fontRef idx="minor">
+        <a:schemeClr val="lt1"/>
+      </a:fontRef>
+    </dgm:style>
+  </dgm:styleLbl>
+  <dgm:styleLbl name="parChTrans2D1">
+    <dgm:scene3d>
+      <a:camera prst="orthographicFront"/>
+      <a:lightRig rig="threePt" dir="t"/>
+    </dgm:scene3d>
+    <dgm:sp3d/>
+    <dgm:txPr/>
+    <dgm:style>
+      <a:lnRef idx="2">
+        <a:scrgbClr r="0" g="0" b="0"/>
+      </a:lnRef>
+      <a:fillRef idx="1">
+        <a:scrgbClr r="0" g="0" b="0"/>
+      </a:fillRef>
+      <a:effectRef idx="0">
+        <a:scrgbClr r="0" g="0" b="0"/>
+      </a:effectRef>
+      <a:fontRef idx="minor">
+        <a:schemeClr val="lt1"/>
+      </a:fontRef>
+    </dgm:style>
+  </dgm:styleLbl>
+  <dgm:styleLbl name="parChTrans2D2">
+    <dgm:scene3d>
+      <a:camera prst="orthographicFront"/>
+      <a:lightRig rig="threePt" dir="t"/>
+    </dgm:scene3d>
+    <dgm:sp3d/>
+    <dgm:txPr/>
+    <dgm:style>
+      <a:lnRef idx="2">
+        <a:scrgbClr r="0" g="0" b="0"/>
+      </a:lnRef>
+      <a:fillRef idx="1">
+        <a:scrgbClr r="0" g="0" b="0"/>
+      </a:fillRef>
+      <a:effectRef idx="0">
+        <a:scrgbClr r="0" g="0" b="0"/>
+      </a:effectRef>
+      <a:fontRef idx="minor">
+        <a:schemeClr val="lt1"/>
+      </a:fontRef>
+    </dgm:style>
+  </dgm:styleLbl>
+  <dgm:styleLbl name="parChTrans2D3">
+    <dgm:scene3d>
+      <a:camera prst="orthographicFront"/>
+      <a:lightRig rig="threePt" dir="t"/>
+    </dgm:scene3d>
+    <dgm:sp3d/>
+    <dgm:txPr/>
+    <dgm:style>
+      <a:lnRef idx="2">
+        <a:scrgbClr r="0" g="0" b="0"/>
+      </a:lnRef>
+      <a:fillRef idx="1">
+        <a:scrgbClr r="0" g="0" b="0"/>
+      </a:fillRef>
+      <a:effectRef idx="0">
+        <a:scrgbClr r="0" g="0" b="0"/>
+      </a:effectRef>
+      <a:fontRef idx="minor">
+        <a:schemeClr val="lt1"/>
+      </a:fontRef>
+    </dgm:style>
+  </dgm:styleLbl>
+  <dgm:styleLbl name="parChTrans2D4">
+    <dgm:scene3d>
+      <a:camera prst="orthographicFront"/>
+      <a:lightRig rig="threePt" dir="t"/>
+    </dgm:scene3d>
+    <dgm:sp3d/>
+    <dgm:txPr/>
+    <dgm:style>
+      <a:lnRef idx="2">
+        <a:scrgbClr r="0" g="0" b="0"/>
+      </a:lnRef>
+      <a:fillRef idx="1">
+        <a:scrgbClr r="0" g="0" b="0"/>
+      </a:fillRef>
+      <a:effectRef idx="0">
+        <a:scrgbClr r="0" g="0" b="0"/>
+      </a:effectRef>
+      <a:fontRef idx="minor">
+        <a:schemeClr val="lt1"/>
+      </a:fontRef>
+    </dgm:style>
+  </dgm:styleLbl>
+  <dgm:styleLbl name="parChTrans1D1">
+    <dgm:scene3d>
+      <a:camera prst="orthographicFront"/>
+      <a:lightRig rig="threePt" dir="t"/>
+    </dgm:scene3d>
+    <dgm:sp3d/>
+    <dgm:txPr/>
+    <dgm:style>
+      <a:lnRef idx="2">
+        <a:scrgbClr r="0" g="0" b="0"/>
+      </a:lnRef>
+      <a:fillRef idx="0">
+        <a:scrgbClr r="0" g="0" b="0"/>
+      </a:fillRef>
+      <a:effectRef idx="0">
+        <a:scrgbClr r="0" g="0" b="0"/>
+      </a:effectRef>
+      <a:fontRef idx="minor"/>
+    </dgm:style>
+  </dgm:styleLbl>
+  <dgm:styleLbl name="parChTrans1D2">
+    <dgm:scene3d>
+      <a:camera prst="orthographicFront"/>
+      <a:lightRig rig="threePt" dir="t"/>
+    </dgm:scene3d>
+    <dgm:sp3d/>
+    <dgm:txPr/>
+    <dgm:style>
+      <a:lnRef idx="2">
+        <a:scrgbClr r="0" g="0" b="0"/>
+      </a:lnRef>
+      <a:fillRef idx="0">
+        <a:scrgbClr r="0" g="0" b="0"/>
+      </a:fillRef>
+      <a:effectRef idx="0">
+        <a:scrgbClr r="0" g="0" b="0"/>
+      </a:effectRef>
+      <a:fontRef idx="minor"/>
+    </dgm:style>
+  </dgm:styleLbl>
+  <dgm:styleLbl name="parChTrans1D3">
+    <dgm:scene3d>
+      <a:camera prst="orthographicFront"/>
+      <a:lightRig rig="threePt" dir="t"/>
+    </dgm:scene3d>
+    <dgm:sp3d/>
+    <dgm:txPr/>
+    <dgm:style>
+      <a:lnRef idx="2">
+        <a:scrgbClr r="0" g="0" b="0"/>
+      </a:lnRef>
+      <a:fillRef idx="0">
+        <a:scrgbClr r="0" g="0" b="0"/>
+      </a:fillRef>
+      <a:effectRef idx="0">
+        <a:scrgbClr r="0" g="0" b="0"/>
+      </a:effectRef>
+      <a:fontRef idx="minor"/>
+    </dgm:style>
+  </dgm:styleLbl>
+  <dgm:styleLbl name="parChTrans1D4">
+    <dgm:scene3d>
+      <a:camera prst="orthographicFront"/>
+      <a:lightRig rig="threePt" dir="t"/>
+    </dgm:scene3d>
+    <dgm:sp3d/>
+    <dgm:txPr/>
+    <dgm:style>
+      <a:lnRef idx="2">
+        <a:scrgbClr r="0" g="0" b="0"/>
+      </a:lnRef>
+      <a:fillRef idx="0">
+        <a:scrgbClr r="0" g="0" b="0"/>
+      </a:fillRef>
+      <a:effectRef idx="0">
+        <a:scrgbClr r="0" g="0" b="0"/>
+      </a:effectRef>
+      <a:fontRef idx="minor"/>
+    </dgm:style>
+  </dgm:styleLbl>
+  <dgm:styleLbl name="fgAcc1">
+    <dgm:scene3d>
+      <a:camera prst="orthographicFront"/>
+      <a:lightRig rig="threePt" dir="t"/>
+    </dgm:scene3d>
+    <dgm:sp3d/>
+    <dgm:txPr/>
+    <dgm:style>
+      <a:lnRef idx="2">
+        <a:scrgbClr r="0" g="0" b="0"/>
+      </a:lnRef>
+      <a:fillRef idx="1">
+        <a:scrgbClr r="0" g="0" b="0"/>
+      </a:fillRef>
+      <a:effectRef idx="0">
+        <a:scrgbClr r="0" g="0" b="0"/>
+      </a:effectRef>
+      <a:fontRef idx="minor"/>
+    </dgm:style>
+  </dgm:styleLbl>
+  <dgm:styleLbl name="conFgAcc1">
+    <dgm:scene3d>
+      <a:camera prst="orthographicFront"/>
+      <a:lightRig rig="threePt" dir="t"/>
+    </dgm:scene3d>
+    <dgm:sp3d/>
+    <dgm:txPr/>
+    <dgm:style>
+      <a:lnRef idx="2">
+        <a:scrgbClr r="0" g="0" b="0"/>
+      </a:lnRef>
+      <a:fillRef idx="1">
+        <a:scrgbClr r="0" g="0" b="0"/>
+      </a:fillRef>
+      <a:effectRef idx="0">
+        <a:scrgbClr r="0" g="0" b="0"/>
+      </a:effectRef>
+      <a:fontRef idx="minor"/>
+    </dgm:style>
+  </dgm:styleLbl>
+  <dgm:styleLbl name="alignAcc1">
+    <dgm:scene3d>
+      <a:camera prst="orthographicFront"/>
+      <a:lightRig rig="threePt" dir="t"/>
+    </dgm:scene3d>
+    <dgm:sp3d/>
+    <dgm:txPr/>
+    <dgm:style>
+      <a:lnRef idx="2">
+        <a:scrgbClr r="0" g="0" b="0"/>
+      </a:lnRef>
+      <a:fillRef idx="1">
+        <a:scrgbClr r="0" g="0" b="0"/>
+      </a:fillRef>
+      <a:effectRef idx="0">
+        <a:scrgbClr r="0" g="0" b="0"/>
+      </a:effectRef>
+      <a:fontRef idx="minor"/>
+    </dgm:style>
+  </dgm:styleLbl>
+  <dgm:styleLbl name="trAlignAcc1">
+    <dgm:scene3d>
+      <a:camera prst="orthographicFront"/>
+      <a:lightRig rig="threePt" dir="t"/>
+    </dgm:scene3d>
+    <dgm:sp3d/>
+    <dgm:txPr/>
+    <dgm:style>
+      <a:lnRef idx="1">
+        <a:scrgbClr r="0" g="0" b="0"/>
+      </a:lnRef>
+      <a:fillRef idx="1">
+        <a:scrgbClr r="0" g="0" b="0"/>
+      </a:fillRef>
+      <a:effectRef idx="0">
+        <a:scrgbClr r="0" g="0" b="0"/>
+      </a:effectRef>
+      <a:fontRef idx="minor"/>
+    </dgm:style>
+  </dgm:styleLbl>
+  <dgm:styleLbl name="bgAcc1">
+    <dgm:scene3d>
+      <a:camera prst="orthographicFront"/>
+      <a:lightRig rig="threePt" dir="t"/>
+    </dgm:scene3d>
+    <dgm:sp3d/>
+    <dgm:txPr/>
+    <dgm:style>
+      <a:lnRef idx="2">
+        <a:scrgbClr r="0" g="0" b="0"/>
+      </a:lnRef>
+      <a:fillRef idx="1">
+        <a:scrgbClr r="0" g="0" b="0"/>
+      </a:fillRef>
+      <a:effectRef idx="0">
+        <a:scrgbClr r="0" g="0" b="0"/>
+      </a:effectRef>
+      <a:fontRef idx="minor"/>
+    </dgm:style>
+  </dgm:styleLbl>
+  <dgm:styleLbl name="solidFgAcc1">
+    <dgm:scene3d>
+      <a:camera prst="orthographicFront"/>
+      <a:lightRig rig="threePt" dir="t"/>
+    </dgm:scene3d>
+    <dgm:sp3d/>
+    <dgm:txPr/>
+    <dgm:style>
+      <a:lnRef idx="2">
+        <a:scrgbClr r="0" g="0" b="0"/>
+      </a:lnRef>
+      <a:fillRef idx="1">
+        <a:scrgbClr r="0" g="0" b="0"/>
+      </a:fillRef>
+      <a:effectRef idx="0">
+        <a:scrgbClr r="0" g="0" b="0"/>
+      </a:effectRef>
+      <a:fontRef idx="minor"/>
+    </dgm:style>
+  </dgm:styleLbl>
+  <dgm:styleLbl name="solidAlignAcc1">
+    <dgm:scene3d>
+      <a:camera prst="orthographicFront"/>
+      <a:lightRig rig="threePt" dir="t"/>
+    </dgm:scene3d>
+    <dgm:sp3d/>
+    <dgm:txPr/>
+    <dgm:style>
+      <a:lnRef idx="2">
+        <a:scrgbClr r="0" g="0" b="0"/>
+      </a:lnRef>
+      <a:fillRef idx="1">
+        <a:scrgbClr r="0" g="0" b="0"/>
+      </a:fillRef>
+      <a:effectRef idx="0">
+        <a:scrgbClr r="0" g="0" b="0"/>
+      </a:effectRef>
+      <a:fontRef idx="minor"/>
+    </dgm:style>
+  </dgm:styleLbl>
+  <dgm:styleLbl name="solidBgAcc1">
+    <dgm:scene3d>
+      <a:camera prst="orthographicFront"/>
+      <a:lightRig rig="threePt" dir="t"/>
+    </dgm:scene3d>
+    <dgm:sp3d/>
+    <dgm:txPr/>
+    <dgm:style>
+      <a:lnRef idx="2">
+        <a:scrgbClr r="0" g="0" b="0"/>
+      </a:lnRef>
+      <a:fillRef idx="1">
+        <a:scrgbClr r="0" g="0" b="0"/>
+      </a:fillRef>
+      <a:effectRef idx="0">
+        <a:scrgbClr r="0" g="0" b="0"/>
+      </a:effectRef>
+      <a:fontRef idx="minor"/>
+    </dgm:style>
+  </dgm:styleLbl>
+  <dgm:styleLbl name="fgAccFollowNode1">
+    <dgm:scene3d>
+      <a:camera prst="orthographicFront"/>
+      <a:lightRig rig="threePt" dir="t"/>
+    </dgm:scene3d>
+    <dgm:sp3d/>
+    <dgm:txPr/>
+    <dgm:style>
+      <a:lnRef idx="2">
+        <a:scrgbClr r="0" g="0" b="0"/>
+      </a:lnRef>
+      <a:fillRef idx="1">
+        <a:scrgbClr r="0" g="0" b="0"/>
+      </a:fillRef>
+      <a:effectRef idx="0">
+        <a:scrgbClr r="0" g="0" b="0"/>
+      </a:effectRef>
+      <a:fontRef idx="minor"/>
+    </dgm:style>
+  </dgm:styleLbl>
+  <dgm:styleLbl name="alignAccFollowNode1">
+    <dgm:scene3d>
+      <a:camera prst="orthographicFront"/>
+      <a:lightRig rig="threePt" dir="t"/>
+    </dgm:scene3d>
+    <dgm:sp3d/>
+    <dgm:txPr/>
+    <dgm:style>
+      <a:lnRef idx="2">
+        <a:scrgbClr r="0" g="0" b="0"/>
+      </a:lnRef>
+      <a:fillRef idx="1">
+        <a:scrgbClr r="0" g="0" b="0"/>
+      </a:fillRef>
+      <a:effectRef idx="0">
+        <a:scrgbClr r="0" g="0" b="0"/>
+      </a:effectRef>
+      <a:fontRef idx="minor"/>
+    </dgm:style>
+  </dgm:styleLbl>
+  <dgm:styleLbl name="bgAccFollowNode1">
+    <dgm:scene3d>
+      <a:camera prst="orthographicFront"/>
+      <a:lightRig rig="threePt" dir="t"/>
+    </dgm:scene3d>
+    <dgm:sp3d/>
+    <dgm:txPr/>
+    <dgm:style>
+      <a:lnRef idx="2">
+        <a:scrgbClr r="0" g="0" b="0"/>
+      </a:lnRef>
+      <a:fillRef idx="1">
+        <a:scrgbClr r="0" g="0" b="0"/>
+      </a:fillRef>
+      <a:effectRef idx="0">
+        <a:scrgbClr r="0" g="0" b="0"/>
+      </a:effectRef>
+      <a:fontRef idx="minor"/>
+    </dgm:style>
+  </dgm:styleLbl>
+  <dgm:styleLbl name="fgAcc0">
+    <dgm:scene3d>
+      <a:camera prst="orthographicFront"/>
+      <a:lightRig rig="threePt" dir="t"/>
+    </dgm:scene3d>
+    <dgm:sp3d/>
+    <dgm:txPr/>
+    <dgm:style>
+      <a:lnRef idx="2">
+        <a:scrgbClr r="0" g="0" b="0"/>
+      </a:lnRef>
+      <a:fillRef idx="1">
+        <a:scrgbClr r="0" g="0" b="0"/>
+      </a:fillRef>
+      <a:effectRef idx="0">
+        <a:scrgbClr r="0" g="0" b="0"/>
+      </a:effectRef>
+      <a:fontRef idx="minor"/>
+    </dgm:style>
+  </dgm:styleLbl>
+  <dgm:styleLbl name="fgAcc2">
+    <dgm:scene3d>
+      <a:camera prst="orthographicFront"/>
+      <a:lightRig rig="threePt" dir="t"/>
+    </dgm:scene3d>
+    <dgm:sp3d/>
+    <dgm:txPr/>
+    <dgm:style>
+      <a:lnRef idx="2">
+        <a:scrgbClr r="0" g="0" b="0"/>
+      </a:lnRef>
+      <a:fillRef idx="1">
+        <a:scrgbClr r="0" g="0" b="0"/>
+      </a:fillRef>
+      <a:effectRef idx="0">
+        <a:scrgbClr r="0" g="0" b="0"/>
+      </a:effectRef>
+      <a:fontRef idx="minor"/>
+    </dgm:style>
+  </dgm:styleLbl>
+  <dgm:styleLbl name="fgAcc3">
+    <dgm:scene3d>
+      <a:camera prst="orthographicFront"/>
+      <a:lightRig rig="threePt" dir="t"/>
+    </dgm:scene3d>
+    <dgm:sp3d/>
+    <dgm:txPr/>
+    <dgm:style>
+      <a:lnRef idx="2">
+        <a:scrgbClr r="0" g="0" b="0"/>
+      </a:lnRef>
+      <a:fillRef idx="1">
+        <a:scrgbClr r="0" g="0" b="0"/>
+      </a:fillRef>
+      <a:effectRef idx="0">
+        <a:scrgbClr r="0" g="0" b="0"/>
+      </a:effectRef>
+      <a:fontRef idx="minor"/>
+    </dgm:style>
+  </dgm:styleLbl>
+  <dgm:styleLbl name="fgAcc4">
+    <dgm:scene3d>
+      <a:camera prst="orthographicFront"/>
+      <a:lightRig rig="threePt" dir="t"/>
+    </dgm:scene3d>
+    <dgm:sp3d/>
+    <dgm:txPr/>
+    <dgm:style>
+      <a:lnRef idx="2">
+        <a:scrgbClr r="0" g="0" b="0"/>
+      </a:lnRef>
+      <a:fillRef idx="1">
+        <a:scrgbClr r="0" g="0" b="0"/>
+      </a:fillRef>
+      <a:effectRef idx="0">
+        <a:scrgbClr r="0" g="0" b="0"/>
+      </a:effectRef>
+      <a:fontRef idx="minor"/>
+    </dgm:style>
+  </dgm:styleLbl>
+  <dgm:styleLbl name="bgShp">
+    <dgm:scene3d>
+      <a:camera prst="orthographicFront"/>
+      <a:lightRig rig="threePt" dir="t"/>
+    </dgm:scene3d>
+    <dgm:sp3d/>
+    <dgm:txPr/>
+    <dgm:style>
+      <a:lnRef idx="0">
+        <a:scrgbClr r="0" g="0" b="0"/>
+      </a:lnRef>
+      <a:fillRef idx="1">
+        <a:scrgbClr r="0" g="0" b="0"/>
+      </a:fillRef>
+      <a:effectRef idx="0">
+        <a:scrgbClr r="0" g="0" b="0"/>
+      </a:effectRef>
+      <a:fontRef idx="minor"/>
+    </dgm:style>
+  </dgm:styleLbl>
+  <dgm:styleLbl name="dkBgShp">
+    <dgm:scene3d>
+      <a:camera prst="orthographicFront"/>
+      <a:lightRig rig="threePt" dir="t"/>
+    </dgm:scene3d>
+    <dgm:sp3d/>
+    <dgm:txPr/>
+    <dgm:style>
+      <a:lnRef idx="0">
+        <a:scrgbClr r="0" g="0" b="0"/>
+      </a:lnRef>
+      <a:fillRef idx="1">
+        <a:scrgbClr r="0" g="0" b="0"/>
+      </a:fillRef>
+      <a:effectRef idx="0">
+        <a:scrgbClr r="0" g="0" b="0"/>
+      </a:effectRef>
+      <a:fontRef idx="minor"/>
+    </dgm:style>
+  </dgm:styleLbl>
+  <dgm:styleLbl name="trBgShp">
+    <dgm:scene3d>
+      <a:camera prst="orthographicFront"/>
+      <a:lightRig rig="threePt" dir="t"/>
+    </dgm:scene3d>
+    <dgm:sp3d/>
+    <dgm:txPr/>
+    <dgm:style>
+      <a:lnRef idx="0">
+        <a:scrgbClr r="0" g="0" b="0"/>
+      </a:lnRef>
+      <a:fillRef idx="1">
+        <a:scrgbClr r="0" g="0" b="0"/>
+      </a:fillRef>
+      <a:effectRef idx="0">
+        <a:scrgbClr r="0" g="0" b="0"/>
+      </a:effectRef>
+      <a:fontRef idx="minor"/>
+    </dgm:style>
+  </dgm:styleLbl>
+  <dgm:styleLbl name="fgShp">
+    <dgm:scene3d>
+      <a:camera prst="orthographicFront"/>
+      <a:lightRig rig="threePt" dir="t"/>
+    </dgm:scene3d>
+    <dgm:sp3d/>
+    <dgm:txPr/>
+    <dgm:style>
+      <a:lnRef idx="2">
+        <a:scrgbClr r="0" g="0" b="0"/>
+      </a:lnRef>
+      <a:fillRef idx="1">
+        <a:scrgbClr r="0" g="0" b="0"/>
+      </a:fillRef>
+      <a:effectRef idx="0">
+        <a:scrgbClr r="0" g="0" b="0"/>
+      </a:effectRef>
+      <a:fontRef idx="minor"/>
+    </dgm:style>
+  </dgm:styleLbl>
+  <dgm:styleLbl name="revTx">
+    <dgm:scene3d>
+      <a:camera prst="orthographicFront"/>
+      <a:lightRig rig="threePt" dir="t"/>
+    </dgm:scene3d>
+    <dgm:sp3d/>
+    <dgm:txPr/>
+    <dgm:style>
+      <a:lnRef idx="0">
+        <a:scrgbClr r="0" g="0" b="0"/>
+      </a:lnRef>
+      <a:fillRef idx="0">
+        <a:scrgbClr r="0" g="0" b="0"/>
+      </a:fillRef>
+      <a:effectRef idx="0">
+        <a:scrgbClr r="0" g="0" b="0"/>
+      </a:effectRef>
+      <a:fontRef idx="minor"/>
+    </dgm:style>
+  </dgm:styleLbl>
+</dgm:styleDef>
 </file>
 
 <file path=ppt/notesMasters/notesMaster1.xml><?xml version="1.0" encoding="utf-8"?>
@@ -203,7 +3253,7 @@
           <a:p>
             <a:fld id="{C80351C4-DA09-E341-A3E7-DF10A7507EBF}" type="datetimeFigureOut">
               <a:rPr lang="en-US" smtClean="0"/>
-              <a:t>9/27/23</a:t>
+              <a:t>10/2/23</a:t>
             </a:fld>
             <a:endParaRPr lang="en-US"/>
           </a:p>
@@ -712,7 +3762,7 @@
     </p:spTree>
     <p:extLst>
       <p:ext uri="{BB962C8B-B14F-4D97-AF65-F5344CB8AC3E}">
-        <p14:creationId xmlns:p14="http://schemas.microsoft.com/office/powerpoint/2010/main" val="431133927"/>
+        <p14:creationId xmlns:p14="http://schemas.microsoft.com/office/powerpoint/2010/main" val="3396253271"/>
       </p:ext>
     </p:extLst>
   </p:cSld>
@@ -964,7 +4014,7 @@
     </p:spTree>
     <p:extLst>
       <p:ext uri="{BB962C8B-B14F-4D97-AF65-F5344CB8AC3E}">
-        <p14:creationId xmlns:p14="http://schemas.microsoft.com/office/powerpoint/2010/main" val="2527745493"/>
+        <p14:creationId xmlns:p14="http://schemas.microsoft.com/office/powerpoint/2010/main" val="1761372160"/>
       </p:ext>
     </p:extLst>
   </p:cSld>
@@ -1048,7 +4098,7 @@
     </p:spTree>
     <p:extLst>
       <p:ext uri="{BB962C8B-B14F-4D97-AF65-F5344CB8AC3E}">
-        <p14:creationId xmlns:p14="http://schemas.microsoft.com/office/powerpoint/2010/main" val="397478782"/>
+        <p14:creationId xmlns:p14="http://schemas.microsoft.com/office/powerpoint/2010/main" val="1897856300"/>
       </p:ext>
     </p:extLst>
   </p:cSld>
@@ -1132,7 +4182,91 @@
     </p:spTree>
     <p:extLst>
       <p:ext uri="{BB962C8B-B14F-4D97-AF65-F5344CB8AC3E}">
-        <p14:creationId xmlns:p14="http://schemas.microsoft.com/office/powerpoint/2010/main" val="1897856300"/>
+        <p14:creationId xmlns:p14="http://schemas.microsoft.com/office/powerpoint/2010/main" val="397478782"/>
+      </p:ext>
+    </p:extLst>
+  </p:cSld>
+  <p:clrMapOvr>
+    <a:masterClrMapping/>
+  </p:clrMapOvr>
+</p:notes>
+</file>
+
+<file path=ppt/notesSlides/notesSlide9.xml><?xml version="1.0" encoding="utf-8"?>
+<p:notes xmlns:a="http://schemas.openxmlformats.org/drawingml/2006/main" xmlns:r="http://schemas.openxmlformats.org/officeDocument/2006/relationships" xmlns:p="http://schemas.openxmlformats.org/presentationml/2006/main">
+  <p:cSld>
+    <p:spTree>
+      <p:nvGrpSpPr>
+        <p:cNvPr id="1" name=""/>
+        <p:cNvGrpSpPr/>
+        <p:nvPr/>
+      </p:nvGrpSpPr>
+      <p:grpSpPr>
+        <a:xfrm>
+          <a:off x="0" y="0"/>
+          <a:ext cx="0" cy="0"/>
+          <a:chOff x="0" y="0"/>
+          <a:chExt cx="0" cy="0"/>
+        </a:xfrm>
+      </p:grpSpPr>
+      <p:sp>
+        <p:nvSpPr>
+          <p:cNvPr id="2" name="Slide Image Placeholder 1"/>
+          <p:cNvSpPr>
+            <a:spLocks noGrp="1" noRot="1" noChangeAspect="1"/>
+          </p:cNvSpPr>
+          <p:nvPr>
+            <p:ph type="sldImg"/>
+          </p:nvPr>
+        </p:nvSpPr>
+        <p:spPr/>
+      </p:sp>
+      <p:sp>
+        <p:nvSpPr>
+          <p:cNvPr id="3" name="Notes Placeholder 2"/>
+          <p:cNvSpPr>
+            <a:spLocks noGrp="1"/>
+          </p:cNvSpPr>
+          <p:nvPr>
+            <p:ph type="body" idx="1"/>
+          </p:nvPr>
+        </p:nvSpPr>
+        <p:spPr/>
+        <p:txBody>
+          <a:bodyPr/>
+          <a:lstStyle/>
+          <a:p>
+            <a:endParaRPr lang="en-US"/>
+          </a:p>
+        </p:txBody>
+      </p:sp>
+      <p:sp>
+        <p:nvSpPr>
+          <p:cNvPr id="4" name="Slide Number Placeholder 3"/>
+          <p:cNvSpPr>
+            <a:spLocks noGrp="1"/>
+          </p:cNvSpPr>
+          <p:nvPr>
+            <p:ph type="sldNum" sz="quarter" idx="5"/>
+          </p:nvPr>
+        </p:nvSpPr>
+        <p:spPr/>
+        <p:txBody>
+          <a:bodyPr/>
+          <a:lstStyle/>
+          <a:p>
+            <a:fld id="{40CD6F73-39C1-3D44-A3B4-DBD952A5B27D}" type="slidenum">
+              <a:rPr lang="en-US" smtClean="0"/>
+              <a:t>10</a:t>
+            </a:fld>
+            <a:endParaRPr lang="en-US"/>
+          </a:p>
+        </p:txBody>
+      </p:sp>
+    </p:spTree>
+    <p:extLst>
+      <p:ext uri="{BB962C8B-B14F-4D97-AF65-F5344CB8AC3E}">
+        <p14:creationId xmlns:p14="http://schemas.microsoft.com/office/powerpoint/2010/main" val="2938708446"/>
       </p:ext>
     </p:extLst>
   </p:cSld>
@@ -1289,7 +4423,7 @@
           <a:p>
             <a:fld id="{1D334133-EC13-3141-A3C3-C08C1C8969C5}" type="datetimeFigureOut">
               <a:rPr lang="en-US" smtClean="0"/>
-              <a:t>9/27/23</a:t>
+              <a:t>10/2/23</a:t>
             </a:fld>
             <a:endParaRPr lang="en-US"/>
           </a:p>
@@ -1487,7 +4621,7 @@
           <a:p>
             <a:fld id="{1D334133-EC13-3141-A3C3-C08C1C8969C5}" type="datetimeFigureOut">
               <a:rPr lang="en-US" smtClean="0"/>
-              <a:t>9/27/23</a:t>
+              <a:t>10/2/23</a:t>
             </a:fld>
             <a:endParaRPr lang="en-US"/>
           </a:p>
@@ -1695,7 +4829,7 @@
           <a:p>
             <a:fld id="{1D334133-EC13-3141-A3C3-C08C1C8969C5}" type="datetimeFigureOut">
               <a:rPr lang="en-US" smtClean="0"/>
-              <a:t>9/27/23</a:t>
+              <a:t>10/2/23</a:t>
             </a:fld>
             <a:endParaRPr lang="en-US"/>
           </a:p>
@@ -1893,7 +5027,7 @@
           <a:p>
             <a:fld id="{1D334133-EC13-3141-A3C3-C08C1C8969C5}" type="datetimeFigureOut">
               <a:rPr lang="en-US" smtClean="0"/>
-              <a:t>9/27/23</a:t>
+              <a:t>10/2/23</a:t>
             </a:fld>
             <a:endParaRPr lang="en-US"/>
           </a:p>
@@ -2168,7 +5302,7 @@
           <a:p>
             <a:fld id="{1D334133-EC13-3141-A3C3-C08C1C8969C5}" type="datetimeFigureOut">
               <a:rPr lang="en-US" smtClean="0"/>
-              <a:t>9/27/23</a:t>
+              <a:t>10/2/23</a:t>
             </a:fld>
             <a:endParaRPr lang="en-US"/>
           </a:p>
@@ -2433,7 +5567,7 @@
           <a:p>
             <a:fld id="{1D334133-EC13-3141-A3C3-C08C1C8969C5}" type="datetimeFigureOut">
               <a:rPr lang="en-US" smtClean="0"/>
-              <a:t>9/27/23</a:t>
+              <a:t>10/2/23</a:t>
             </a:fld>
             <a:endParaRPr lang="en-US"/>
           </a:p>
@@ -2845,7 +5979,7 @@
           <a:p>
             <a:fld id="{1D334133-EC13-3141-A3C3-C08C1C8969C5}" type="datetimeFigureOut">
               <a:rPr lang="en-US" smtClean="0"/>
-              <a:t>9/27/23</a:t>
+              <a:t>10/2/23</a:t>
             </a:fld>
             <a:endParaRPr lang="en-US"/>
           </a:p>
@@ -2986,7 +6120,7 @@
           <a:p>
             <a:fld id="{1D334133-EC13-3141-A3C3-C08C1C8969C5}" type="datetimeFigureOut">
               <a:rPr lang="en-US" smtClean="0"/>
-              <a:t>9/27/23</a:t>
+              <a:t>10/2/23</a:t>
             </a:fld>
             <a:endParaRPr lang="en-US"/>
           </a:p>
@@ -3099,7 +6233,7 @@
           <a:p>
             <a:fld id="{1D334133-EC13-3141-A3C3-C08C1C8969C5}" type="datetimeFigureOut">
               <a:rPr lang="en-US" smtClean="0"/>
-              <a:t>9/27/23</a:t>
+              <a:t>10/2/23</a:t>
             </a:fld>
             <a:endParaRPr lang="en-US"/>
           </a:p>
@@ -3410,7 +6544,7 @@
           <a:p>
             <a:fld id="{1D334133-EC13-3141-A3C3-C08C1C8969C5}" type="datetimeFigureOut">
               <a:rPr lang="en-US" smtClean="0"/>
-              <a:t>9/27/23</a:t>
+              <a:t>10/2/23</a:t>
             </a:fld>
             <a:endParaRPr lang="en-US"/>
           </a:p>
@@ -3698,7 +6832,7 @@
           <a:p>
             <a:fld id="{1D334133-EC13-3141-A3C3-C08C1C8969C5}" type="datetimeFigureOut">
               <a:rPr lang="en-US" smtClean="0"/>
-              <a:t>9/27/23</a:t>
+              <a:t>10/2/23</a:t>
             </a:fld>
             <a:endParaRPr lang="en-US"/>
           </a:p>
@@ -3939,7 +7073,7 @@
           <a:p>
             <a:fld id="{1D334133-EC13-3141-A3C3-C08C1C8969C5}" type="datetimeFigureOut">
               <a:rPr lang="en-US" smtClean="0"/>
-              <a:t>9/27/23</a:t>
+              <a:t>10/2/23</a:t>
             </a:fld>
             <a:endParaRPr lang="en-US"/>
           </a:p>
@@ -4468,7 +7602,7 @@
           <p:cNvPr id="2" name="Title 1">
             <a:extLst>
               <a:ext uri="{FF2B5EF4-FFF2-40B4-BE49-F238E27FC236}">
-                <a16:creationId xmlns:a16="http://schemas.microsoft.com/office/drawing/2014/main" id="{46E236EC-5688-B75C-763C-A03944E4B64F}"/>
+                <a16:creationId xmlns:a16="http://schemas.microsoft.com/office/drawing/2014/main" id="{785C2042-714A-FA18-9A1A-77FCF671E450}"/>
               </a:ext>
             </a:extLst>
           </p:cNvPr>
@@ -4486,7 +7620,7 @@
           <a:p>
             <a:r>
               <a:rPr lang="en-US" dirty="0"/>
-              <a:t>Relevant Proofs (Son’s Content)</a:t>
+              <a:t>Language Semantics Structure (cont.)</a:t>
             </a:r>
           </a:p>
         </p:txBody>
@@ -4496,7 +7630,7 @@
           <p:cNvPr id="3" name="Content Placeholder 2">
             <a:extLst>
               <a:ext uri="{FF2B5EF4-FFF2-40B4-BE49-F238E27FC236}">
-                <a16:creationId xmlns:a16="http://schemas.microsoft.com/office/drawing/2014/main" id="{F879004D-F0FB-D186-72E3-ADCEE5C79EA3}"/>
+                <a16:creationId xmlns:a16="http://schemas.microsoft.com/office/drawing/2014/main" id="{D1CD9AA2-3E7B-478A-BA79-4DB5501F3CA4}"/>
               </a:ext>
             </a:extLst>
           </p:cNvPr>
@@ -4512,17 +7646,14 @@
           <a:bodyPr/>
           <a:lstStyle/>
           <a:p>
-            <a:r>
-              <a:rPr lang="en-US" dirty="0"/>
-              <a:t>What are the conditions we needed to prove?</a:t>
-            </a:r>
+            <a:endParaRPr lang="en-US" dirty="0"/>
           </a:p>
         </p:txBody>
       </p:sp>
     </p:spTree>
     <p:extLst>
       <p:ext uri="{BB962C8B-B14F-4D97-AF65-F5344CB8AC3E}">
-        <p14:creationId xmlns:p14="http://schemas.microsoft.com/office/powerpoint/2010/main" val="3372710928"/>
+        <p14:creationId xmlns:p14="http://schemas.microsoft.com/office/powerpoint/2010/main" val="2734143212"/>
       </p:ext>
     </p:extLst>
   </p:cSld>
@@ -4554,7 +7685,7 @@
           <p:cNvPr id="2" name="Title 1">
             <a:extLst>
               <a:ext uri="{FF2B5EF4-FFF2-40B4-BE49-F238E27FC236}">
-                <a16:creationId xmlns:a16="http://schemas.microsoft.com/office/drawing/2014/main" id="{5D42D09A-4BBE-9DD7-0BFD-E2914C835DED}"/>
+                <a16:creationId xmlns:a16="http://schemas.microsoft.com/office/drawing/2014/main" id="{46E236EC-5688-B75C-763C-A03944E4B64F}"/>
               </a:ext>
             </a:extLst>
           </p:cNvPr>
@@ -4572,7 +7703,7 @@
           <a:p>
             <a:r>
               <a:rPr lang="en-US" dirty="0"/>
-              <a:t>Results</a:t>
+              <a:t>Relevant Proofs (Son’s Content)</a:t>
             </a:r>
           </a:p>
         </p:txBody>
@@ -4582,7 +7713,7 @@
           <p:cNvPr id="3" name="Content Placeholder 2">
             <a:extLst>
               <a:ext uri="{FF2B5EF4-FFF2-40B4-BE49-F238E27FC236}">
-                <a16:creationId xmlns:a16="http://schemas.microsoft.com/office/drawing/2014/main" id="{9F77D4E3-33B8-5EDF-1C20-EA397C545967}"/>
+                <a16:creationId xmlns:a16="http://schemas.microsoft.com/office/drawing/2014/main" id="{F879004D-F0FB-D186-72E3-ADCEE5C79EA3}"/>
               </a:ext>
             </a:extLst>
           </p:cNvPr>
@@ -4598,14 +7729,17 @@
           <a:bodyPr/>
           <a:lstStyle/>
           <a:p>
-            <a:endParaRPr lang="en-US"/>
+            <a:r>
+              <a:rPr lang="en-US" dirty="0"/>
+              <a:t>What are the conditions we needed to prove?</a:t>
+            </a:r>
           </a:p>
         </p:txBody>
       </p:sp>
     </p:spTree>
     <p:extLst>
       <p:ext uri="{BB962C8B-B14F-4D97-AF65-F5344CB8AC3E}">
-        <p14:creationId xmlns:p14="http://schemas.microsoft.com/office/powerpoint/2010/main" val="3043398532"/>
+        <p14:creationId xmlns:p14="http://schemas.microsoft.com/office/powerpoint/2010/main" val="3372710928"/>
       </p:ext>
     </p:extLst>
   </p:cSld>
@@ -4655,7 +7789,7 @@
           <a:p>
             <a:r>
               <a:rPr lang="en-US" dirty="0"/>
-              <a:t>Future Work</a:t>
+              <a:t>Results</a:t>
             </a:r>
           </a:p>
         </p:txBody>
@@ -4676,12 +7810,182 @@
             <p:ph idx="1"/>
           </p:nvPr>
         </p:nvSpPr>
+        <p:spPr>
+          <a:xfrm>
+            <a:off x="471948" y="1386348"/>
+            <a:ext cx="11503742" cy="4790615"/>
+          </a:xfrm>
+        </p:spPr>
+        <p:txBody>
+          <a:bodyPr>
+            <a:normAutofit lnSpcReduction="10000"/>
+          </a:bodyPr>
+          <a:lstStyle/>
+          <a:p>
+            <a:r>
+              <a:rPr lang="en-US" dirty="0"/>
+              <a:t>Language semantics formalization for SCXML run-to-completion </a:t>
+            </a:r>
+            <a:r>
+              <a:rPr lang="en-US" dirty="0" err="1"/>
+              <a:t>statecharts</a:t>
+            </a:r>
+            <a:r>
+              <a:rPr lang="en-US" dirty="0"/>
+              <a:t> using Event- B.</a:t>
+            </a:r>
+          </a:p>
+          <a:p>
+            <a:r>
+              <a:rPr lang="en-US" dirty="0"/>
+              <a:t>The semantics supports the typical </a:t>
+            </a:r>
+            <a:r>
+              <a:rPr lang="en-US" dirty="0" err="1"/>
+              <a:t>statechart</a:t>
+            </a:r>
+            <a:r>
+              <a:rPr lang="en-US" dirty="0"/>
+              <a:t> features such as transitions, hierarchical structure, clustering, concurrency, start and stop states.</a:t>
+            </a:r>
+          </a:p>
+          <a:p>
+            <a:r>
+              <a:rPr lang="en-US" dirty="0"/>
+              <a:t>The untriggered </a:t>
+            </a:r>
+            <a:r>
+              <a:rPr lang="en-US" dirty="0" err="1"/>
+              <a:t>statechart</a:t>
+            </a:r>
+            <a:r>
+              <a:rPr lang="en-US" dirty="0"/>
+              <a:t> semantics formalization is common to most </a:t>
+            </a:r>
+            <a:r>
+              <a:rPr lang="en-US" dirty="0" err="1"/>
+              <a:t>statechart</a:t>
+            </a:r>
+            <a:r>
+              <a:rPr lang="en-US" dirty="0"/>
+              <a:t> notations</a:t>
+            </a:r>
+          </a:p>
+          <a:p>
+            <a:r>
+              <a:rPr lang="en-US" dirty="0"/>
+              <a:t>SCXML is based on the widely used </a:t>
+            </a:r>
+            <a:r>
+              <a:rPr lang="en-US" dirty="0" err="1"/>
+              <a:t>Harel</a:t>
+            </a:r>
+            <a:r>
+              <a:rPr lang="en-US" dirty="0"/>
+              <a:t> </a:t>
+            </a:r>
+            <a:r>
+              <a:rPr lang="en-US" dirty="0" err="1"/>
+              <a:t>statechart</a:t>
+            </a:r>
+            <a:r>
+              <a:rPr lang="en-US" dirty="0"/>
+              <a:t> semantics, so our run to completion semantics can also be used for such notations and where notations deviate in run semantics</a:t>
+            </a:r>
+          </a:p>
+          <a:p>
+            <a:r>
+              <a:rPr lang="en-US" dirty="0"/>
+              <a:t>Proofs of well-defines conditions ensure the consistency of the semantic and can be used by a tool to guarantee a model is corrected by construction</a:t>
+            </a:r>
+          </a:p>
+        </p:txBody>
+      </p:sp>
+    </p:spTree>
+    <p:extLst>
+      <p:ext uri="{BB962C8B-B14F-4D97-AF65-F5344CB8AC3E}">
+        <p14:creationId xmlns:p14="http://schemas.microsoft.com/office/powerpoint/2010/main" val="3043398532"/>
+      </p:ext>
+    </p:extLst>
+  </p:cSld>
+  <p:clrMapOvr>
+    <a:masterClrMapping/>
+  </p:clrMapOvr>
+</p:sld>
+</file>
+
+<file path=ppt/slides/slide13.xml><?xml version="1.0" encoding="utf-8"?>
+<p:sld xmlns:a="http://schemas.openxmlformats.org/drawingml/2006/main" xmlns:r="http://schemas.openxmlformats.org/officeDocument/2006/relationships" xmlns:p="http://schemas.openxmlformats.org/presentationml/2006/main">
+  <p:cSld>
+    <p:spTree>
+      <p:nvGrpSpPr>
+        <p:cNvPr id="1" name=""/>
+        <p:cNvGrpSpPr/>
+        <p:nvPr/>
+      </p:nvGrpSpPr>
+      <p:grpSpPr>
+        <a:xfrm>
+          <a:off x="0" y="0"/>
+          <a:ext cx="0" cy="0"/>
+          <a:chOff x="0" y="0"/>
+          <a:chExt cx="0" cy="0"/>
+        </a:xfrm>
+      </p:grpSpPr>
+      <p:sp>
+        <p:nvSpPr>
+          <p:cNvPr id="2" name="Title 1">
+            <a:extLst>
+              <a:ext uri="{FF2B5EF4-FFF2-40B4-BE49-F238E27FC236}">
+                <a16:creationId xmlns:a16="http://schemas.microsoft.com/office/drawing/2014/main" id="{5D42D09A-4BBE-9DD7-0BFD-E2914C835DED}"/>
+              </a:ext>
+            </a:extLst>
+          </p:cNvPr>
+          <p:cNvSpPr>
+            <a:spLocks noGrp="1"/>
+          </p:cNvSpPr>
+          <p:nvPr>
+            <p:ph type="title"/>
+          </p:nvPr>
+        </p:nvSpPr>
         <p:spPr/>
         <p:txBody>
           <a:bodyPr/>
           <a:lstStyle/>
           <a:p>
-            <a:endParaRPr lang="en-US"/>
+            <a:r>
+              <a:rPr lang="en-US" dirty="0"/>
+              <a:t>Future Work</a:t>
+            </a:r>
+          </a:p>
+        </p:txBody>
+      </p:sp>
+      <p:sp>
+        <p:nvSpPr>
+          <p:cNvPr id="3" name="Content Placeholder 2">
+            <a:extLst>
+              <a:ext uri="{FF2B5EF4-FFF2-40B4-BE49-F238E27FC236}">
+                <a16:creationId xmlns:a16="http://schemas.microsoft.com/office/drawing/2014/main" id="{9F77D4E3-33B8-5EDF-1C20-EA397C545967}"/>
+              </a:ext>
+            </a:extLst>
+          </p:cNvPr>
+          <p:cNvSpPr>
+            <a:spLocks noGrp="1"/>
+          </p:cNvSpPr>
+          <p:nvPr>
+            <p:ph idx="1"/>
+          </p:nvPr>
+        </p:nvSpPr>
+        <p:spPr/>
+        <p:txBody>
+          <a:bodyPr>
+            <a:normAutofit/>
+          </a:bodyPr>
+          <a:lstStyle/>
+          <a:p>
+            <a:r>
+              <a:rPr lang="en-US" dirty="0"/>
+              <a:t>Extend formalization to include refinement rules</a:t>
+            </a:r>
           </a:p>
         </p:txBody>
       </p:sp>
@@ -4778,13 +8082,8 @@
           <a:p>
             <a:r>
               <a:rPr lang="en-US" dirty="0"/>
-              <a:t>Turnstile </a:t>
-            </a:r>
-            <a:r>
-              <a:rPr lang="en-US" dirty="0" err="1"/>
-              <a:t>Exampler</a:t>
-            </a:r>
-            <a:endParaRPr lang="en-US" dirty="0"/>
+              <a:t>Turnstile Exemplar</a:t>
+            </a:r>
           </a:p>
           <a:p>
             <a:r>
@@ -4796,6 +8095,12 @@
             <a:r>
               <a:rPr lang="en-US" dirty="0"/>
               <a:t>Relevant Proofs</a:t>
+            </a:r>
+          </a:p>
+          <a:p>
+            <a:r>
+              <a:rPr lang="en-US" dirty="0"/>
+              <a:t>Results</a:t>
             </a:r>
           </a:p>
           <a:p>
@@ -4883,12 +8188,66 @@
             <p:ph idx="1"/>
           </p:nvPr>
         </p:nvSpPr>
-        <p:spPr/>
-        <p:txBody>
-          <a:bodyPr/>
+        <p:spPr>
+          <a:xfrm>
+            <a:off x="237506" y="1690688"/>
+            <a:ext cx="11839699" cy="4802187"/>
+          </a:xfrm>
+        </p:spPr>
+        <p:txBody>
+          <a:bodyPr>
+            <a:normAutofit fontScale="92500" lnSpcReduction="20000"/>
+          </a:bodyPr>
           <a:lstStyle/>
           <a:p>
-            <a:endParaRPr lang="en-US"/>
+            <a:r>
+              <a:rPr lang="en-US" dirty="0"/>
+              <a:t>Graphical languages are attractive to engineers (e.g. </a:t>
+            </a:r>
+            <a:r>
+              <a:rPr lang="en-US" dirty="0" err="1"/>
+              <a:t>statecharts</a:t>
+            </a:r>
+            <a:r>
+              <a:rPr lang="en-US" dirty="0"/>
+              <a:t> generalization of </a:t>
+            </a:r>
+            <a:r>
+              <a:rPr lang="en-US" dirty="0" err="1"/>
+              <a:t>statemachines</a:t>
+            </a:r>
+            <a:r>
+              <a:rPr lang="en-US" dirty="0"/>
+              <a:t>)</a:t>
+            </a:r>
+            <a:br>
+              <a:rPr lang="en-US" dirty="0"/>
+            </a:br>
+            <a:endParaRPr lang="en-US" dirty="0"/>
+          </a:p>
+          <a:p>
+            <a:r>
+              <a:rPr lang="en-US" dirty="0"/>
+              <a:t>Rodin/Event-B support abstraction and refinement and enable the use of formal proofs in earlier stages of the design</a:t>
+            </a:r>
+          </a:p>
+          <a:p>
+            <a:endParaRPr lang="en-US" dirty="0"/>
+          </a:p>
+          <a:p>
+            <a:r>
+              <a:rPr lang="en-US" dirty="0"/>
+              <a:t>We have shown case studies of models developed and verified using the proposed semantics, which used a refinement that preserves safety properties from one refinement level to the next</a:t>
+            </a:r>
+          </a:p>
+          <a:p>
+            <a:endParaRPr lang="en-US" dirty="0"/>
+          </a:p>
+          <a:p>
+            <a:r>
+              <a:rPr lang="en-US" dirty="0"/>
+              <a:t>We focus now on the formalization of the language semantics such that we can ensure that models developed with such language will by correct-by-construction with respect to the language semantics</a:t>
+            </a:r>
           </a:p>
         </p:txBody>
       </p:sp>
@@ -4966,19 +8325,332 @@
             <p:ph idx="1"/>
           </p:nvPr>
         </p:nvSpPr>
-        <p:spPr/>
-        <p:txBody>
-          <a:bodyPr/>
+        <p:spPr>
+          <a:xfrm>
+            <a:off x="5744267" y="1610412"/>
+            <a:ext cx="6264621" cy="5438898"/>
+          </a:xfrm>
+        </p:spPr>
+        <p:txBody>
+          <a:bodyPr>
+            <a:normAutofit/>
+          </a:bodyPr>
           <a:lstStyle/>
           <a:p>
-            <a:endParaRPr lang="en-US"/>
-          </a:p>
-        </p:txBody>
-      </p:sp>
+            <a:r>
+              <a:rPr lang="en-US" sz="2400" dirty="0"/>
+              <a:t>Used to design and model software systems</a:t>
+            </a:r>
+          </a:p>
+          <a:p>
+            <a:r>
+              <a:rPr lang="en-US" sz="2400" dirty="0"/>
+              <a:t>Enable proofs of model correctness with respect to specification</a:t>
+            </a:r>
+          </a:p>
+          <a:p>
+            <a:r>
+              <a:rPr lang="en-US" sz="2400" dirty="0"/>
+              <a:t>Event-B models have two parts: </a:t>
+            </a:r>
+          </a:p>
+          <a:p>
+            <a:pPr lvl="1"/>
+            <a:r>
+              <a:rPr lang="en-US" sz="1800" dirty="0"/>
+              <a:t>Contexts: Contain sets, constants and axioms </a:t>
+            </a:r>
+            <a:endParaRPr lang="en-US" dirty="0"/>
+          </a:p>
+          <a:p>
+            <a:pPr lvl="1"/>
+            <a:r>
+              <a:rPr lang="en-US" sz="1800" dirty="0"/>
+              <a:t>Machines: Variables, events, and invariants </a:t>
+            </a:r>
+            <a:endParaRPr lang="en-US" dirty="0"/>
+          </a:p>
+          <a:p>
+            <a:r>
+              <a:rPr lang="en-US" sz="2400" dirty="0"/>
+              <a:t>Machines are refined to add more details to the model </a:t>
+            </a:r>
+          </a:p>
+          <a:p>
+            <a:pPr lvl="1"/>
+            <a:r>
+              <a:rPr lang="en-US" sz="1800" dirty="0"/>
+              <a:t>Superposition refinement: including additional variables </a:t>
+            </a:r>
+            <a:endParaRPr lang="en-US" dirty="0"/>
+          </a:p>
+          <a:p>
+            <a:pPr lvl="1"/>
+            <a:r>
+              <a:rPr lang="en-US" sz="1800" dirty="0"/>
+              <a:t>Data refinement: replacing abstract variables with new concrete variables </a:t>
+            </a:r>
+            <a:endParaRPr lang="en-US" dirty="0"/>
+          </a:p>
+          <a:p>
+            <a:pPr lvl="1"/>
+            <a:r>
+              <a:rPr lang="en-US" sz="1800" dirty="0"/>
+              <a:t>New events: Refines implicit abstract event that does nothing “skip” </a:t>
+            </a:r>
+          </a:p>
+          <a:p>
+            <a:endParaRPr lang="en-US" sz="1800" dirty="0"/>
+          </a:p>
+        </p:txBody>
+      </p:sp>
+      <p:grpSp>
+        <p:nvGrpSpPr>
+          <p:cNvPr id="6" name="Group 5">
+            <a:extLst>
+              <a:ext uri="{FF2B5EF4-FFF2-40B4-BE49-F238E27FC236}">
+                <a16:creationId xmlns:a16="http://schemas.microsoft.com/office/drawing/2014/main" id="{C350C20D-142D-A924-4485-8EE636340CC6}"/>
+              </a:ext>
+            </a:extLst>
+          </p:cNvPr>
+          <p:cNvGrpSpPr/>
+          <p:nvPr/>
+        </p:nvGrpSpPr>
+        <p:grpSpPr>
+          <a:xfrm>
+            <a:off x="225410" y="1610412"/>
+            <a:ext cx="5518857" cy="1477328"/>
+            <a:chOff x="407810" y="3119321"/>
+            <a:chExt cx="5518857" cy="1477328"/>
+          </a:xfrm>
+        </p:grpSpPr>
+        <p:pic>
+          <p:nvPicPr>
+            <p:cNvPr id="4" name="Content Placeholder 7">
+              <a:extLst>
+                <a:ext uri="{FF2B5EF4-FFF2-40B4-BE49-F238E27FC236}">
+                  <a16:creationId xmlns:a16="http://schemas.microsoft.com/office/drawing/2014/main" id="{B4CB407F-4460-DB4D-C5D7-A82A0A52AFBB}"/>
+                </a:ext>
+              </a:extLst>
+            </p:cNvPr>
+            <p:cNvPicPr>
+              <a:picLocks noChangeAspect="1"/>
+            </p:cNvPicPr>
+            <p:nvPr/>
+          </p:nvPicPr>
+          <p:blipFill>
+            <a:blip r:embed="rId3"/>
+            <a:stretch>
+              <a:fillRect/>
+            </a:stretch>
+          </p:blipFill>
+          <p:spPr>
+            <a:xfrm>
+              <a:off x="407810" y="3126183"/>
+              <a:ext cx="5518857" cy="1320633"/>
+            </a:xfrm>
+            <a:prstGeom prst="rect">
+              <a:avLst/>
+            </a:prstGeom>
+          </p:spPr>
+        </p:pic>
+        <p:sp>
+          <p:nvSpPr>
+            <p:cNvPr id="5" name="TextBox 4">
+              <a:extLst>
+                <a:ext uri="{FF2B5EF4-FFF2-40B4-BE49-F238E27FC236}">
+                  <a16:creationId xmlns:a16="http://schemas.microsoft.com/office/drawing/2014/main" id="{F18601AA-6DDD-F3BA-F238-1FEF2A0BF5AB}"/>
+                </a:ext>
+              </a:extLst>
+            </p:cNvPr>
+            <p:cNvSpPr txBox="1"/>
+            <p:nvPr/>
+          </p:nvSpPr>
+          <p:spPr>
+            <a:xfrm>
+              <a:off x="591623" y="3119321"/>
+              <a:ext cx="5018955" cy="1477328"/>
+            </a:xfrm>
+            <a:prstGeom prst="rect">
+              <a:avLst/>
+            </a:prstGeom>
+            <a:noFill/>
+            <a:ln w="38100">
+              <a:solidFill>
+                <a:schemeClr val="tx1"/>
+              </a:solidFill>
+            </a:ln>
+          </p:spPr>
+          <p:txBody>
+            <a:bodyPr wrap="square" rtlCol="0">
+              <a:spAutoFit/>
+            </a:bodyPr>
+            <a:lstStyle/>
+            <a:p>
+              <a:pPr algn="ctr"/>
+              <a:endParaRPr lang="en-US" dirty="0"/>
+            </a:p>
+            <a:p>
+              <a:pPr algn="ctr"/>
+              <a:endParaRPr lang="en-US" dirty="0"/>
+            </a:p>
+            <a:p>
+              <a:pPr algn="ctr"/>
+              <a:endParaRPr lang="en-US" dirty="0"/>
+            </a:p>
+            <a:p>
+              <a:pPr algn="ctr"/>
+              <a:endParaRPr lang="en-US" dirty="0"/>
+            </a:p>
+            <a:p>
+              <a:pPr algn="ctr"/>
+              <a:r>
+                <a:rPr lang="en-US" dirty="0"/>
+                <a:t>Context: Static aspects of the model</a:t>
+              </a:r>
+            </a:p>
+          </p:txBody>
+        </p:sp>
+      </p:grpSp>
+      <p:grpSp>
+        <p:nvGrpSpPr>
+          <p:cNvPr id="10" name="Group 9">
+            <a:extLst>
+              <a:ext uri="{FF2B5EF4-FFF2-40B4-BE49-F238E27FC236}">
+                <a16:creationId xmlns:a16="http://schemas.microsoft.com/office/drawing/2014/main" id="{12C53A59-4502-18ED-E62B-6A5476D74F30}"/>
+              </a:ext>
+            </a:extLst>
+          </p:cNvPr>
+          <p:cNvGrpSpPr/>
+          <p:nvPr/>
+        </p:nvGrpSpPr>
+        <p:grpSpPr>
+          <a:xfrm>
+            <a:off x="409223" y="3310404"/>
+            <a:ext cx="5018955" cy="3416320"/>
+            <a:chOff x="6163916" y="2534607"/>
+            <a:chExt cx="5018955" cy="3416320"/>
+          </a:xfrm>
+        </p:grpSpPr>
+        <p:sp>
+          <p:nvSpPr>
+            <p:cNvPr id="7" name="TextBox 6">
+              <a:extLst>
+                <a:ext uri="{FF2B5EF4-FFF2-40B4-BE49-F238E27FC236}">
+                  <a16:creationId xmlns:a16="http://schemas.microsoft.com/office/drawing/2014/main" id="{91A890DB-B307-479F-3A01-40B055FEC79A}"/>
+                </a:ext>
+              </a:extLst>
+            </p:cNvPr>
+            <p:cNvSpPr txBox="1"/>
+            <p:nvPr/>
+          </p:nvSpPr>
+          <p:spPr>
+            <a:xfrm>
+              <a:off x="6163916" y="2534607"/>
+              <a:ext cx="5018955" cy="3416320"/>
+            </a:xfrm>
+            <a:prstGeom prst="rect">
+              <a:avLst/>
+            </a:prstGeom>
+            <a:noFill/>
+            <a:ln w="38100">
+              <a:solidFill>
+                <a:schemeClr val="tx1"/>
+              </a:solidFill>
+            </a:ln>
+          </p:spPr>
+          <p:txBody>
+            <a:bodyPr wrap="square" rtlCol="0">
+              <a:spAutoFit/>
+            </a:bodyPr>
+            <a:lstStyle/>
+            <a:p>
+              <a:pPr algn="ctr"/>
+              <a:endParaRPr lang="en-US" dirty="0"/>
+            </a:p>
+            <a:p>
+              <a:pPr algn="ctr"/>
+              <a:endParaRPr lang="en-US" dirty="0"/>
+            </a:p>
+            <a:p>
+              <a:pPr algn="ctr"/>
+              <a:endParaRPr lang="en-US" dirty="0"/>
+            </a:p>
+            <a:p>
+              <a:pPr algn="ctr"/>
+              <a:endParaRPr lang="en-US" dirty="0"/>
+            </a:p>
+            <a:p>
+              <a:pPr algn="ctr"/>
+              <a:endParaRPr lang="en-US" dirty="0"/>
+            </a:p>
+            <a:p>
+              <a:pPr algn="ctr"/>
+              <a:endParaRPr lang="en-US" dirty="0"/>
+            </a:p>
+            <a:p>
+              <a:pPr algn="ctr"/>
+              <a:endParaRPr lang="en-US" dirty="0"/>
+            </a:p>
+            <a:p>
+              <a:pPr algn="ctr"/>
+              <a:endParaRPr lang="en-US" dirty="0"/>
+            </a:p>
+            <a:p>
+              <a:pPr algn="ctr"/>
+              <a:endParaRPr lang="en-US" dirty="0"/>
+            </a:p>
+            <a:p>
+              <a:pPr algn="ctr"/>
+              <a:endParaRPr lang="en-US" dirty="0"/>
+            </a:p>
+            <a:p>
+              <a:pPr algn="ctr"/>
+              <a:endParaRPr lang="en-US" dirty="0"/>
+            </a:p>
+            <a:p>
+              <a:pPr algn="ctr"/>
+              <a:r>
+                <a:rPr lang="en-US" dirty="0"/>
+                <a:t>Machine: Dynamic aspects of the model</a:t>
+              </a:r>
+            </a:p>
+          </p:txBody>
+        </p:sp>
+        <p:pic>
+          <p:nvPicPr>
+            <p:cNvPr id="9" name="Picture 8">
+              <a:extLst>
+                <a:ext uri="{FF2B5EF4-FFF2-40B4-BE49-F238E27FC236}">
+                  <a16:creationId xmlns:a16="http://schemas.microsoft.com/office/drawing/2014/main" id="{3F808239-DBC0-876F-A3B6-78D4B6EDD7F2}"/>
+                </a:ext>
+              </a:extLst>
+            </p:cNvPr>
+            <p:cNvPicPr>
+              <a:picLocks noChangeAspect="1"/>
+            </p:cNvPicPr>
+            <p:nvPr/>
+          </p:nvPicPr>
+          <p:blipFill rotWithShape="1">
+            <a:blip r:embed="rId4"/>
+            <a:srcRect t="1973" b="2251"/>
+            <a:stretch/>
+          </p:blipFill>
+          <p:spPr>
+            <a:xfrm>
+              <a:off x="6220360" y="2596442"/>
+              <a:ext cx="4906065" cy="3002845"/>
+            </a:xfrm>
+            <a:prstGeom prst="rect">
+              <a:avLst/>
+            </a:prstGeom>
+          </p:spPr>
+        </p:pic>
+      </p:grpSp>
     </p:spTree>
     <p:extLst>
       <p:ext uri="{BB962C8B-B14F-4D97-AF65-F5344CB8AC3E}">
-        <p14:creationId xmlns:p14="http://schemas.microsoft.com/office/powerpoint/2010/main" val="2012200784"/>
+        <p14:creationId xmlns:p14="http://schemas.microsoft.com/office/powerpoint/2010/main" val="1913210039"/>
       </p:ext>
     </p:extLst>
   </p:cSld>
@@ -5033,31 +8705,35 @@
           </a:p>
         </p:txBody>
       </p:sp>
-      <p:sp>
-        <p:nvSpPr>
-          <p:cNvPr id="3" name="Content Placeholder 2">
+      <p:pic>
+        <p:nvPicPr>
+          <p:cNvPr id="7" name="Content Placeholder 6">
             <a:extLst>
               <a:ext uri="{FF2B5EF4-FFF2-40B4-BE49-F238E27FC236}">
-                <a16:creationId xmlns:a16="http://schemas.microsoft.com/office/drawing/2014/main" id="{D1CD9AA2-3E7B-478A-BA79-4DB5501F3CA4}"/>
+                <a16:creationId xmlns:a16="http://schemas.microsoft.com/office/drawing/2014/main" id="{689DB123-6E2D-FE5A-57CE-FD7BF1D47368}"/>
               </a:ext>
             </a:extLst>
           </p:cNvPr>
-          <p:cNvSpPr>
-            <a:spLocks noGrp="1"/>
-          </p:cNvSpPr>
-          <p:nvPr>
-            <p:ph idx="1"/>
-          </p:nvPr>
-        </p:nvSpPr>
-        <p:spPr/>
-        <p:txBody>
-          <a:bodyPr/>
-          <a:lstStyle/>
-          <a:p>
-            <a:endParaRPr lang="en-US"/>
-          </a:p>
-        </p:txBody>
-      </p:sp>
+          <p:cNvPicPr>
+            <a:picLocks noGrp="1" noChangeAspect="1"/>
+          </p:cNvPicPr>
+          <p:nvPr>
+            <p:ph sz="half" idx="1"/>
+          </p:nvPr>
+        </p:nvPicPr>
+        <p:blipFill>
+          <a:blip r:embed="rId3"/>
+          <a:stretch>
+            <a:fillRect/>
+          </a:stretch>
+        </p:blipFill>
+        <p:spPr>
+          <a:xfrm>
+            <a:off x="1529406" y="1485508"/>
+            <a:ext cx="9133188" cy="4730380"/>
+          </a:xfrm>
+        </p:spPr>
+      </p:pic>
     </p:spTree>
     <p:extLst>
       <p:ext uri="{BB962C8B-B14F-4D97-AF65-F5344CB8AC3E}">
@@ -5116,31 +8792,150 @@
           </a:p>
         </p:txBody>
       </p:sp>
-      <p:sp>
-        <p:nvSpPr>
-          <p:cNvPr id="3" name="Content Placeholder 2">
+      <p:pic>
+        <p:nvPicPr>
+          <p:cNvPr id="8" name="Content Placeholder 7">
             <a:extLst>
               <a:ext uri="{FF2B5EF4-FFF2-40B4-BE49-F238E27FC236}">
-                <a16:creationId xmlns:a16="http://schemas.microsoft.com/office/drawing/2014/main" id="{D1CD9AA2-3E7B-478A-BA79-4DB5501F3CA4}"/>
+                <a16:creationId xmlns:a16="http://schemas.microsoft.com/office/drawing/2014/main" id="{AC093B29-FB46-AA68-2A57-7B68F9F1AAF2}"/>
               </a:ext>
             </a:extLst>
           </p:cNvPr>
-          <p:cNvSpPr>
-            <a:spLocks noGrp="1"/>
-          </p:cNvSpPr>
-          <p:nvPr>
-            <p:ph idx="1"/>
-          </p:nvPr>
-        </p:nvSpPr>
-        <p:spPr/>
-        <p:txBody>
-          <a:bodyPr/>
-          <a:lstStyle/>
-          <a:p>
-            <a:endParaRPr lang="en-US" dirty="0"/>
-          </a:p>
-        </p:txBody>
-      </p:sp>
+          <p:cNvPicPr>
+            <a:picLocks noGrp="1" noChangeAspect="1"/>
+          </p:cNvPicPr>
+          <p:nvPr>
+            <p:ph sz="half" idx="2"/>
+          </p:nvPr>
+        </p:nvPicPr>
+        <p:blipFill>
+          <a:blip r:embed="rId3"/>
+          <a:stretch>
+            <a:fillRect/>
+          </a:stretch>
+        </p:blipFill>
+        <p:spPr>
+          <a:xfrm>
+            <a:off x="6344132" y="1809933"/>
+            <a:ext cx="4559816" cy="492953"/>
+          </a:xfrm>
+        </p:spPr>
+      </p:pic>
+      <p:pic>
+        <p:nvPicPr>
+          <p:cNvPr id="4" name="Picture 3">
+            <a:extLst>
+              <a:ext uri="{FF2B5EF4-FFF2-40B4-BE49-F238E27FC236}">
+                <a16:creationId xmlns:a16="http://schemas.microsoft.com/office/drawing/2014/main" id="{BD842C6C-1876-A1FA-2AA9-10706C625241}"/>
+              </a:ext>
+            </a:extLst>
+          </p:cNvPr>
+          <p:cNvPicPr>
+            <a:picLocks noChangeAspect="1"/>
+          </p:cNvPicPr>
+          <p:nvPr/>
+        </p:nvPicPr>
+        <p:blipFill rotWithShape="1">
+          <a:blip r:embed="rId4"/>
+          <a:srcRect l="5480" t="1" r="13291" b="63806"/>
+          <a:stretch/>
+        </p:blipFill>
+        <p:spPr>
+          <a:xfrm>
+            <a:off x="6278820" y="2501496"/>
+            <a:ext cx="5249236" cy="1077479"/>
+          </a:xfrm>
+          <a:prstGeom prst="rect">
+            <a:avLst/>
+          </a:prstGeom>
+        </p:spPr>
+      </p:pic>
+      <p:pic>
+        <p:nvPicPr>
+          <p:cNvPr id="10" name="Picture 9">
+            <a:extLst>
+              <a:ext uri="{FF2B5EF4-FFF2-40B4-BE49-F238E27FC236}">
+                <a16:creationId xmlns:a16="http://schemas.microsoft.com/office/drawing/2014/main" id="{46814396-F0F3-C984-222E-7317EA037FF7}"/>
+              </a:ext>
+            </a:extLst>
+          </p:cNvPr>
+          <p:cNvPicPr>
+            <a:picLocks noChangeAspect="1"/>
+          </p:cNvPicPr>
+          <p:nvPr/>
+        </p:nvPicPr>
+        <p:blipFill rotWithShape="1">
+          <a:blip r:embed="rId4"/>
+          <a:srcRect l="5130" t="71968" r="7713" b="2852"/>
+          <a:stretch/>
+        </p:blipFill>
+        <p:spPr>
+          <a:xfrm>
+            <a:off x="6186700" y="5294845"/>
+            <a:ext cx="5632363" cy="749619"/>
+          </a:xfrm>
+          <a:prstGeom prst="rect">
+            <a:avLst/>
+          </a:prstGeom>
+        </p:spPr>
+      </p:pic>
+      <p:pic>
+        <p:nvPicPr>
+          <p:cNvPr id="11" name="Picture 10">
+            <a:extLst>
+              <a:ext uri="{FF2B5EF4-FFF2-40B4-BE49-F238E27FC236}">
+                <a16:creationId xmlns:a16="http://schemas.microsoft.com/office/drawing/2014/main" id="{6EF91861-7DFE-D0A0-C90B-0BB63CCEDB77}"/>
+              </a:ext>
+            </a:extLst>
+          </p:cNvPr>
+          <p:cNvPicPr>
+            <a:picLocks noChangeAspect="1"/>
+          </p:cNvPicPr>
+          <p:nvPr/>
+        </p:nvPicPr>
+        <p:blipFill rotWithShape="1">
+          <a:blip r:embed="rId4"/>
+          <a:srcRect l="5130" t="37578" r="3309" b="29329"/>
+          <a:stretch/>
+        </p:blipFill>
+        <p:spPr>
+          <a:xfrm>
+            <a:off x="6136549" y="3957704"/>
+            <a:ext cx="5916903" cy="985154"/>
+          </a:xfrm>
+          <a:prstGeom prst="rect">
+            <a:avLst/>
+          </a:prstGeom>
+        </p:spPr>
+      </p:pic>
+      <p:pic>
+        <p:nvPicPr>
+          <p:cNvPr id="15" name="Content Placeholder 14">
+            <a:extLst>
+              <a:ext uri="{FF2B5EF4-FFF2-40B4-BE49-F238E27FC236}">
+                <a16:creationId xmlns:a16="http://schemas.microsoft.com/office/drawing/2014/main" id="{7D71136D-007D-E82E-D5F8-5A354E2CA0F1}"/>
+              </a:ext>
+            </a:extLst>
+          </p:cNvPr>
+          <p:cNvPicPr>
+            <a:picLocks noGrp="1" noChangeAspect="1"/>
+          </p:cNvPicPr>
+          <p:nvPr>
+            <p:ph sz="half" idx="1"/>
+          </p:nvPr>
+        </p:nvPicPr>
+        <p:blipFill rotWithShape="1">
+          <a:blip r:embed="rId5"/>
+          <a:srcRect l="28226"/>
+          <a:stretch/>
+        </p:blipFill>
+        <p:spPr>
+          <a:xfrm>
+            <a:off x="92179" y="1839073"/>
+            <a:ext cx="5913123" cy="4237262"/>
+          </a:xfrm>
+        </p:spPr>
+      </p:pic>
     </p:spTree>
     <p:extLst>
       <p:ext uri="{BB962C8B-B14F-4D97-AF65-F5344CB8AC3E}">
@@ -5187,7 +8982,12 @@
             <p:ph type="title"/>
           </p:nvPr>
         </p:nvSpPr>
-        <p:spPr/>
+        <p:spPr>
+          <a:xfrm>
+            <a:off x="838200" y="32615"/>
+            <a:ext cx="10515600" cy="1325563"/>
+          </a:xfrm>
+        </p:spPr>
         <p:txBody>
           <a:bodyPr/>
           <a:lstStyle/>
@@ -5199,35 +8999,72 @@
           </a:p>
         </p:txBody>
       </p:sp>
-      <p:sp>
-        <p:nvSpPr>
-          <p:cNvPr id="3" name="Content Placeholder 2">
+      <p:pic>
+        <p:nvPicPr>
+          <p:cNvPr id="3" name="Picture 2">
             <a:extLst>
               <a:ext uri="{FF2B5EF4-FFF2-40B4-BE49-F238E27FC236}">
-                <a16:creationId xmlns:a16="http://schemas.microsoft.com/office/drawing/2014/main" id="{D1CD9AA2-3E7B-478A-BA79-4DB5501F3CA4}"/>
+                <a16:creationId xmlns:a16="http://schemas.microsoft.com/office/drawing/2014/main" id="{0F28CCD8-6FE4-99D3-5264-53E7B7D2F3CE}"/>
               </a:ext>
             </a:extLst>
           </p:cNvPr>
-          <p:cNvSpPr>
-            <a:spLocks noGrp="1"/>
-          </p:cNvSpPr>
-          <p:nvPr>
-            <p:ph idx="1"/>
-          </p:nvPr>
-        </p:nvSpPr>
-        <p:spPr/>
-        <p:txBody>
-          <a:bodyPr/>
-          <a:lstStyle/>
-          <a:p>
-            <a:endParaRPr lang="en-US" dirty="0"/>
-          </a:p>
-        </p:txBody>
-      </p:sp>
+          <p:cNvPicPr>
+            <a:picLocks noChangeAspect="1"/>
+          </p:cNvPicPr>
+          <p:nvPr/>
+        </p:nvPicPr>
+        <p:blipFill>
+          <a:blip r:embed="rId3">
+            <a:alphaModFix amt="81000"/>
+          </a:blip>
+          <a:stretch>
+            <a:fillRect/>
+          </a:stretch>
+        </p:blipFill>
+        <p:spPr>
+          <a:xfrm>
+            <a:off x="1777405" y="4927764"/>
+            <a:ext cx="8957848" cy="1461871"/>
+          </a:xfrm>
+          <a:prstGeom prst="rect">
+            <a:avLst/>
+          </a:prstGeom>
+        </p:spPr>
+      </p:pic>
+      <p:pic>
+        <p:nvPicPr>
+          <p:cNvPr id="4" name="Picture 3">
+            <a:extLst>
+              <a:ext uri="{FF2B5EF4-FFF2-40B4-BE49-F238E27FC236}">
+                <a16:creationId xmlns:a16="http://schemas.microsoft.com/office/drawing/2014/main" id="{D26F3726-564D-7CD9-6775-6420C07DFE91}"/>
+              </a:ext>
+            </a:extLst>
+          </p:cNvPr>
+          <p:cNvPicPr>
+            <a:picLocks noChangeAspect="1"/>
+          </p:cNvPicPr>
+          <p:nvPr/>
+        </p:nvPicPr>
+        <p:blipFill>
+          <a:blip r:embed="rId4"/>
+          <a:stretch>
+            <a:fillRect/>
+          </a:stretch>
+        </p:blipFill>
+        <p:spPr>
+          <a:xfrm>
+            <a:off x="1208568" y="1500279"/>
+            <a:ext cx="9774863" cy="2989708"/>
+          </a:xfrm>
+          <a:prstGeom prst="rect">
+            <a:avLst/>
+          </a:prstGeom>
+        </p:spPr>
+      </p:pic>
     </p:spTree>
     <p:extLst>
       <p:ext uri="{BB962C8B-B14F-4D97-AF65-F5344CB8AC3E}">
-        <p14:creationId xmlns:p14="http://schemas.microsoft.com/office/powerpoint/2010/main" val="2103743264"/>
+        <p14:creationId xmlns:p14="http://schemas.microsoft.com/office/powerpoint/2010/main" val="3657192633"/>
       </p:ext>
     </p:extLst>
   </p:cSld>
@@ -5284,10 +9121,10 @@
       </p:sp>
       <p:sp>
         <p:nvSpPr>
-          <p:cNvPr id="3" name="Content Placeholder 2">
+          <p:cNvPr id="5" name="Content Placeholder 4">
             <a:extLst>
               <a:ext uri="{FF2B5EF4-FFF2-40B4-BE49-F238E27FC236}">
-                <a16:creationId xmlns:a16="http://schemas.microsoft.com/office/drawing/2014/main" id="{D1CD9AA2-3E7B-478A-BA79-4DB5501F3CA4}"/>
+                <a16:creationId xmlns:a16="http://schemas.microsoft.com/office/drawing/2014/main" id="{2CD420C5-FDB3-7A15-C2E8-197F0A085169}"/>
               </a:ext>
             </a:extLst>
           </p:cNvPr>
@@ -5295,7 +9132,32 @@
             <a:spLocks noGrp="1"/>
           </p:cNvSpPr>
           <p:nvPr>
-            <p:ph idx="1"/>
+            <p:ph sz="half" idx="1"/>
+          </p:nvPr>
+        </p:nvSpPr>
+        <p:spPr/>
+        <p:txBody>
+          <a:bodyPr/>
+          <a:lstStyle/>
+          <a:p>
+            <a:endParaRPr lang="en-US" dirty="0"/>
+          </a:p>
+        </p:txBody>
+      </p:sp>
+      <p:sp>
+        <p:nvSpPr>
+          <p:cNvPr id="6" name="Content Placeholder 5">
+            <a:extLst>
+              <a:ext uri="{FF2B5EF4-FFF2-40B4-BE49-F238E27FC236}">
+                <a16:creationId xmlns:a16="http://schemas.microsoft.com/office/drawing/2014/main" id="{4D92D196-AD3F-EDA1-7855-F70965018385}"/>
+              </a:ext>
+            </a:extLst>
+          </p:cNvPr>
+          <p:cNvSpPr>
+            <a:spLocks noGrp="1"/>
+          </p:cNvSpPr>
+          <p:nvPr>
+            <p:ph sz="half" idx="2"/>
           </p:nvPr>
         </p:nvSpPr>
         <p:spPr/>
@@ -5310,7 +9172,7 @@
     </p:spTree>
     <p:extLst>
       <p:ext uri="{BB962C8B-B14F-4D97-AF65-F5344CB8AC3E}">
-        <p14:creationId xmlns:p14="http://schemas.microsoft.com/office/powerpoint/2010/main" val="2771055128"/>
+        <p14:creationId xmlns:p14="http://schemas.microsoft.com/office/powerpoint/2010/main" val="1185311173"/>
       </p:ext>
     </p:extLst>
   </p:cSld>
@@ -5353,7 +9215,12 @@
             <p:ph type="title"/>
           </p:nvPr>
         </p:nvSpPr>
-        <p:spPr/>
+        <p:spPr>
+          <a:xfrm>
+            <a:off x="762000" y="18255"/>
+            <a:ext cx="10515600" cy="1325563"/>
+          </a:xfrm>
+        </p:spPr>
         <p:txBody>
           <a:bodyPr/>
           <a:lstStyle/>
@@ -5365,12 +9232,43 @@
           </a:p>
         </p:txBody>
       </p:sp>
+      <p:graphicFrame>
+        <p:nvGraphicFramePr>
+          <p:cNvPr id="4" name="Content Placeholder 3">
+            <a:extLst>
+              <a:ext uri="{FF2B5EF4-FFF2-40B4-BE49-F238E27FC236}">
+                <a16:creationId xmlns:a16="http://schemas.microsoft.com/office/drawing/2014/main" id="{650952B6-494D-AB74-D905-C4836218A1A1}"/>
+              </a:ext>
+            </a:extLst>
+          </p:cNvPr>
+          <p:cNvGraphicFramePr>
+            <a:graphicFrameLocks noGrp="1"/>
+          </p:cNvGraphicFramePr>
+          <p:nvPr>
+            <p:ph sz="half" idx="1"/>
+            <p:extLst>
+              <p:ext uri="{D42A27DB-BD31-4B8C-83A1-F6EECF244321}">
+                <p14:modId xmlns:p14="http://schemas.microsoft.com/office/powerpoint/2010/main" val="3507294674"/>
+              </p:ext>
+            </p:extLst>
+          </p:nvPr>
+        </p:nvGraphicFramePr>
+        <p:xfrm>
+          <a:off x="838200" y="1825625"/>
+          <a:ext cx="5181600" cy="4351338"/>
+        </p:xfrm>
+        <a:graphic>
+          <a:graphicData uri="http://schemas.openxmlformats.org/drawingml/2006/diagram">
+            <dgm:relIds xmlns:dgm="http://schemas.openxmlformats.org/drawingml/2006/diagram" xmlns:r="http://schemas.openxmlformats.org/officeDocument/2006/relationships" r:dm="rId3" r:lo="rId4" r:qs="rId5" r:cs="rId6"/>
+          </a:graphicData>
+        </a:graphic>
+      </p:graphicFrame>
       <p:sp>
         <p:nvSpPr>
           <p:cNvPr id="3" name="Content Placeholder 2">
             <a:extLst>
               <a:ext uri="{FF2B5EF4-FFF2-40B4-BE49-F238E27FC236}">
-                <a16:creationId xmlns:a16="http://schemas.microsoft.com/office/drawing/2014/main" id="{D1CD9AA2-3E7B-478A-BA79-4DB5501F3CA4}"/>
+                <a16:creationId xmlns:a16="http://schemas.microsoft.com/office/drawing/2014/main" id="{DAF19211-C700-548C-C353-499CE13AC30F}"/>
               </a:ext>
             </a:extLst>
           </p:cNvPr>
@@ -5378,7 +9276,7 @@
             <a:spLocks noGrp="1"/>
           </p:cNvSpPr>
           <p:nvPr>
-            <p:ph idx="1"/>
+            <p:ph sz="half" idx="2"/>
           </p:nvPr>
         </p:nvSpPr>
         <p:spPr/>
@@ -5393,7 +9291,7 @@
     </p:spTree>
     <p:extLst>
       <p:ext uri="{BB962C8B-B14F-4D97-AF65-F5344CB8AC3E}">
-        <p14:creationId xmlns:p14="http://schemas.microsoft.com/office/powerpoint/2010/main" val="1185311173"/>
+        <p14:creationId xmlns:p14="http://schemas.microsoft.com/office/powerpoint/2010/main" val="2771055128"/>
       </p:ext>
     </p:extLst>
   </p:cSld>

</xml_diff>